<commit_message>
change motivation + add comm digram
</commit_message>
<xml_diff>
--- a/Presntations/Midterm presentation IOT Barcode checker 7681.pptx
+++ b/Presntations/Midterm presentation IOT Barcode checker 7681.pptx
@@ -5,7 +5,7 @@
     <p:sldMasterId id="2147483726" r:id="rId1"/>
   </p:sldMasterIdLst>
   <p:notesMasterIdLst>
-    <p:notesMasterId r:id="rId14"/>
+    <p:notesMasterId r:id="rId15"/>
   </p:notesMasterIdLst>
   <p:sldIdLst>
     <p:sldId id="256" r:id="rId2"/>
@@ -16,10 +16,11 @@
     <p:sldId id="277" r:id="rId7"/>
     <p:sldId id="282" r:id="rId8"/>
     <p:sldId id="280" r:id="rId9"/>
-    <p:sldId id="270" r:id="rId10"/>
-    <p:sldId id="260" r:id="rId11"/>
-    <p:sldId id="275" r:id="rId12"/>
-    <p:sldId id="276" r:id="rId13"/>
+    <p:sldId id="283" r:id="rId10"/>
+    <p:sldId id="270" r:id="rId11"/>
+    <p:sldId id="260" r:id="rId12"/>
+    <p:sldId id="275" r:id="rId13"/>
+    <p:sldId id="276" r:id="rId14"/>
   </p:sldIdLst>
   <p:sldSz cx="12192000" cy="6858000"/>
   <p:notesSz cx="6858000" cy="9144000"/>
@@ -208,7 +209,7 @@
           <a:p>
             <a:fld id="{A9F116F6-876A-46EC-830D-DE4D9F46346F}" type="datetimeFigureOut">
               <a:rPr lang="en-IL" smtClean="0"/>
-              <a:t>07/08/2024</a:t>
+              <a:t>08/08/2024</a:t>
             </a:fld>
             <a:endParaRPr lang="en-IL"/>
           </a:p>
@@ -765,7 +766,7 @@
           <a:p>
             <a:fld id="{4966AAC7-B74A-48E8-841A-BDDA799A8381}" type="slidenum">
               <a:rPr lang="en-IL" smtClean="0"/>
-              <a:t>11</a:t>
+              <a:t>12</a:t>
             </a:fld>
             <a:endParaRPr lang="en-IL"/>
           </a:p>
@@ -834,7 +835,7 @@
           <a:noFill/>
           <a:extLst>
             <a:ext uri="{909E8E84-426E-40dd-AFC4-6F175D3DCCD1}">
-              <a14:hiddenFill xmlns="" xmlns:a14="http://schemas.microsoft.com/office/drawing/2010/main">
+              <a14:hiddenFill xmlns:a14="http://schemas.microsoft.com/office/drawing/2010/main" xmlns="">
                 <a:solidFill>
                   <a:srgbClr val="FFFFFF"/>
                 </a:solidFill>
@@ -894,7 +895,7 @@
             </a:ln>
             <a:extLst>
               <a:ext uri="{91240B29-F687-4f45-9708-019B960494DF}">
-                <a14:hiddenLine xmlns="" xmlns:a14="http://schemas.microsoft.com/office/drawing/2010/main" w="9525">
+                <a14:hiddenLine xmlns:a14="http://schemas.microsoft.com/office/drawing/2010/main" xmlns="" w="9525">
                   <a:solidFill>
                     <a:srgbClr val="000000"/>
                   </a:solidFill>
@@ -984,7 +985,7 @@
             </a:ln>
             <a:extLst>
               <a:ext uri="{91240B29-F687-4f45-9708-019B960494DF}">
-                <a14:hiddenLine xmlns="" xmlns:a14="http://schemas.microsoft.com/office/drawing/2010/main" w="9525">
+                <a14:hiddenLine xmlns:a14="http://schemas.microsoft.com/office/drawing/2010/main" xmlns="" w="9525">
                   <a:solidFill>
                     <a:srgbClr val="000000"/>
                   </a:solidFill>
@@ -1074,7 +1075,7 @@
             </a:ln>
             <a:extLst>
               <a:ext uri="{91240B29-F687-4f45-9708-019B960494DF}">
-                <a14:hiddenLine xmlns="" xmlns:a14="http://schemas.microsoft.com/office/drawing/2010/main" w="9525">
+                <a14:hiddenLine xmlns:a14="http://schemas.microsoft.com/office/drawing/2010/main" xmlns="" w="9525">
                   <a:solidFill>
                     <a:srgbClr val="000000"/>
                   </a:solidFill>
@@ -1108,7 +1109,7 @@
             </a:ln>
             <a:extLst>
               <a:ext uri="{91240B29-F687-4f45-9708-019B960494DF}">
-                <a14:hiddenLine xmlns="" xmlns:a14="http://schemas.microsoft.com/office/drawing/2010/main" w="9525">
+                <a14:hiddenLine xmlns:a14="http://schemas.microsoft.com/office/drawing/2010/main" xmlns="" w="9525">
                   <a:solidFill>
                     <a:srgbClr val="000000"/>
                   </a:solidFill>
@@ -1198,7 +1199,7 @@
             </a:ln>
             <a:extLst>
               <a:ext uri="{91240B29-F687-4f45-9708-019B960494DF}">
-                <a14:hiddenLine xmlns="" xmlns:a14="http://schemas.microsoft.com/office/drawing/2010/main" w="9525">
+                <a14:hiddenLine xmlns:a14="http://schemas.microsoft.com/office/drawing/2010/main" xmlns="" w="9525">
                   <a:solidFill>
                     <a:srgbClr val="000000"/>
                   </a:solidFill>
@@ -1260,7 +1261,7 @@
             </a:ln>
             <a:extLst>
               <a:ext uri="{91240B29-F687-4f45-9708-019B960494DF}">
-                <a14:hiddenLine xmlns="" xmlns:a14="http://schemas.microsoft.com/office/drawing/2010/main" w="9525">
+                <a14:hiddenLine xmlns:a14="http://schemas.microsoft.com/office/drawing/2010/main" xmlns="" w="9525">
                   <a:solidFill>
                     <a:srgbClr val="000000"/>
                   </a:solidFill>
@@ -1322,7 +1323,7 @@
             </a:ln>
             <a:extLst>
               <a:ext uri="{91240B29-F687-4f45-9708-019B960494DF}">
-                <a14:hiddenLine xmlns="" xmlns:a14="http://schemas.microsoft.com/office/drawing/2010/main" w="9525">
+                <a14:hiddenLine xmlns:a14="http://schemas.microsoft.com/office/drawing/2010/main" xmlns="" w="9525">
                   <a:solidFill>
                     <a:srgbClr val="000000"/>
                   </a:solidFill>
@@ -1412,7 +1413,7 @@
             </a:ln>
             <a:extLst>
               <a:ext uri="{91240B29-F687-4f45-9708-019B960494DF}">
-                <a14:hiddenLine xmlns="" xmlns:a14="http://schemas.microsoft.com/office/drawing/2010/main" w="9525">
+                <a14:hiddenLine xmlns:a14="http://schemas.microsoft.com/office/drawing/2010/main" xmlns="" w="9525">
                   <a:solidFill>
                     <a:srgbClr val="000000"/>
                   </a:solidFill>
@@ -1474,7 +1475,7 @@
             </a:ln>
             <a:extLst>
               <a:ext uri="{91240B29-F687-4f45-9708-019B960494DF}">
-                <a14:hiddenLine xmlns="" xmlns:a14="http://schemas.microsoft.com/office/drawing/2010/main" w="9525">
+                <a14:hiddenLine xmlns:a14="http://schemas.microsoft.com/office/drawing/2010/main" xmlns="" w="9525">
                   <a:solidFill>
                     <a:srgbClr val="000000"/>
                   </a:solidFill>
@@ -1536,7 +1537,7 @@
             </a:ln>
             <a:extLst>
               <a:ext uri="{91240B29-F687-4f45-9708-019B960494DF}">
-                <a14:hiddenLine xmlns="" xmlns:a14="http://schemas.microsoft.com/office/drawing/2010/main" w="9525">
+                <a14:hiddenLine xmlns:a14="http://schemas.microsoft.com/office/drawing/2010/main" xmlns="" w="9525">
                   <a:solidFill>
                     <a:srgbClr val="000000"/>
                   </a:solidFill>
@@ -1626,7 +1627,7 @@
             </a:ln>
             <a:extLst>
               <a:ext uri="{91240B29-F687-4f45-9708-019B960494DF}">
-                <a14:hiddenLine xmlns="" xmlns:a14="http://schemas.microsoft.com/office/drawing/2010/main" w="9525">
+                <a14:hiddenLine xmlns:a14="http://schemas.microsoft.com/office/drawing/2010/main" xmlns="" w="9525">
                   <a:solidFill>
                     <a:srgbClr val="000000"/>
                   </a:solidFill>
@@ -1716,7 +1717,7 @@
             </a:ln>
             <a:extLst>
               <a:ext uri="{91240B29-F687-4f45-9708-019B960494DF}">
-                <a14:hiddenLine xmlns="" xmlns:a14="http://schemas.microsoft.com/office/drawing/2010/main" w="9525">
+                <a14:hiddenLine xmlns:a14="http://schemas.microsoft.com/office/drawing/2010/main" xmlns="" w="9525">
                   <a:solidFill>
                     <a:srgbClr val="000000"/>
                   </a:solidFill>
@@ -1778,7 +1779,7 @@
             </a:ln>
             <a:extLst>
               <a:ext uri="{91240B29-F687-4f45-9708-019B960494DF}">
-                <a14:hiddenLine xmlns="" xmlns:a14="http://schemas.microsoft.com/office/drawing/2010/main" w="9525">
+                <a14:hiddenLine xmlns:a14="http://schemas.microsoft.com/office/drawing/2010/main" xmlns="" w="9525">
                   <a:solidFill>
                     <a:srgbClr val="000000"/>
                   </a:solidFill>
@@ -1888,7 +1889,7 @@
             </a:ln>
             <a:extLst>
               <a:ext uri="{91240B29-F687-4f45-9708-019B960494DF}">
-                <a14:hiddenLine xmlns="" xmlns:a14="http://schemas.microsoft.com/office/drawing/2010/main" w="9525">
+                <a14:hiddenLine xmlns:a14="http://schemas.microsoft.com/office/drawing/2010/main" xmlns="" w="9525">
                   <a:solidFill>
                     <a:srgbClr val="000000"/>
                   </a:solidFill>
@@ -1950,7 +1951,7 @@
             </a:ln>
             <a:extLst>
               <a:ext uri="{91240B29-F687-4f45-9708-019B960494DF}">
-                <a14:hiddenLine xmlns="" xmlns:a14="http://schemas.microsoft.com/office/drawing/2010/main" w="9525">
+                <a14:hiddenLine xmlns:a14="http://schemas.microsoft.com/office/drawing/2010/main" xmlns="" w="9525">
                   <a:solidFill>
                     <a:srgbClr val="000000"/>
                   </a:solidFill>
@@ -2040,7 +2041,7 @@
             </a:ln>
             <a:extLst>
               <a:ext uri="{91240B29-F687-4f45-9708-019B960494DF}">
-                <a14:hiddenLine xmlns="" xmlns:a14="http://schemas.microsoft.com/office/drawing/2010/main" w="9525">
+                <a14:hiddenLine xmlns:a14="http://schemas.microsoft.com/office/drawing/2010/main" xmlns="" w="9525">
                   <a:solidFill>
                     <a:srgbClr val="000000"/>
                   </a:solidFill>
@@ -2130,7 +2131,7 @@
             </a:ln>
             <a:extLst>
               <a:ext uri="{91240B29-F687-4f45-9708-019B960494DF}">
-                <a14:hiddenLine xmlns="" xmlns:a14="http://schemas.microsoft.com/office/drawing/2010/main" w="9525">
+                <a14:hiddenLine xmlns:a14="http://schemas.microsoft.com/office/drawing/2010/main" xmlns="" w="9525">
                   <a:solidFill>
                     <a:srgbClr val="000000"/>
                   </a:solidFill>
@@ -2192,7 +2193,7 @@
             </a:ln>
             <a:extLst>
               <a:ext uri="{91240B29-F687-4f45-9708-019B960494DF}">
-                <a14:hiddenLine xmlns="" xmlns:a14="http://schemas.microsoft.com/office/drawing/2010/main" w="9525">
+                <a14:hiddenLine xmlns:a14="http://schemas.microsoft.com/office/drawing/2010/main" xmlns="" w="9525">
                   <a:solidFill>
                     <a:srgbClr val="000000"/>
                   </a:solidFill>
@@ -2282,7 +2283,7 @@
             </a:ln>
             <a:extLst>
               <a:ext uri="{91240B29-F687-4f45-9708-019B960494DF}">
-                <a14:hiddenLine xmlns="" xmlns:a14="http://schemas.microsoft.com/office/drawing/2010/main" w="9525">
+                <a14:hiddenLine xmlns:a14="http://schemas.microsoft.com/office/drawing/2010/main" xmlns="" w="9525">
                   <a:solidFill>
                     <a:srgbClr val="000000"/>
                   </a:solidFill>
@@ -2372,7 +2373,7 @@
             </a:ln>
             <a:extLst>
               <a:ext uri="{91240B29-F687-4f45-9708-019B960494DF}">
-                <a14:hiddenLine xmlns="" xmlns:a14="http://schemas.microsoft.com/office/drawing/2010/main" w="9525">
+                <a14:hiddenLine xmlns:a14="http://schemas.microsoft.com/office/drawing/2010/main" xmlns="" w="9525">
                   <a:solidFill>
                     <a:srgbClr val="000000"/>
                   </a:solidFill>
@@ -2428,7 +2429,7 @@
             </a:ln>
             <a:extLst>
               <a:ext uri="{91240B29-F687-4f45-9708-019B960494DF}">
-                <a14:hiddenLine xmlns="" xmlns:a14="http://schemas.microsoft.com/office/drawing/2010/main" w="9525">
+                <a14:hiddenLine xmlns:a14="http://schemas.microsoft.com/office/drawing/2010/main" xmlns="" w="9525">
                   <a:solidFill>
                     <a:srgbClr val="000000"/>
                   </a:solidFill>
@@ -2518,7 +2519,7 @@
             </a:ln>
             <a:extLst>
               <a:ext uri="{91240B29-F687-4f45-9708-019B960494DF}">
-                <a14:hiddenLine xmlns="" xmlns:a14="http://schemas.microsoft.com/office/drawing/2010/main" w="9525">
+                <a14:hiddenLine xmlns:a14="http://schemas.microsoft.com/office/drawing/2010/main" xmlns="" w="9525">
                   <a:solidFill>
                     <a:srgbClr val="000000"/>
                   </a:solidFill>
@@ -2574,7 +2575,7 @@
             </a:ln>
             <a:extLst>
               <a:ext uri="{91240B29-F687-4f45-9708-019B960494DF}">
-                <a14:hiddenLine xmlns="" xmlns:a14="http://schemas.microsoft.com/office/drawing/2010/main" w="9525">
+                <a14:hiddenLine xmlns:a14="http://schemas.microsoft.com/office/drawing/2010/main" xmlns="" w="9525">
                   <a:solidFill>
                     <a:srgbClr val="000000"/>
                   </a:solidFill>
@@ -2664,7 +2665,7 @@
             </a:ln>
             <a:extLst>
               <a:ext uri="{91240B29-F687-4f45-9708-019B960494DF}">
-                <a14:hiddenLine xmlns="" xmlns:a14="http://schemas.microsoft.com/office/drawing/2010/main" w="9525">
+                <a14:hiddenLine xmlns:a14="http://schemas.microsoft.com/office/drawing/2010/main" xmlns="" w="9525">
                   <a:solidFill>
                     <a:srgbClr val="000000"/>
                   </a:solidFill>
@@ -2732,7 +2733,7 @@
             </a:ln>
             <a:extLst>
               <a:ext uri="{91240B29-F687-4f45-9708-019B960494DF}">
-                <a14:hiddenLine xmlns="" xmlns:a14="http://schemas.microsoft.com/office/drawing/2010/main" w="9525">
+                <a14:hiddenLine xmlns:a14="http://schemas.microsoft.com/office/drawing/2010/main" xmlns="" w="9525">
                   <a:solidFill>
                     <a:srgbClr val="000000"/>
                   </a:solidFill>
@@ -2822,7 +2823,7 @@
             </a:ln>
             <a:extLst>
               <a:ext uri="{91240B29-F687-4f45-9708-019B960494DF}">
-                <a14:hiddenLine xmlns="" xmlns:a14="http://schemas.microsoft.com/office/drawing/2010/main" w="9525">
+                <a14:hiddenLine xmlns:a14="http://schemas.microsoft.com/office/drawing/2010/main" xmlns="" w="9525">
                   <a:solidFill>
                     <a:srgbClr val="000000"/>
                   </a:solidFill>
@@ -2890,7 +2891,7 @@
             </a:ln>
             <a:extLst>
               <a:ext uri="{91240B29-F687-4f45-9708-019B960494DF}">
-                <a14:hiddenLine xmlns="" xmlns:a14="http://schemas.microsoft.com/office/drawing/2010/main" w="9525">
+                <a14:hiddenLine xmlns:a14="http://schemas.microsoft.com/office/drawing/2010/main" xmlns="" w="9525">
                   <a:solidFill>
                     <a:srgbClr val="000000"/>
                   </a:solidFill>
@@ -2980,7 +2981,7 @@
             </a:ln>
             <a:extLst>
               <a:ext uri="{91240B29-F687-4f45-9708-019B960494DF}">
-                <a14:hiddenLine xmlns="" xmlns:a14="http://schemas.microsoft.com/office/drawing/2010/main" w="9525">
+                <a14:hiddenLine xmlns:a14="http://schemas.microsoft.com/office/drawing/2010/main" xmlns="" w="9525">
                   <a:solidFill>
                     <a:srgbClr val="000000"/>
                   </a:solidFill>
@@ -3014,7 +3015,7 @@
             </a:ln>
             <a:extLst>
               <a:ext uri="{91240B29-F687-4f45-9708-019B960494DF}">
-                <a14:hiddenLine xmlns="" xmlns:a14="http://schemas.microsoft.com/office/drawing/2010/main" w="9525">
+                <a14:hiddenLine xmlns:a14="http://schemas.microsoft.com/office/drawing/2010/main" xmlns="" w="9525">
                   <a:solidFill>
                     <a:srgbClr val="000000"/>
                   </a:solidFill>
@@ -3104,7 +3105,7 @@
             </a:ln>
             <a:extLst>
               <a:ext uri="{91240B29-F687-4f45-9708-019B960494DF}">
-                <a14:hiddenLine xmlns="" xmlns:a14="http://schemas.microsoft.com/office/drawing/2010/main" w="9525">
+                <a14:hiddenLine xmlns:a14="http://schemas.microsoft.com/office/drawing/2010/main" xmlns="" w="9525">
                   <a:solidFill>
                     <a:srgbClr val="000000"/>
                   </a:solidFill>
@@ -3166,7 +3167,7 @@
             </a:ln>
             <a:extLst>
               <a:ext uri="{91240B29-F687-4f45-9708-019B960494DF}">
-                <a14:hiddenLine xmlns="" xmlns:a14="http://schemas.microsoft.com/office/drawing/2010/main" w="9525">
+                <a14:hiddenLine xmlns:a14="http://schemas.microsoft.com/office/drawing/2010/main" xmlns="" w="9525">
                   <a:solidFill>
                     <a:srgbClr val="000000"/>
                   </a:solidFill>
@@ -3228,7 +3229,7 @@
             </a:ln>
             <a:extLst>
               <a:ext uri="{91240B29-F687-4f45-9708-019B960494DF}">
-                <a14:hiddenLine xmlns="" xmlns:a14="http://schemas.microsoft.com/office/drawing/2010/main" w="9525">
+                <a14:hiddenLine xmlns:a14="http://schemas.microsoft.com/office/drawing/2010/main" xmlns="" w="9525">
                   <a:solidFill>
                     <a:srgbClr val="000000"/>
                   </a:solidFill>
@@ -3318,7 +3319,7 @@
             </a:ln>
             <a:extLst>
               <a:ext uri="{91240B29-F687-4f45-9708-019B960494DF}">
-                <a14:hiddenLine xmlns="" xmlns:a14="http://schemas.microsoft.com/office/drawing/2010/main" w="9525">
+                <a14:hiddenLine xmlns:a14="http://schemas.microsoft.com/office/drawing/2010/main" xmlns="" w="9525">
                   <a:solidFill>
                     <a:srgbClr val="000000"/>
                   </a:solidFill>
@@ -3386,7 +3387,7 @@
             </a:ln>
             <a:extLst>
               <a:ext uri="{91240B29-F687-4f45-9708-019B960494DF}">
-                <a14:hiddenLine xmlns="" xmlns:a14="http://schemas.microsoft.com/office/drawing/2010/main" w="9525">
+                <a14:hiddenLine xmlns:a14="http://schemas.microsoft.com/office/drawing/2010/main" xmlns="" w="9525">
                   <a:solidFill>
                     <a:srgbClr val="000000"/>
                   </a:solidFill>
@@ -3448,7 +3449,7 @@
             </a:ln>
             <a:extLst>
               <a:ext uri="{91240B29-F687-4f45-9708-019B960494DF}">
-                <a14:hiddenLine xmlns="" xmlns:a14="http://schemas.microsoft.com/office/drawing/2010/main" w="9525">
+                <a14:hiddenLine xmlns:a14="http://schemas.microsoft.com/office/drawing/2010/main" xmlns="" w="9525">
                   <a:solidFill>
                     <a:srgbClr val="000000"/>
                   </a:solidFill>
@@ -3538,7 +3539,7 @@
             </a:ln>
             <a:extLst>
               <a:ext uri="{91240B29-F687-4f45-9708-019B960494DF}">
-                <a14:hiddenLine xmlns="" xmlns:a14="http://schemas.microsoft.com/office/drawing/2010/main" w="9525">
+                <a14:hiddenLine xmlns:a14="http://schemas.microsoft.com/office/drawing/2010/main" xmlns="" w="9525">
                   <a:solidFill>
                     <a:srgbClr val="000000"/>
                   </a:solidFill>
@@ -3600,7 +3601,7 @@
             </a:ln>
             <a:extLst>
               <a:ext uri="{91240B29-F687-4f45-9708-019B960494DF}">
-                <a14:hiddenLine xmlns="" xmlns:a14="http://schemas.microsoft.com/office/drawing/2010/main" w="9525">
+                <a14:hiddenLine xmlns:a14="http://schemas.microsoft.com/office/drawing/2010/main" xmlns="" w="9525">
                   <a:solidFill>
                     <a:srgbClr val="000000"/>
                   </a:solidFill>
@@ -3690,7 +3691,7 @@
             </a:ln>
             <a:extLst>
               <a:ext uri="{91240B29-F687-4f45-9708-019B960494DF}">
-                <a14:hiddenLine xmlns="" xmlns:a14="http://schemas.microsoft.com/office/drawing/2010/main" w="9525">
+                <a14:hiddenLine xmlns:a14="http://schemas.microsoft.com/office/drawing/2010/main" xmlns="" w="9525">
                   <a:solidFill>
                     <a:srgbClr val="000000"/>
                   </a:solidFill>
@@ -3752,7 +3753,7 @@
             </a:ln>
             <a:extLst>
               <a:ext uri="{91240B29-F687-4f45-9708-019B960494DF}">
-                <a14:hiddenLine xmlns="" xmlns:a14="http://schemas.microsoft.com/office/drawing/2010/main" w="9525">
+                <a14:hiddenLine xmlns:a14="http://schemas.microsoft.com/office/drawing/2010/main" xmlns="" w="9525">
                   <a:solidFill>
                     <a:srgbClr val="000000"/>
                   </a:solidFill>
@@ -3842,7 +3843,7 @@
             </a:ln>
             <a:extLst>
               <a:ext uri="{91240B29-F687-4f45-9708-019B960494DF}">
-                <a14:hiddenLine xmlns="" xmlns:a14="http://schemas.microsoft.com/office/drawing/2010/main" w="9525">
+                <a14:hiddenLine xmlns:a14="http://schemas.microsoft.com/office/drawing/2010/main" xmlns="" w="9525">
                   <a:solidFill>
                     <a:srgbClr val="000000"/>
                   </a:solidFill>
@@ -3876,7 +3877,7 @@
             </a:ln>
             <a:extLst>
               <a:ext uri="{91240B29-F687-4f45-9708-019B960494DF}">
-                <a14:hiddenLine xmlns="" xmlns:a14="http://schemas.microsoft.com/office/drawing/2010/main" w="9525">
+                <a14:hiddenLine xmlns:a14="http://schemas.microsoft.com/office/drawing/2010/main" xmlns="" w="9525">
                   <a:solidFill>
                     <a:srgbClr val="000000"/>
                   </a:solidFill>
@@ -3941,7 +3942,7 @@
             </a:ln>
             <a:extLst>
               <a:ext uri="{91240B29-F687-4f45-9708-019B960494DF}">
-                <a14:hiddenLine xmlns="" xmlns:a14="http://schemas.microsoft.com/office/drawing/2010/main" w="9525">
+                <a14:hiddenLine xmlns:a14="http://schemas.microsoft.com/office/drawing/2010/main" xmlns="" w="9525">
                   <a:solidFill>
                     <a:srgbClr val="000000"/>
                   </a:solidFill>
@@ -4031,7 +4032,7 @@
             </a:ln>
             <a:extLst>
               <a:ext uri="{91240B29-F687-4f45-9708-019B960494DF}">
-                <a14:hiddenLine xmlns="" xmlns:a14="http://schemas.microsoft.com/office/drawing/2010/main" w="9525">
+                <a14:hiddenLine xmlns:a14="http://schemas.microsoft.com/office/drawing/2010/main" xmlns="" w="9525">
                   <a:solidFill>
                     <a:srgbClr val="000000"/>
                   </a:solidFill>
@@ -4093,7 +4094,7 @@
             </a:ln>
             <a:extLst>
               <a:ext uri="{91240B29-F687-4f45-9708-019B960494DF}">
-                <a14:hiddenLine xmlns="" xmlns:a14="http://schemas.microsoft.com/office/drawing/2010/main" w="9525">
+                <a14:hiddenLine xmlns:a14="http://schemas.microsoft.com/office/drawing/2010/main" xmlns="" w="9525">
                   <a:solidFill>
                     <a:srgbClr val="000000"/>
                   </a:solidFill>
@@ -4183,7 +4184,7 @@
             </a:ln>
             <a:extLst>
               <a:ext uri="{91240B29-F687-4f45-9708-019B960494DF}">
-                <a14:hiddenLine xmlns="" xmlns:a14="http://schemas.microsoft.com/office/drawing/2010/main" w="9525">
+                <a14:hiddenLine xmlns:a14="http://schemas.microsoft.com/office/drawing/2010/main" xmlns="" w="9525">
                   <a:solidFill>
                     <a:srgbClr val="000000"/>
                   </a:solidFill>
@@ -4273,7 +4274,7 @@
             </a:ln>
             <a:extLst>
               <a:ext uri="{91240B29-F687-4f45-9708-019B960494DF}">
-                <a14:hiddenLine xmlns="" xmlns:a14="http://schemas.microsoft.com/office/drawing/2010/main" w="9525">
+                <a14:hiddenLine xmlns:a14="http://schemas.microsoft.com/office/drawing/2010/main" xmlns="" w="9525">
                   <a:solidFill>
                     <a:srgbClr val="000000"/>
                   </a:solidFill>
@@ -4338,7 +4339,7 @@
             </a:ln>
             <a:extLst>
               <a:ext uri="{91240B29-F687-4f45-9708-019B960494DF}">
-                <a14:hiddenLine xmlns="" xmlns:a14="http://schemas.microsoft.com/office/drawing/2010/main" w="9525">
+                <a14:hiddenLine xmlns:a14="http://schemas.microsoft.com/office/drawing/2010/main" xmlns="" w="9525">
                   <a:solidFill>
                     <a:srgbClr val="000000"/>
                   </a:solidFill>
@@ -4400,7 +4401,7 @@
             </a:ln>
             <a:extLst>
               <a:ext uri="{91240B29-F687-4f45-9708-019B960494DF}">
-                <a14:hiddenLine xmlns="" xmlns:a14="http://schemas.microsoft.com/office/drawing/2010/main" w="9525">
+                <a14:hiddenLine xmlns:a14="http://schemas.microsoft.com/office/drawing/2010/main" xmlns="" w="9525">
                   <a:solidFill>
                     <a:srgbClr val="000000"/>
                   </a:solidFill>
@@ -4490,7 +4491,7 @@
             </a:ln>
             <a:extLst>
               <a:ext uri="{91240B29-F687-4f45-9708-019B960494DF}">
-                <a14:hiddenLine xmlns="" xmlns:a14="http://schemas.microsoft.com/office/drawing/2010/main" w="9525">
+                <a14:hiddenLine xmlns:a14="http://schemas.microsoft.com/office/drawing/2010/main" xmlns="" w="9525">
                   <a:solidFill>
                     <a:srgbClr val="000000"/>
                   </a:solidFill>
@@ -4580,7 +4581,7 @@
             </a:ln>
             <a:extLst>
               <a:ext uri="{91240B29-F687-4f45-9708-019B960494DF}">
-                <a14:hiddenLine xmlns="" xmlns:a14="http://schemas.microsoft.com/office/drawing/2010/main" w="9525">
+                <a14:hiddenLine xmlns:a14="http://schemas.microsoft.com/office/drawing/2010/main" xmlns="" w="9525">
                   <a:solidFill>
                     <a:srgbClr val="000000"/>
                   </a:solidFill>
@@ -4642,7 +4643,7 @@
             </a:ln>
             <a:extLst>
               <a:ext uri="{91240B29-F687-4f45-9708-019B960494DF}">
-                <a14:hiddenLine xmlns="" xmlns:a14="http://schemas.microsoft.com/office/drawing/2010/main" w="9525">
+                <a14:hiddenLine xmlns:a14="http://schemas.microsoft.com/office/drawing/2010/main" xmlns="" w="9525">
                   <a:solidFill>
                     <a:srgbClr val="000000"/>
                   </a:solidFill>
@@ -4762,7 +4763,7 @@
             </a:ln>
             <a:extLst>
               <a:ext uri="{91240B29-F687-4f45-9708-019B960494DF}">
-                <a14:hiddenLine xmlns="" xmlns:a14="http://schemas.microsoft.com/office/drawing/2010/main" w="9525">
+                <a14:hiddenLine xmlns:a14="http://schemas.microsoft.com/office/drawing/2010/main" xmlns="" w="9525">
                   <a:solidFill>
                     <a:srgbClr val="000000"/>
                   </a:solidFill>
@@ -4830,7 +4831,7 @@
             </a:ln>
             <a:extLst>
               <a:ext uri="{91240B29-F687-4f45-9708-019B960494DF}">
-                <a14:hiddenLine xmlns="" xmlns:a14="http://schemas.microsoft.com/office/drawing/2010/main" w="9525">
+                <a14:hiddenLine xmlns:a14="http://schemas.microsoft.com/office/drawing/2010/main" xmlns="" w="9525">
                   <a:solidFill>
                     <a:srgbClr val="000000"/>
                   </a:solidFill>
@@ -4920,7 +4921,7 @@
             </a:ln>
             <a:extLst>
               <a:ext uri="{91240B29-F687-4f45-9708-019B960494DF}">
-                <a14:hiddenLine xmlns="" xmlns:a14="http://schemas.microsoft.com/office/drawing/2010/main" w="9525">
+                <a14:hiddenLine xmlns:a14="http://schemas.microsoft.com/office/drawing/2010/main" xmlns="" w="9525">
                   <a:solidFill>
                     <a:srgbClr val="000000"/>
                   </a:solidFill>
@@ -5060,7 +5061,7 @@
           <a:p>
             <a:fld id="{52C02C3A-F3EC-431D-BD4C-85B7465FC644}" type="datetimeFigureOut">
               <a:rPr lang="en-IL" smtClean="0"/>
-              <a:t>07/08/2024</a:t>
+              <a:t>08/08/2024</a:t>
             </a:fld>
             <a:endParaRPr lang="en-IL"/>
           </a:p>
@@ -5327,7 +5328,7 @@
           <a:p>
             <a:fld id="{52C02C3A-F3EC-431D-BD4C-85B7465FC644}" type="datetimeFigureOut">
               <a:rPr lang="en-IL" smtClean="0"/>
-              <a:t>07/08/2024</a:t>
+              <a:t>08/08/2024</a:t>
             </a:fld>
             <a:endParaRPr lang="en-IL"/>
           </a:p>
@@ -5523,7 +5524,7 @@
           <a:p>
             <a:fld id="{52C02C3A-F3EC-431D-BD4C-85B7465FC644}" type="datetimeFigureOut">
               <a:rPr lang="en-IL" smtClean="0"/>
-              <a:t>07/08/2024</a:t>
+              <a:t>08/08/2024</a:t>
             </a:fld>
             <a:endParaRPr lang="en-IL"/>
           </a:p>
@@ -5786,7 +5787,7 @@
           <a:p>
             <a:fld id="{52C02C3A-F3EC-431D-BD4C-85B7465FC644}" type="datetimeFigureOut">
               <a:rPr lang="en-IL" smtClean="0"/>
-              <a:t>07/08/2024</a:t>
+              <a:t>08/08/2024</a:t>
             </a:fld>
             <a:endParaRPr lang="en-IL"/>
           </a:p>
@@ -6220,7 +6221,7 @@
           <a:p>
             <a:fld id="{52C02C3A-F3EC-431D-BD4C-85B7465FC644}" type="datetimeFigureOut">
               <a:rPr lang="en-IL" smtClean="0"/>
-              <a:t>07/08/2024</a:t>
+              <a:t>08/08/2024</a:t>
             </a:fld>
             <a:endParaRPr lang="en-IL"/>
           </a:p>
@@ -6766,7 +6767,7 @@
           <a:p>
             <a:fld id="{52C02C3A-F3EC-431D-BD4C-85B7465FC644}" type="datetimeFigureOut">
               <a:rPr lang="en-IL" smtClean="0"/>
-              <a:t>07/08/2024</a:t>
+              <a:t>08/08/2024</a:t>
             </a:fld>
             <a:endParaRPr lang="en-IL"/>
           </a:p>
@@ -7486,7 +7487,7 @@
           <a:p>
             <a:fld id="{52C02C3A-F3EC-431D-BD4C-85B7465FC644}" type="datetimeFigureOut">
               <a:rPr lang="en-IL" smtClean="0"/>
-              <a:t>07/08/2024</a:t>
+              <a:t>08/08/2024</a:t>
             </a:fld>
             <a:endParaRPr lang="en-IL"/>
           </a:p>
@@ -7656,7 +7657,7 @@
           <a:p>
             <a:fld id="{52C02C3A-F3EC-431D-BD4C-85B7465FC644}" type="datetimeFigureOut">
               <a:rPr lang="en-IL" smtClean="0"/>
-              <a:t>07/08/2024</a:t>
+              <a:t>08/08/2024</a:t>
             </a:fld>
             <a:endParaRPr lang="en-IL"/>
           </a:p>
@@ -7836,7 +7837,7 @@
           <a:p>
             <a:fld id="{52C02C3A-F3EC-431D-BD4C-85B7465FC644}" type="datetimeFigureOut">
               <a:rPr lang="en-IL" smtClean="0"/>
-              <a:t>07/08/2024</a:t>
+              <a:t>08/08/2024</a:t>
             </a:fld>
             <a:endParaRPr lang="en-IL"/>
           </a:p>
@@ -8006,7 +8007,7 @@
           <a:p>
             <a:fld id="{52C02C3A-F3EC-431D-BD4C-85B7465FC644}" type="datetimeFigureOut">
               <a:rPr lang="en-IL" smtClean="0"/>
-              <a:t>07/08/2024</a:t>
+              <a:t>08/08/2024</a:t>
             </a:fld>
             <a:endParaRPr lang="en-IL"/>
           </a:p>
@@ -8256,7 +8257,7 @@
           <a:p>
             <a:fld id="{52C02C3A-F3EC-431D-BD4C-85B7465FC644}" type="datetimeFigureOut">
               <a:rPr lang="en-IL" smtClean="0"/>
-              <a:t>07/08/2024</a:t>
+              <a:t>08/08/2024</a:t>
             </a:fld>
             <a:endParaRPr lang="en-IL"/>
           </a:p>
@@ -8488,7 +8489,7 @@
           <a:p>
             <a:fld id="{52C02C3A-F3EC-431D-BD4C-85B7465FC644}" type="datetimeFigureOut">
               <a:rPr lang="en-IL" smtClean="0"/>
-              <a:t>07/08/2024</a:t>
+              <a:t>08/08/2024</a:t>
             </a:fld>
             <a:endParaRPr lang="en-IL"/>
           </a:p>
@@ -8869,7 +8870,7 @@
           <a:p>
             <a:fld id="{52C02C3A-F3EC-431D-BD4C-85B7465FC644}" type="datetimeFigureOut">
               <a:rPr lang="en-IL" smtClean="0"/>
-              <a:t>07/08/2024</a:t>
+              <a:t>08/08/2024</a:t>
             </a:fld>
             <a:endParaRPr lang="en-IL"/>
           </a:p>
@@ -8987,7 +8988,7 @@
           <a:p>
             <a:fld id="{52C02C3A-F3EC-431D-BD4C-85B7465FC644}" type="datetimeFigureOut">
               <a:rPr lang="en-IL" smtClean="0"/>
-              <a:t>07/08/2024</a:t>
+              <a:t>08/08/2024</a:t>
             </a:fld>
             <a:endParaRPr lang="en-IL"/>
           </a:p>
@@ -9082,7 +9083,7 @@
           <a:p>
             <a:fld id="{52C02C3A-F3EC-431D-BD4C-85B7465FC644}" type="datetimeFigureOut">
               <a:rPr lang="en-IL" smtClean="0"/>
-              <a:t>07/08/2024</a:t>
+              <a:t>08/08/2024</a:t>
             </a:fld>
             <a:endParaRPr lang="en-IL"/>
           </a:p>
@@ -9331,7 +9332,7 @@
           <a:p>
             <a:fld id="{52C02C3A-F3EC-431D-BD4C-85B7465FC644}" type="datetimeFigureOut">
               <a:rPr lang="en-IL" smtClean="0"/>
-              <a:t>07/08/2024</a:t>
+              <a:t>08/08/2024</a:t>
             </a:fld>
             <a:endParaRPr lang="en-IL"/>
           </a:p>
@@ -9611,7 +9612,7 @@
           <a:p>
             <a:fld id="{52C02C3A-F3EC-431D-BD4C-85B7465FC644}" type="datetimeFigureOut">
               <a:rPr lang="en-IL" smtClean="0"/>
-              <a:t>07/08/2024</a:t>
+              <a:t>08/08/2024</a:t>
             </a:fld>
             <a:endParaRPr lang="en-IL"/>
           </a:p>
@@ -9727,7 +9728,7 @@
           <a:noFill/>
           <a:extLst>
             <a:ext uri="{909E8E84-426E-40dd-AFC4-6F175D3DCCD1}">
-              <a14:hiddenFill xmlns="" xmlns:a14="http://schemas.microsoft.com/office/drawing/2010/main">
+              <a14:hiddenFill xmlns:a14="http://schemas.microsoft.com/office/drawing/2010/main" xmlns="">
                 <a:solidFill>
                   <a:srgbClr val="FFFFFF"/>
                 </a:solidFill>
@@ -9801,7 +9802,7 @@
               </a:ln>
               <a:extLst>
                 <a:ext uri="{91240B29-F687-4f45-9708-019B960494DF}">
-                  <a14:hiddenLine xmlns="" xmlns:a14="http://schemas.microsoft.com/office/drawing/2010/main" w="9525">
+                  <a14:hiddenLine xmlns:a14="http://schemas.microsoft.com/office/drawing/2010/main" xmlns="" w="9525">
                     <a:solidFill>
                       <a:srgbClr val="000000"/>
                     </a:solidFill>
@@ -9891,7 +9892,7 @@
               </a:ln>
               <a:extLst>
                 <a:ext uri="{91240B29-F687-4f45-9708-019B960494DF}">
-                  <a14:hiddenLine xmlns="" xmlns:a14="http://schemas.microsoft.com/office/drawing/2010/main" w="9525">
+                  <a14:hiddenLine xmlns:a14="http://schemas.microsoft.com/office/drawing/2010/main" xmlns="" w="9525">
                     <a:solidFill>
                       <a:srgbClr val="000000"/>
                     </a:solidFill>
@@ -9981,7 +9982,7 @@
               </a:ln>
               <a:extLst>
                 <a:ext uri="{91240B29-F687-4f45-9708-019B960494DF}">
-                  <a14:hiddenLine xmlns="" xmlns:a14="http://schemas.microsoft.com/office/drawing/2010/main" w="9525">
+                  <a14:hiddenLine xmlns:a14="http://schemas.microsoft.com/office/drawing/2010/main" xmlns="" w="9525">
                     <a:solidFill>
                       <a:srgbClr val="000000"/>
                     </a:solidFill>
@@ -10043,7 +10044,7 @@
               </a:ln>
               <a:extLst>
                 <a:ext uri="{91240B29-F687-4f45-9708-019B960494DF}">
-                  <a14:hiddenLine xmlns="" xmlns:a14="http://schemas.microsoft.com/office/drawing/2010/main" w="9525">
+                  <a14:hiddenLine xmlns:a14="http://schemas.microsoft.com/office/drawing/2010/main" xmlns="" w="9525">
                     <a:solidFill>
                       <a:srgbClr val="000000"/>
                     </a:solidFill>
@@ -10133,7 +10134,7 @@
               </a:ln>
               <a:extLst>
                 <a:ext uri="{91240B29-F687-4f45-9708-019B960494DF}">
-                  <a14:hiddenLine xmlns="" xmlns:a14="http://schemas.microsoft.com/office/drawing/2010/main" w="9525">
+                  <a14:hiddenLine xmlns:a14="http://schemas.microsoft.com/office/drawing/2010/main" xmlns="" w="9525">
                     <a:solidFill>
                       <a:srgbClr val="000000"/>
                     </a:solidFill>
@@ -10195,7 +10196,7 @@
               </a:ln>
               <a:extLst>
                 <a:ext uri="{91240B29-F687-4f45-9708-019B960494DF}">
-                  <a14:hiddenLine xmlns="" xmlns:a14="http://schemas.microsoft.com/office/drawing/2010/main" w="9525">
+                  <a14:hiddenLine xmlns:a14="http://schemas.microsoft.com/office/drawing/2010/main" xmlns="" w="9525">
                     <a:solidFill>
                       <a:srgbClr val="000000"/>
                     </a:solidFill>
@@ -10257,7 +10258,7 @@
               </a:ln>
               <a:extLst>
                 <a:ext uri="{91240B29-F687-4f45-9708-019B960494DF}">
-                  <a14:hiddenLine xmlns="" xmlns:a14="http://schemas.microsoft.com/office/drawing/2010/main" w="9525">
+                  <a14:hiddenLine xmlns:a14="http://schemas.microsoft.com/office/drawing/2010/main" xmlns="" w="9525">
                     <a:solidFill>
                       <a:srgbClr val="000000"/>
                     </a:solidFill>
@@ -10347,7 +10348,7 @@
               </a:ln>
               <a:extLst>
                 <a:ext uri="{91240B29-F687-4f45-9708-019B960494DF}">
-                  <a14:hiddenLine xmlns="" xmlns:a14="http://schemas.microsoft.com/office/drawing/2010/main" w="9525">
+                  <a14:hiddenLine xmlns:a14="http://schemas.microsoft.com/office/drawing/2010/main" xmlns="" w="9525">
                     <a:solidFill>
                       <a:srgbClr val="000000"/>
                     </a:solidFill>
@@ -10437,7 +10438,7 @@
               </a:ln>
               <a:extLst>
                 <a:ext uri="{91240B29-F687-4f45-9708-019B960494DF}">
-                  <a14:hiddenLine xmlns="" xmlns:a14="http://schemas.microsoft.com/office/drawing/2010/main" w="9525">
+                  <a14:hiddenLine xmlns:a14="http://schemas.microsoft.com/office/drawing/2010/main" xmlns="" w="9525">
                     <a:solidFill>
                       <a:srgbClr val="000000"/>
                     </a:solidFill>
@@ -10499,7 +10500,7 @@
               </a:ln>
               <a:extLst>
                 <a:ext uri="{91240B29-F687-4f45-9708-019B960494DF}">
-                  <a14:hiddenLine xmlns="" xmlns:a14="http://schemas.microsoft.com/office/drawing/2010/main" w="9525">
+                  <a14:hiddenLine xmlns:a14="http://schemas.microsoft.com/office/drawing/2010/main" xmlns="" w="9525">
                     <a:solidFill>
                       <a:srgbClr val="000000"/>
                     </a:solidFill>
@@ -10609,7 +10610,7 @@
               </a:ln>
               <a:extLst>
                 <a:ext uri="{91240B29-F687-4f45-9708-019B960494DF}">
-                  <a14:hiddenLine xmlns="" xmlns:a14="http://schemas.microsoft.com/office/drawing/2010/main" w="9525">
+                  <a14:hiddenLine xmlns:a14="http://schemas.microsoft.com/office/drawing/2010/main" xmlns="" w="9525">
                     <a:solidFill>
                       <a:srgbClr val="000000"/>
                     </a:solidFill>
@@ -10693,7 +10694,7 @@
               </a:ln>
               <a:extLst>
                 <a:ext uri="{91240B29-F687-4f45-9708-019B960494DF}">
-                  <a14:hiddenLine xmlns="" xmlns:a14="http://schemas.microsoft.com/office/drawing/2010/main" w="9525">
+                  <a14:hiddenLine xmlns:a14="http://schemas.microsoft.com/office/drawing/2010/main" xmlns="" w="9525">
                     <a:solidFill>
                       <a:srgbClr val="000000"/>
                     </a:solidFill>
@@ -10755,7 +10756,7 @@
               </a:ln>
               <a:extLst>
                 <a:ext uri="{91240B29-F687-4f45-9708-019B960494DF}">
-                  <a14:hiddenLine xmlns="" xmlns:a14="http://schemas.microsoft.com/office/drawing/2010/main" w="9525">
+                  <a14:hiddenLine xmlns:a14="http://schemas.microsoft.com/office/drawing/2010/main" xmlns="" w="9525">
                     <a:solidFill>
                       <a:srgbClr val="000000"/>
                     </a:solidFill>
@@ -10817,7 +10818,7 @@
               </a:ln>
               <a:extLst>
                 <a:ext uri="{91240B29-F687-4f45-9708-019B960494DF}">
-                  <a14:hiddenLine xmlns="" xmlns:a14="http://schemas.microsoft.com/office/drawing/2010/main" w="9525">
+                  <a14:hiddenLine xmlns:a14="http://schemas.microsoft.com/office/drawing/2010/main" xmlns="" w="9525">
                     <a:solidFill>
                       <a:srgbClr val="000000"/>
                     </a:solidFill>
@@ -10907,7 +10908,7 @@
               </a:ln>
               <a:extLst>
                 <a:ext uri="{91240B29-F687-4f45-9708-019B960494DF}">
-                  <a14:hiddenLine xmlns="" xmlns:a14="http://schemas.microsoft.com/office/drawing/2010/main" w="9525">
+                  <a14:hiddenLine xmlns:a14="http://schemas.microsoft.com/office/drawing/2010/main" xmlns="" w="9525">
                     <a:solidFill>
                       <a:srgbClr val="000000"/>
                     </a:solidFill>
@@ -10941,7 +10942,7 @@
               </a:ln>
               <a:extLst>
                 <a:ext uri="{91240B29-F687-4f45-9708-019B960494DF}">
-                  <a14:hiddenLine xmlns="" xmlns:a14="http://schemas.microsoft.com/office/drawing/2010/main" w="9525">
+                  <a14:hiddenLine xmlns:a14="http://schemas.microsoft.com/office/drawing/2010/main" xmlns="" w="9525">
                     <a:solidFill>
                       <a:srgbClr val="000000"/>
                     </a:solidFill>
@@ -11006,7 +11007,7 @@
               </a:ln>
               <a:extLst>
                 <a:ext uri="{91240B29-F687-4f45-9708-019B960494DF}">
-                  <a14:hiddenLine xmlns="" xmlns:a14="http://schemas.microsoft.com/office/drawing/2010/main" w="9525">
+                  <a14:hiddenLine xmlns:a14="http://schemas.microsoft.com/office/drawing/2010/main" xmlns="" w="9525">
                     <a:solidFill>
                       <a:srgbClr val="000000"/>
                     </a:solidFill>
@@ -11096,7 +11097,7 @@
               </a:ln>
               <a:extLst>
                 <a:ext uri="{91240B29-F687-4f45-9708-019B960494DF}">
-                  <a14:hiddenLine xmlns="" xmlns:a14="http://schemas.microsoft.com/office/drawing/2010/main" w="9525">
+                  <a14:hiddenLine xmlns:a14="http://schemas.microsoft.com/office/drawing/2010/main" xmlns="" w="9525">
                     <a:solidFill>
                       <a:srgbClr val="000000"/>
                     </a:solidFill>
@@ -11158,7 +11159,7 @@
               </a:ln>
               <a:extLst>
                 <a:ext uri="{91240B29-F687-4f45-9708-019B960494DF}">
-                  <a14:hiddenLine xmlns="" xmlns:a14="http://schemas.microsoft.com/office/drawing/2010/main" w="9525">
+                  <a14:hiddenLine xmlns:a14="http://schemas.microsoft.com/office/drawing/2010/main" xmlns="" w="9525">
                     <a:solidFill>
                       <a:srgbClr val="000000"/>
                     </a:solidFill>
@@ -11248,7 +11249,7 @@
               </a:ln>
               <a:extLst>
                 <a:ext uri="{91240B29-F687-4f45-9708-019B960494DF}">
-                  <a14:hiddenLine xmlns="" xmlns:a14="http://schemas.microsoft.com/office/drawing/2010/main" w="9525">
+                  <a14:hiddenLine xmlns:a14="http://schemas.microsoft.com/office/drawing/2010/main" xmlns="" w="9525">
                     <a:solidFill>
                       <a:srgbClr val="000000"/>
                     </a:solidFill>
@@ -11313,7 +11314,7 @@
               </a:ln>
               <a:extLst>
                 <a:ext uri="{91240B29-F687-4f45-9708-019B960494DF}">
-                  <a14:hiddenLine xmlns="" xmlns:a14="http://schemas.microsoft.com/office/drawing/2010/main" w="9525">
+                  <a14:hiddenLine xmlns:a14="http://schemas.microsoft.com/office/drawing/2010/main" xmlns="" w="9525">
                     <a:solidFill>
                       <a:srgbClr val="000000"/>
                     </a:solidFill>
@@ -11375,7 +11376,7 @@
               </a:ln>
               <a:extLst>
                 <a:ext uri="{91240B29-F687-4f45-9708-019B960494DF}">
-                  <a14:hiddenLine xmlns="" xmlns:a14="http://schemas.microsoft.com/office/drawing/2010/main" w="9525">
+                  <a14:hiddenLine xmlns:a14="http://schemas.microsoft.com/office/drawing/2010/main" xmlns="" w="9525">
                     <a:solidFill>
                       <a:srgbClr val="000000"/>
                     </a:solidFill>
@@ -11465,7 +11466,7 @@
               </a:ln>
               <a:extLst>
                 <a:ext uri="{91240B29-F687-4f45-9708-019B960494DF}">
-                  <a14:hiddenLine xmlns="" xmlns:a14="http://schemas.microsoft.com/office/drawing/2010/main" w="9525">
+                  <a14:hiddenLine xmlns:a14="http://schemas.microsoft.com/office/drawing/2010/main" xmlns="" w="9525">
                     <a:solidFill>
                       <a:srgbClr val="000000"/>
                     </a:solidFill>
@@ -11555,7 +11556,7 @@
               </a:ln>
               <a:extLst>
                 <a:ext uri="{91240B29-F687-4f45-9708-019B960494DF}">
-                  <a14:hiddenLine xmlns="" xmlns:a14="http://schemas.microsoft.com/office/drawing/2010/main" w="9525">
+                  <a14:hiddenLine xmlns:a14="http://schemas.microsoft.com/office/drawing/2010/main" xmlns="" w="9525">
                     <a:solidFill>
                       <a:srgbClr val="000000"/>
                     </a:solidFill>
@@ -11620,7 +11621,7 @@
               </a:ln>
               <a:extLst>
                 <a:ext uri="{91240B29-F687-4f45-9708-019B960494DF}">
-                  <a14:hiddenLine xmlns="" xmlns:a14="http://schemas.microsoft.com/office/drawing/2010/main" w="9525">
+                  <a14:hiddenLine xmlns:a14="http://schemas.microsoft.com/office/drawing/2010/main" xmlns="" w="9525">
                     <a:solidFill>
                       <a:srgbClr val="000000"/>
                     </a:solidFill>
@@ -11740,7 +11741,7 @@
               </a:ln>
               <a:extLst>
                 <a:ext uri="{91240B29-F687-4f45-9708-019B960494DF}">
-                  <a14:hiddenLine xmlns="" xmlns:a14="http://schemas.microsoft.com/office/drawing/2010/main" w="9525">
+                  <a14:hiddenLine xmlns:a14="http://schemas.microsoft.com/office/drawing/2010/main" xmlns="" w="9525">
                     <a:solidFill>
                       <a:srgbClr val="000000"/>
                     </a:solidFill>
@@ -11838,7 +11839,7 @@
               </a:ln>
               <a:extLst>
                 <a:ext uri="{91240B29-F687-4f45-9708-019B960494DF}">
-                  <a14:hiddenLine xmlns="" xmlns:a14="http://schemas.microsoft.com/office/drawing/2010/main" w="9525">
+                  <a14:hiddenLine xmlns:a14="http://schemas.microsoft.com/office/drawing/2010/main" xmlns="" w="9525">
                     <a:solidFill>
                       <a:srgbClr val="000000"/>
                     </a:solidFill>
@@ -11953,7 +11954,7 @@
               </a:ln>
               <a:extLst>
                 <a:ext uri="{91240B29-F687-4f45-9708-019B960494DF}">
-                  <a14:hiddenLine xmlns="" xmlns:a14="http://schemas.microsoft.com/office/drawing/2010/main" w="9525">
+                  <a14:hiddenLine xmlns:a14="http://schemas.microsoft.com/office/drawing/2010/main" xmlns="" w="9525">
                     <a:solidFill>
                       <a:srgbClr val="000000"/>
                     </a:solidFill>
@@ -12043,7 +12044,7 @@
               </a:ln>
               <a:extLst>
                 <a:ext uri="{91240B29-F687-4f45-9708-019B960494DF}">
-                  <a14:hiddenLine xmlns="" xmlns:a14="http://schemas.microsoft.com/office/drawing/2010/main" w="9525">
+                  <a14:hiddenLine xmlns:a14="http://schemas.microsoft.com/office/drawing/2010/main" xmlns="" w="9525">
                     <a:solidFill>
                       <a:srgbClr val="000000"/>
                     </a:solidFill>
@@ -12108,7 +12109,7 @@
               </a:ln>
               <a:extLst>
                 <a:ext uri="{91240B29-F687-4f45-9708-019B960494DF}">
-                  <a14:hiddenLine xmlns="" xmlns:a14="http://schemas.microsoft.com/office/drawing/2010/main" w="9525">
+                  <a14:hiddenLine xmlns:a14="http://schemas.microsoft.com/office/drawing/2010/main" xmlns="" w="9525">
                     <a:solidFill>
                       <a:srgbClr val="000000"/>
                     </a:solidFill>
@@ -12198,7 +12199,7 @@
               </a:ln>
               <a:extLst>
                 <a:ext uri="{91240B29-F687-4f45-9708-019B960494DF}">
-                  <a14:hiddenLine xmlns="" xmlns:a14="http://schemas.microsoft.com/office/drawing/2010/main" w="9525">
+                  <a14:hiddenLine xmlns:a14="http://schemas.microsoft.com/office/drawing/2010/main" xmlns="" w="9525">
                     <a:solidFill>
                       <a:srgbClr val="000000"/>
                     </a:solidFill>
@@ -12266,7 +12267,7 @@
               </a:ln>
               <a:extLst>
                 <a:ext uri="{91240B29-F687-4f45-9708-019B960494DF}">
-                  <a14:hiddenLine xmlns="" xmlns:a14="http://schemas.microsoft.com/office/drawing/2010/main" w="9525">
+                  <a14:hiddenLine xmlns:a14="http://schemas.microsoft.com/office/drawing/2010/main" xmlns="" w="9525">
                     <a:solidFill>
                       <a:srgbClr val="000000"/>
                     </a:solidFill>
@@ -12356,7 +12357,7 @@
               </a:ln>
               <a:extLst>
                 <a:ext uri="{91240B29-F687-4f45-9708-019B960494DF}">
-                  <a14:hiddenLine xmlns="" xmlns:a14="http://schemas.microsoft.com/office/drawing/2010/main" w="9525">
+                  <a14:hiddenLine xmlns:a14="http://schemas.microsoft.com/office/drawing/2010/main" xmlns="" w="9525">
                     <a:solidFill>
                       <a:srgbClr val="000000"/>
                     </a:solidFill>
@@ -12424,7 +12425,7 @@
               </a:ln>
               <a:extLst>
                 <a:ext uri="{91240B29-F687-4f45-9708-019B960494DF}">
-                  <a14:hiddenLine xmlns="" xmlns:a14="http://schemas.microsoft.com/office/drawing/2010/main" w="9525">
+                  <a14:hiddenLine xmlns:a14="http://schemas.microsoft.com/office/drawing/2010/main" xmlns="" w="9525">
                     <a:solidFill>
                       <a:srgbClr val="000000"/>
                     </a:solidFill>
@@ -12514,7 +12515,7 @@
               </a:ln>
               <a:extLst>
                 <a:ext uri="{91240B29-F687-4f45-9708-019B960494DF}">
-                  <a14:hiddenLine xmlns="" xmlns:a14="http://schemas.microsoft.com/office/drawing/2010/main" w="9525">
+                  <a14:hiddenLine xmlns:a14="http://schemas.microsoft.com/office/drawing/2010/main" xmlns="" w="9525">
                     <a:solidFill>
                       <a:srgbClr val="000000"/>
                     </a:solidFill>
@@ -12548,7 +12549,7 @@
               </a:ln>
               <a:extLst>
                 <a:ext uri="{91240B29-F687-4f45-9708-019B960494DF}">
-                  <a14:hiddenLine xmlns="" xmlns:a14="http://schemas.microsoft.com/office/drawing/2010/main" w="9525">
+                  <a14:hiddenLine xmlns:a14="http://schemas.microsoft.com/office/drawing/2010/main" xmlns="" w="9525">
                     <a:solidFill>
                       <a:srgbClr val="000000"/>
                     </a:solidFill>
@@ -12688,7 +12689,7 @@
           <a:p>
             <a:fld id="{52C02C3A-F3EC-431D-BD4C-85B7465FC644}" type="datetimeFigureOut">
               <a:rPr lang="en-IL" smtClean="0"/>
-              <a:t>07/08/2024</a:t>
+              <a:t>08/08/2024</a:t>
             </a:fld>
             <a:endParaRPr lang="en-IL"/>
           </a:p>
@@ -13358,6 +13359,641 @@
       </p:grpSpPr>
       <p:sp>
         <p:nvSpPr>
+          <p:cNvPr id="2" name="Title 1"/>
+          <p:cNvSpPr>
+            <a:spLocks noGrp="1"/>
+          </p:cNvSpPr>
+          <p:nvPr>
+            <p:ph type="title"/>
+          </p:nvPr>
+        </p:nvSpPr>
+        <p:spPr>
+          <a:xfrm>
+            <a:off x="1143001" y="378598"/>
+            <a:ext cx="9905998" cy="1478570"/>
+          </a:xfrm>
+        </p:spPr>
+        <p:txBody>
+          <a:bodyPr/>
+          <a:lstStyle/>
+          <a:p>
+            <a:pPr algn="ctr"/>
+            <a:r>
+              <a:rPr lang="en-US" b="1" dirty="0">
+                <a:cs typeface="Arial" panose="020B0604020202020204" pitchFamily="34" charset="0"/>
+              </a:rPr>
+              <a:t>ESP32</a:t>
+            </a:r>
+            <a:endParaRPr lang="he-IL" b="1" dirty="0">
+              <a:cs typeface="Arial" panose="020B0604020202020204" pitchFamily="34" charset="0"/>
+            </a:endParaRPr>
+          </a:p>
+        </p:txBody>
+      </p:sp>
+      <p:sp>
+        <p:nvSpPr>
+          <p:cNvPr id="3" name="Content Placeholder 2"/>
+          <p:cNvSpPr>
+            <a:spLocks noGrp="1"/>
+          </p:cNvSpPr>
+          <p:nvPr>
+            <p:ph idx="1"/>
+          </p:nvPr>
+        </p:nvSpPr>
+        <p:spPr>
+          <a:xfrm>
+            <a:off x="998119" y="1981200"/>
+            <a:ext cx="8946541" cy="4876800"/>
+          </a:xfrm>
+        </p:spPr>
+        <p:txBody>
+          <a:bodyPr>
+            <a:normAutofit/>
+          </a:bodyPr>
+          <a:lstStyle/>
+          <a:p>
+            <a:r>
+              <a:rPr lang="en-US" dirty="0">
+                <a:cs typeface="Arial" panose="020B0604020202020204" pitchFamily="34" charset="0"/>
+              </a:rPr>
+              <a:t>Includes many drivers that make programming easier.</a:t>
+            </a:r>
+          </a:p>
+          <a:p>
+            <a:r>
+              <a:rPr lang="en-US" dirty="0">
+                <a:cs typeface="Arial" panose="020B0604020202020204" pitchFamily="34" charset="0"/>
+              </a:rPr>
+              <a:t>Advantages over Arduino nano: speed and memory</a:t>
+            </a:r>
+          </a:p>
+          <a:p>
+            <a:pPr marL="0" indent="0">
+              <a:buNone/>
+            </a:pPr>
+            <a:endParaRPr lang="en-US" dirty="0">
+              <a:cs typeface="Arial" panose="020B0604020202020204" pitchFamily="34" charset="0"/>
+            </a:endParaRPr>
+          </a:p>
+          <a:p>
+            <a:endParaRPr lang="en-US" dirty="0">
+              <a:cs typeface="Arial" panose="020B0604020202020204" pitchFamily="34" charset="0"/>
+            </a:endParaRPr>
+          </a:p>
+          <a:p>
+            <a:pPr marL="0" indent="0">
+              <a:buNone/>
+            </a:pPr>
+            <a:endParaRPr lang="en-US" dirty="0">
+              <a:cs typeface="Arial" panose="020B0604020202020204" pitchFamily="34" charset="0"/>
+            </a:endParaRPr>
+          </a:p>
+          <a:p>
+            <a:pPr marL="0" indent="0">
+              <a:buNone/>
+            </a:pPr>
+            <a:endParaRPr lang="en-US" dirty="0">
+              <a:cs typeface="Arial" panose="020B0604020202020204" pitchFamily="34" charset="0"/>
+            </a:endParaRPr>
+          </a:p>
+          <a:p>
+            <a:r>
+              <a:rPr lang="en-US" dirty="0">
+                <a:cs typeface="Arial" panose="020B0604020202020204" pitchFamily="34" charset="0"/>
+              </a:rPr>
+              <a:t>2 cores.</a:t>
+            </a:r>
+          </a:p>
+        </p:txBody>
+      </p:sp>
+      <p:graphicFrame>
+        <p:nvGraphicFramePr>
+          <p:cNvPr id="8" name="Table 8">
+            <a:extLst>
+              <a:ext uri="{FF2B5EF4-FFF2-40B4-BE49-F238E27FC236}">
+                <a16:creationId xmlns:a16="http://schemas.microsoft.com/office/drawing/2014/main" id="{3DE114C7-DB38-4EF0-91F4-07D34D224E4E}"/>
+              </a:ext>
+            </a:extLst>
+          </p:cNvPr>
+          <p:cNvGraphicFramePr>
+            <a:graphicFrameLocks noGrp="1"/>
+          </p:cNvGraphicFramePr>
+          <p:nvPr>
+            <p:extLst>
+              <p:ext uri="{D42A27DB-BD31-4B8C-83A1-F6EECF244321}">
+                <p14:modId xmlns:p14="http://schemas.microsoft.com/office/powerpoint/2010/main" val="1210740900"/>
+              </p:ext>
+            </p:extLst>
+          </p:nvPr>
+        </p:nvGraphicFramePr>
+        <p:xfrm>
+          <a:off x="1455577" y="3429000"/>
+          <a:ext cx="6876870" cy="1651000"/>
+        </p:xfrm>
+        <a:graphic>
+          <a:graphicData uri="http://schemas.openxmlformats.org/drawingml/2006/table">
+            <a:tbl>
+              <a:tblPr firstRow="1" bandRow="1">
+                <a:tableStyleId>{073A0DAA-6AF3-43AB-8588-CEC1D06C72B9}</a:tableStyleId>
+              </a:tblPr>
+              <a:tblGrid>
+                <a:gridCol w="2292290">
+                  <a:extLst>
+                    <a:ext uri="{9D8B030D-6E8A-4147-A177-3AD203B41FA5}">
+                      <a16:colId xmlns:a16="http://schemas.microsoft.com/office/drawing/2014/main" val="3152711524"/>
+                    </a:ext>
+                  </a:extLst>
+                </a:gridCol>
+                <a:gridCol w="2292290">
+                  <a:extLst>
+                    <a:ext uri="{9D8B030D-6E8A-4147-A177-3AD203B41FA5}">
+                      <a16:colId xmlns:a16="http://schemas.microsoft.com/office/drawing/2014/main" val="4131672903"/>
+                    </a:ext>
+                  </a:extLst>
+                </a:gridCol>
+                <a:gridCol w="2292290">
+                  <a:extLst>
+                    <a:ext uri="{9D8B030D-6E8A-4147-A177-3AD203B41FA5}">
+                      <a16:colId xmlns:a16="http://schemas.microsoft.com/office/drawing/2014/main" val="2419015053"/>
+                    </a:ext>
+                  </a:extLst>
+                </a:gridCol>
+              </a:tblGrid>
+              <a:tr h="0">
+                <a:tc>
+                  <a:txBody>
+                    <a:bodyPr/>
+                    <a:lstStyle/>
+                    <a:p>
+                      <a:endParaRPr lang="en-US" dirty="0">
+                        <a:latin typeface="Arial" panose="020B0604020202020204" pitchFamily="34" charset="0"/>
+                        <a:cs typeface="Arial" panose="020B0604020202020204" pitchFamily="34" charset="0"/>
+                      </a:endParaRPr>
+                    </a:p>
+                  </a:txBody>
+                  <a:tcPr/>
+                </a:tc>
+                <a:tc>
+                  <a:txBody>
+                    <a:bodyPr/>
+                    <a:lstStyle/>
+                    <a:p>
+                      <a:r>
+                        <a:rPr lang="en-US" dirty="0"/>
+                        <a:t>ESP32</a:t>
+                      </a:r>
+                      <a:endParaRPr lang="en-US" dirty="0">
+                        <a:latin typeface="Arial" panose="020B0604020202020204" pitchFamily="34" charset="0"/>
+                        <a:cs typeface="Arial" panose="020B0604020202020204" pitchFamily="34" charset="0"/>
+                      </a:endParaRPr>
+                    </a:p>
+                  </a:txBody>
+                  <a:tcPr/>
+                </a:tc>
+                <a:tc>
+                  <a:txBody>
+                    <a:bodyPr/>
+                    <a:lstStyle/>
+                    <a:p>
+                      <a:r>
+                        <a:rPr lang="en-US" dirty="0"/>
+                        <a:t>Arduino nano</a:t>
+                      </a:r>
+                      <a:endParaRPr lang="en-US" dirty="0">
+                        <a:latin typeface="Arial" panose="020B0604020202020204" pitchFamily="34" charset="0"/>
+                        <a:cs typeface="Arial" panose="020B0604020202020204" pitchFamily="34" charset="0"/>
+                      </a:endParaRPr>
+                    </a:p>
+                  </a:txBody>
+                  <a:tcPr/>
+                </a:tc>
+                <a:extLst>
+                  <a:ext uri="{0D108BD9-81ED-4DB2-BD59-A6C34878D82A}">
+                    <a16:rowId xmlns:a16="http://schemas.microsoft.com/office/drawing/2014/main" val="1520508676"/>
+                  </a:ext>
+                </a:extLst>
+              </a:tr>
+              <a:tr h="370840">
+                <a:tc>
+                  <a:txBody>
+                    <a:bodyPr/>
+                    <a:lstStyle/>
+                    <a:p>
+                      <a:r>
+                        <a:rPr lang="en-US" dirty="0"/>
+                        <a:t>Clock rate</a:t>
+                      </a:r>
+                      <a:endParaRPr lang="en-US" dirty="0">
+                        <a:latin typeface="Arial" panose="020B0604020202020204" pitchFamily="34" charset="0"/>
+                        <a:cs typeface="Arial" panose="020B0604020202020204" pitchFamily="34" charset="0"/>
+                      </a:endParaRPr>
+                    </a:p>
+                  </a:txBody>
+                  <a:tcPr/>
+                </a:tc>
+                <a:tc>
+                  <a:txBody>
+                    <a:bodyPr/>
+                    <a:lstStyle/>
+                    <a:p>
+                      <a:r>
+                        <a:rPr lang="en-US" sz="1800" b="0" kern="1200" dirty="0">
+                          <a:solidFill>
+                            <a:schemeClr val="dk1"/>
+                          </a:solidFill>
+                          <a:effectLst/>
+                        </a:rPr>
+                        <a:t>80 MHz</a:t>
+                      </a:r>
+                      <a:endParaRPr lang="en-US" dirty="0">
+                        <a:latin typeface="Arial" panose="020B0604020202020204" pitchFamily="34" charset="0"/>
+                        <a:cs typeface="Arial" panose="020B0604020202020204" pitchFamily="34" charset="0"/>
+                      </a:endParaRPr>
+                    </a:p>
+                  </a:txBody>
+                  <a:tcPr/>
+                </a:tc>
+                <a:tc>
+                  <a:txBody>
+                    <a:bodyPr/>
+                    <a:lstStyle/>
+                    <a:p>
+                      <a:r>
+                        <a:rPr lang="en-US" dirty="0"/>
+                        <a:t>16 MHz</a:t>
+                      </a:r>
+                      <a:endParaRPr lang="en-US" dirty="0">
+                        <a:latin typeface="Arial" panose="020B0604020202020204" pitchFamily="34" charset="0"/>
+                        <a:cs typeface="Arial" panose="020B0604020202020204" pitchFamily="34" charset="0"/>
+                      </a:endParaRPr>
+                    </a:p>
+                  </a:txBody>
+                  <a:tcPr/>
+                </a:tc>
+                <a:extLst>
+                  <a:ext uri="{0D108BD9-81ED-4DB2-BD59-A6C34878D82A}">
+                    <a16:rowId xmlns:a16="http://schemas.microsoft.com/office/drawing/2014/main" val="2581021940"/>
+                  </a:ext>
+                </a:extLst>
+              </a:tr>
+              <a:tr h="370840">
+                <a:tc>
+                  <a:txBody>
+                    <a:bodyPr/>
+                    <a:lstStyle/>
+                    <a:p>
+                      <a:r>
+                        <a:rPr lang="en-US" dirty="0"/>
+                        <a:t>Memory size</a:t>
+                      </a:r>
+                      <a:endParaRPr lang="en-US" dirty="0">
+                        <a:latin typeface="Arial" panose="020B0604020202020204" pitchFamily="34" charset="0"/>
+                        <a:cs typeface="Arial" panose="020B0604020202020204" pitchFamily="34" charset="0"/>
+                      </a:endParaRPr>
+                    </a:p>
+                  </a:txBody>
+                  <a:tcPr/>
+                </a:tc>
+                <a:tc>
+                  <a:txBody>
+                    <a:bodyPr/>
+                    <a:lstStyle/>
+                    <a:p>
+                      <a:r>
+                        <a:rPr lang="en-US" sz="1800" b="0" kern="1200" dirty="0">
+                          <a:solidFill>
+                            <a:schemeClr val="dk1"/>
+                          </a:solidFill>
+                          <a:effectLst/>
+                        </a:rPr>
+                        <a:t>520 KB SRAM</a:t>
+                      </a:r>
+                    </a:p>
+                    <a:p>
+                      <a:r>
+                        <a:rPr lang="en-US" sz="1800" b="0" kern="1200" dirty="0">
+                          <a:solidFill>
+                            <a:schemeClr val="dk1"/>
+                          </a:solidFill>
+                          <a:effectLst/>
+                        </a:rPr>
+                        <a:t>4 MB flash memory</a:t>
+                      </a:r>
+                    </a:p>
+                    <a:p>
+                      <a:endParaRPr lang="en-US" dirty="0">
+                        <a:latin typeface="Arial" panose="020B0604020202020204" pitchFamily="34" charset="0"/>
+                        <a:cs typeface="Arial" panose="020B0604020202020204" pitchFamily="34" charset="0"/>
+                      </a:endParaRPr>
+                    </a:p>
+                  </a:txBody>
+                  <a:tcPr/>
+                </a:tc>
+                <a:tc>
+                  <a:txBody>
+                    <a:bodyPr/>
+                    <a:lstStyle/>
+                    <a:p>
+                      <a:r>
+                        <a:rPr lang="en-US" dirty="0"/>
+                        <a:t>2 KB SRAM</a:t>
+                      </a:r>
+                    </a:p>
+                    <a:p>
+                      <a:r>
+                        <a:rPr lang="en-US" sz="1800" b="0" kern="1200" dirty="0">
+                          <a:solidFill>
+                            <a:schemeClr val="dk1"/>
+                          </a:solidFill>
+                          <a:effectLst/>
+                        </a:rPr>
+                        <a:t>32 KB flash </a:t>
+                      </a:r>
+                      <a:endParaRPr lang="en-US" sz="1800" b="0" i="0" kern="1200" dirty="0">
+                        <a:solidFill>
+                          <a:schemeClr val="dk1"/>
+                        </a:solidFill>
+                        <a:effectLst/>
+                        <a:latin typeface="Arial" panose="020B0604020202020204" pitchFamily="34" charset="0"/>
+                        <a:ea typeface="+mn-ea"/>
+                        <a:cs typeface="Arial" panose="020B0604020202020204" pitchFamily="34" charset="0"/>
+                      </a:endParaRPr>
+                    </a:p>
+                  </a:txBody>
+                  <a:tcPr/>
+                </a:tc>
+                <a:extLst>
+                  <a:ext uri="{0D108BD9-81ED-4DB2-BD59-A6C34878D82A}">
+                    <a16:rowId xmlns:a16="http://schemas.microsoft.com/office/drawing/2014/main" val="1915485891"/>
+                  </a:ext>
+                </a:extLst>
+              </a:tr>
+            </a:tbl>
+          </a:graphicData>
+        </a:graphic>
+      </p:graphicFrame>
+      <p:pic>
+        <p:nvPicPr>
+          <p:cNvPr id="2050" name="Picture 2" descr="ESP32-DEVKITC-32D Espressif Systems | RF/IF ו- RFID | DigiKey">
+            <a:extLst>
+              <a:ext uri="{FF2B5EF4-FFF2-40B4-BE49-F238E27FC236}">
+                <a16:creationId xmlns:a16="http://schemas.microsoft.com/office/drawing/2014/main" id="{3C58C095-129A-45B6-A3E9-361FCE6FC02A}"/>
+              </a:ext>
+            </a:extLst>
+          </p:cNvPr>
+          <p:cNvPicPr>
+            <a:picLocks noChangeAspect="1" noChangeArrowheads="1"/>
+          </p:cNvPicPr>
+          <p:nvPr/>
+        </p:nvPicPr>
+        <p:blipFill>
+          <a:blip r:embed="rId2">
+            <a:extLst>
+              <a:ext uri="{28A0092B-C50C-407E-A947-70E740481C1C}">
+                <a14:useLocalDpi xmlns:a14="http://schemas.microsoft.com/office/drawing/2010/main" val="0"/>
+              </a:ext>
+            </a:extLst>
+          </a:blip>
+          <a:srcRect/>
+          <a:stretch>
+            <a:fillRect/>
+          </a:stretch>
+        </p:blipFill>
+        <p:spPr bwMode="auto">
+          <a:xfrm>
+            <a:off x="8653272" y="1857168"/>
+            <a:ext cx="3324492" cy="2903745"/>
+          </a:xfrm>
+          <a:prstGeom prst="roundRect">
+            <a:avLst>
+              <a:gd name="adj" fmla="val 8594"/>
+            </a:avLst>
+          </a:prstGeom>
+          <a:solidFill>
+            <a:srgbClr val="FFFFFF">
+              <a:shade val="85000"/>
+            </a:srgbClr>
+          </a:solidFill>
+          <a:ln>
+            <a:noFill/>
+          </a:ln>
+          <a:effectLst>
+            <a:reflection blurRad="12700" stA="38000" endPos="28000" dist="5000" dir="5400000" sy="-100000" algn="bl" rotWithShape="0"/>
+          </a:effectLst>
+        </p:spPr>
+      </p:pic>
+    </p:spTree>
+    <p:extLst>
+      <p:ext uri="{BB962C8B-B14F-4D97-AF65-F5344CB8AC3E}">
+        <p14:creationId xmlns:p14="http://schemas.microsoft.com/office/powerpoint/2010/main" val="2432230716"/>
+      </p:ext>
+    </p:extLst>
+  </p:cSld>
+  <p:clrMapOvr>
+    <a:masterClrMapping/>
+  </p:clrMapOvr>
+  <p:timing>
+    <p:tnLst>
+      <p:par>
+        <p:cTn id="1" dur="indefinite" restart="never" nodeType="tmRoot">
+          <p:childTnLst>
+            <p:seq concurrent="1" nextAc="seek">
+              <p:cTn id="2" dur="indefinite" nodeType="mainSeq">
+                <p:childTnLst>
+                  <p:par>
+                    <p:cTn id="3" fill="hold">
+                      <p:stCondLst>
+                        <p:cond delay="indefinite"/>
+                      </p:stCondLst>
+                      <p:childTnLst>
+                        <p:par>
+                          <p:cTn id="4" fill="hold">
+                            <p:stCondLst>
+                              <p:cond delay="0"/>
+                            </p:stCondLst>
+                            <p:childTnLst>
+                              <p:par>
+                                <p:cTn id="5" presetID="1" presetClass="entr" presetSubtype="0" fill="hold" grpId="0" nodeType="clickEffect">
+                                  <p:stCondLst>
+                                    <p:cond delay="0"/>
+                                  </p:stCondLst>
+                                  <p:childTnLst>
+                                    <p:set>
+                                      <p:cBhvr>
+                                        <p:cTn id="6" dur="1" fill="hold">
+                                          <p:stCondLst>
+                                            <p:cond delay="0"/>
+                                          </p:stCondLst>
+                                        </p:cTn>
+                                        <p:tgtEl>
+                                          <p:spTgt spid="3">
+                                            <p:txEl>
+                                              <p:pRg st="0" end="0"/>
+                                            </p:txEl>
+                                          </p:spTgt>
+                                        </p:tgtEl>
+                                        <p:attrNameLst>
+                                          <p:attrName>style.visibility</p:attrName>
+                                        </p:attrNameLst>
+                                      </p:cBhvr>
+                                      <p:to>
+                                        <p:strVal val="visible"/>
+                                      </p:to>
+                                    </p:set>
+                                  </p:childTnLst>
+                                </p:cTn>
+                              </p:par>
+                            </p:childTnLst>
+                          </p:cTn>
+                        </p:par>
+                      </p:childTnLst>
+                    </p:cTn>
+                  </p:par>
+                  <p:par>
+                    <p:cTn id="7" fill="hold">
+                      <p:stCondLst>
+                        <p:cond delay="indefinite"/>
+                      </p:stCondLst>
+                      <p:childTnLst>
+                        <p:par>
+                          <p:cTn id="8" fill="hold">
+                            <p:stCondLst>
+                              <p:cond delay="0"/>
+                            </p:stCondLst>
+                            <p:childTnLst>
+                              <p:par>
+                                <p:cTn id="9" presetID="1" presetClass="entr" presetSubtype="0" fill="hold" grpId="0" nodeType="clickEffect">
+                                  <p:stCondLst>
+                                    <p:cond delay="0"/>
+                                  </p:stCondLst>
+                                  <p:childTnLst>
+                                    <p:set>
+                                      <p:cBhvr>
+                                        <p:cTn id="10" dur="1" fill="hold">
+                                          <p:stCondLst>
+                                            <p:cond delay="0"/>
+                                          </p:stCondLst>
+                                        </p:cTn>
+                                        <p:tgtEl>
+                                          <p:spTgt spid="3">
+                                            <p:txEl>
+                                              <p:pRg st="1" end="1"/>
+                                            </p:txEl>
+                                          </p:spTgt>
+                                        </p:tgtEl>
+                                        <p:attrNameLst>
+                                          <p:attrName>style.visibility</p:attrName>
+                                        </p:attrNameLst>
+                                      </p:cBhvr>
+                                      <p:to>
+                                        <p:strVal val="visible"/>
+                                      </p:to>
+                                    </p:set>
+                                  </p:childTnLst>
+                                </p:cTn>
+                              </p:par>
+                            </p:childTnLst>
+                          </p:cTn>
+                        </p:par>
+                      </p:childTnLst>
+                    </p:cTn>
+                  </p:par>
+                  <p:par>
+                    <p:cTn id="11" fill="hold">
+                      <p:stCondLst>
+                        <p:cond delay="indefinite"/>
+                      </p:stCondLst>
+                      <p:childTnLst>
+                        <p:par>
+                          <p:cTn id="12" fill="hold">
+                            <p:stCondLst>
+                              <p:cond delay="0"/>
+                            </p:stCondLst>
+                            <p:childTnLst>
+                              <p:par>
+                                <p:cTn id="13" presetID="1" presetClass="entr" presetSubtype="0" fill="hold" grpId="0" nodeType="clickEffect">
+                                  <p:stCondLst>
+                                    <p:cond delay="0"/>
+                                  </p:stCondLst>
+                                  <p:childTnLst>
+                                    <p:set>
+                                      <p:cBhvr>
+                                        <p:cTn id="14" dur="1" fill="hold">
+                                          <p:stCondLst>
+                                            <p:cond delay="0"/>
+                                          </p:stCondLst>
+                                        </p:cTn>
+                                        <p:tgtEl>
+                                          <p:spTgt spid="3">
+                                            <p:txEl>
+                                              <p:pRg st="6" end="6"/>
+                                            </p:txEl>
+                                          </p:spTgt>
+                                        </p:tgtEl>
+                                        <p:attrNameLst>
+                                          <p:attrName>style.visibility</p:attrName>
+                                        </p:attrNameLst>
+                                      </p:cBhvr>
+                                      <p:to>
+                                        <p:strVal val="visible"/>
+                                      </p:to>
+                                    </p:set>
+                                  </p:childTnLst>
+                                </p:cTn>
+                              </p:par>
+                            </p:childTnLst>
+                          </p:cTn>
+                        </p:par>
+                      </p:childTnLst>
+                    </p:cTn>
+                  </p:par>
+                </p:childTnLst>
+              </p:cTn>
+              <p:prevCondLst>
+                <p:cond evt="onPrev" delay="0">
+                  <p:tgtEl>
+                    <p:sldTgt/>
+                  </p:tgtEl>
+                </p:cond>
+              </p:prevCondLst>
+              <p:nextCondLst>
+                <p:cond evt="onNext" delay="0">
+                  <p:tgtEl>
+                    <p:sldTgt/>
+                  </p:tgtEl>
+                </p:cond>
+              </p:nextCondLst>
+            </p:seq>
+          </p:childTnLst>
+        </p:cTn>
+      </p:par>
+    </p:tnLst>
+    <p:bldLst>
+      <p:bldP spid="3" grpId="0" build="p"/>
+    </p:bldLst>
+  </p:timing>
+</p:sld>
+</file>
+
+<file path=ppt/slides/slide11.xml><?xml version="1.0" encoding="utf-8"?>
+<p:sld xmlns:a="http://schemas.openxmlformats.org/drawingml/2006/main" xmlns:r="http://schemas.openxmlformats.org/officeDocument/2006/relationships" xmlns:p="http://schemas.openxmlformats.org/presentationml/2006/main">
+  <p:cSld>
+    <p:spTree>
+      <p:nvGrpSpPr>
+        <p:cNvPr id="1" name=""/>
+        <p:cNvGrpSpPr/>
+        <p:nvPr/>
+      </p:nvGrpSpPr>
+      <p:grpSpPr>
+        <a:xfrm>
+          <a:off x="0" y="0"/>
+          <a:ext cx="0" cy="0"/>
+          <a:chOff x="0" y="0"/>
+          <a:chExt cx="0" cy="0"/>
+        </a:xfrm>
+      </p:grpSpPr>
+      <p:sp>
+        <p:nvSpPr>
           <p:cNvPr id="2" name="Title 1">
             <a:extLst>
               <a:ext uri="{FF2B5EF4-FFF2-40B4-BE49-F238E27FC236}">
@@ -13528,7 +14164,7 @@
 </p:sld>
 </file>
 
-<file path=ppt/slides/slide11.xml><?xml version="1.0" encoding="utf-8"?>
+<file path=ppt/slides/slide12.xml><?xml version="1.0" encoding="utf-8"?>
 <p:sld xmlns:a="http://schemas.openxmlformats.org/drawingml/2006/main" xmlns:r="http://schemas.openxmlformats.org/officeDocument/2006/relationships" xmlns:p="http://schemas.openxmlformats.org/presentationml/2006/main">
   <p:cSld>
     <p:spTree>
@@ -13643,7 +14279,7 @@
 </p:sld>
 </file>
 
-<file path=ppt/slides/slide12.xml><?xml version="1.0" encoding="utf-8"?>
+<file path=ppt/slides/slide13.xml><?xml version="1.0" encoding="utf-8"?>
 <p:sld xmlns:a="http://schemas.openxmlformats.org/drawingml/2006/main" xmlns:r="http://schemas.openxmlformats.org/officeDocument/2006/relationships" xmlns:p="http://schemas.openxmlformats.org/presentationml/2006/main">
   <p:cSld>
     <p:spTree>
@@ -14670,22 +15306,19 @@
         </p:spPr>
         <p:txBody>
           <a:bodyPr>
-            <a:normAutofit/>
+            <a:normAutofit lnSpcReduction="10000"/>
           </a:bodyPr>
           <a:lstStyle/>
           <a:p>
-            <a:pPr>
+            <a:pPr marL="0" indent="0">
               <a:lnSpc>
                 <a:spcPct val="170000"/>
               </a:lnSpc>
+              <a:buNone/>
             </a:pPr>
             <a:r>
-              <a:rPr lang="en-US" b="1" dirty="0"/>
-              <a:t>Sample Collection:</a:t>
-            </a:r>
-            <a:r>
               <a:rPr lang="en-US" dirty="0"/>
-              <a:t> Samples are collected from patients and labeled with unique barcode stickers.</a:t>
+              <a:t>In Hospitals, Samples are collected from patients and labeled with unique barcode stickers.</a:t>
             </a:r>
           </a:p>
           <a:p>
@@ -14715,7 +15348,7 @@
             </a:r>
             <a:r>
               <a:rPr lang="en-US" dirty="0"/>
-              <a:t> High number of samples can cause confusion and mix-ups.</a:t>
+              <a:t> High number of samples can cause confusion and mix-ups, resulting in issuing wrong meds and treatments.</a:t>
             </a:r>
           </a:p>
           <a:p>
@@ -14738,7 +15371,7 @@
                   <a:srgbClr val="FC0000"/>
                 </a:solidFill>
               </a:rPr>
-              <a:t> Visual comparison of barcodes is challenging for lab personnel.</a:t>
+              <a:t> Visual comparison of barcodes is challenging for lab personnel (Or any human for that matter).</a:t>
             </a:r>
             <a:endParaRPr lang="en-IL" dirty="0">
               <a:solidFill>
@@ -24792,7 +25425,13 @@
       </p:grpSpPr>
       <p:sp>
         <p:nvSpPr>
-          <p:cNvPr id="2" name="Title 1"/>
+          <p:cNvPr id="2" name="Title 1">
+            <a:extLst>
+              <a:ext uri="{FF2B5EF4-FFF2-40B4-BE49-F238E27FC236}">
+                <a16:creationId xmlns:a16="http://schemas.microsoft.com/office/drawing/2014/main" id="{473FEFE3-149F-1112-1170-F96254F30946}"/>
+              </a:ext>
+            </a:extLst>
+          </p:cNvPr>
           <p:cNvSpPr>
             <a:spLocks noGrp="1"/>
           </p:cNvSpPr>
@@ -24800,32 +25439,31 @@
             <p:ph type="title"/>
           </p:nvPr>
         </p:nvSpPr>
-        <p:spPr>
-          <a:xfrm>
-            <a:off x="1143001" y="378598"/>
-            <a:ext cx="9905998" cy="1478570"/>
-          </a:xfrm>
-        </p:spPr>
+        <p:spPr/>
         <p:txBody>
           <a:bodyPr/>
           <a:lstStyle/>
           <a:p>
-            <a:pPr algn="ctr"/>
             <a:r>
-              <a:rPr lang="en-US" b="1" dirty="0">
+              <a:rPr lang="en-US" b="1">
+                <a:latin typeface="+mn-lt"/>
                 <a:cs typeface="Arial" panose="020B0604020202020204" pitchFamily="34" charset="0"/>
               </a:rPr>
-              <a:t>ESP32</a:t>
+              <a:t>Communication  Diagram</a:t>
             </a:r>
-            <a:endParaRPr lang="he-IL" b="1" dirty="0">
-              <a:cs typeface="Arial" panose="020B0604020202020204" pitchFamily="34" charset="0"/>
-            </a:endParaRPr>
+            <a:endParaRPr lang="en-IL" dirty="0"/>
           </a:p>
         </p:txBody>
       </p:sp>
       <p:sp>
         <p:nvSpPr>
-          <p:cNvPr id="3" name="Content Placeholder 2"/>
+          <p:cNvPr id="3" name="Content Placeholder 2">
+            <a:extLst>
+              <a:ext uri="{FF2B5EF4-FFF2-40B4-BE49-F238E27FC236}">
+                <a16:creationId xmlns:a16="http://schemas.microsoft.com/office/drawing/2014/main" id="{B8B90EF9-7C90-92CD-CDC3-2F3E5D485A82}"/>
+              </a:ext>
+            </a:extLst>
+          </p:cNvPr>
           <p:cNvSpPr>
             <a:spLocks noGrp="1"/>
           </p:cNvSpPr>
@@ -24833,578 +25471,25 @@
             <p:ph idx="1"/>
           </p:nvPr>
         </p:nvSpPr>
-        <p:spPr>
-          <a:xfrm>
-            <a:off x="998119" y="1981200"/>
-            <a:ext cx="8946541" cy="4876800"/>
-          </a:xfrm>
-        </p:spPr>
+        <p:spPr/>
         <p:txBody>
-          <a:bodyPr>
-            <a:normAutofit/>
-          </a:bodyPr>
+          <a:bodyPr/>
           <a:lstStyle/>
           <a:p>
-            <a:r>
-              <a:rPr lang="en-US" dirty="0">
-                <a:cs typeface="Arial" panose="020B0604020202020204" pitchFamily="34" charset="0"/>
-              </a:rPr>
-              <a:t>Includes many drivers that make programming easier.</a:t>
-            </a:r>
-          </a:p>
-          <a:p>
-            <a:r>
-              <a:rPr lang="en-US" dirty="0">
-                <a:cs typeface="Arial" panose="020B0604020202020204" pitchFamily="34" charset="0"/>
-              </a:rPr>
-              <a:t>Advantages over Arduino nano: speed and memory</a:t>
-            </a:r>
-          </a:p>
-          <a:p>
-            <a:pPr marL="0" indent="0">
-              <a:buNone/>
-            </a:pPr>
-            <a:endParaRPr lang="en-US" dirty="0">
-              <a:cs typeface="Arial" panose="020B0604020202020204" pitchFamily="34" charset="0"/>
-            </a:endParaRPr>
-          </a:p>
-          <a:p>
-            <a:endParaRPr lang="en-US" dirty="0">
-              <a:cs typeface="Arial" panose="020B0604020202020204" pitchFamily="34" charset="0"/>
-            </a:endParaRPr>
-          </a:p>
-          <a:p>
-            <a:pPr marL="0" indent="0">
-              <a:buNone/>
-            </a:pPr>
-            <a:endParaRPr lang="en-US" dirty="0">
-              <a:cs typeface="Arial" panose="020B0604020202020204" pitchFamily="34" charset="0"/>
-            </a:endParaRPr>
-          </a:p>
-          <a:p>
-            <a:pPr marL="0" indent="0">
-              <a:buNone/>
-            </a:pPr>
-            <a:endParaRPr lang="en-US" dirty="0">
-              <a:cs typeface="Arial" panose="020B0604020202020204" pitchFamily="34" charset="0"/>
-            </a:endParaRPr>
-          </a:p>
-          <a:p>
-            <a:r>
-              <a:rPr lang="en-US" dirty="0">
-                <a:cs typeface="Arial" panose="020B0604020202020204" pitchFamily="34" charset="0"/>
-              </a:rPr>
-              <a:t>2 cores.</a:t>
-            </a:r>
+            <a:endParaRPr lang="en-IL"/>
           </a:p>
         </p:txBody>
       </p:sp>
-      <p:graphicFrame>
-        <p:nvGraphicFramePr>
-          <p:cNvPr id="8" name="Table 8">
-            <a:extLst>
-              <a:ext uri="{FF2B5EF4-FFF2-40B4-BE49-F238E27FC236}">
-                <a16:creationId xmlns:a16="http://schemas.microsoft.com/office/drawing/2014/main" id="{3DE114C7-DB38-4EF0-91F4-07D34D224E4E}"/>
-              </a:ext>
-            </a:extLst>
-          </p:cNvPr>
-          <p:cNvGraphicFramePr>
-            <a:graphicFrameLocks noGrp="1"/>
-          </p:cNvGraphicFramePr>
-          <p:nvPr>
-            <p:extLst>
-              <p:ext uri="{D42A27DB-BD31-4B8C-83A1-F6EECF244321}">
-                <p14:modId xmlns:p14="http://schemas.microsoft.com/office/powerpoint/2010/main" val="1210740900"/>
-              </p:ext>
-            </p:extLst>
-          </p:nvPr>
-        </p:nvGraphicFramePr>
-        <p:xfrm>
-          <a:off x="1455577" y="3429000"/>
-          <a:ext cx="6876870" cy="1651000"/>
-        </p:xfrm>
-        <a:graphic>
-          <a:graphicData uri="http://schemas.openxmlformats.org/drawingml/2006/table">
-            <a:tbl>
-              <a:tblPr firstRow="1" bandRow="1">
-                <a:tableStyleId>{073A0DAA-6AF3-43AB-8588-CEC1D06C72B9}</a:tableStyleId>
-              </a:tblPr>
-              <a:tblGrid>
-                <a:gridCol w="2292290">
-                  <a:extLst>
-                    <a:ext uri="{9D8B030D-6E8A-4147-A177-3AD203B41FA5}">
-                      <a16:colId xmlns:a16="http://schemas.microsoft.com/office/drawing/2014/main" val="3152711524"/>
-                    </a:ext>
-                  </a:extLst>
-                </a:gridCol>
-                <a:gridCol w="2292290">
-                  <a:extLst>
-                    <a:ext uri="{9D8B030D-6E8A-4147-A177-3AD203B41FA5}">
-                      <a16:colId xmlns:a16="http://schemas.microsoft.com/office/drawing/2014/main" val="4131672903"/>
-                    </a:ext>
-                  </a:extLst>
-                </a:gridCol>
-                <a:gridCol w="2292290">
-                  <a:extLst>
-                    <a:ext uri="{9D8B030D-6E8A-4147-A177-3AD203B41FA5}">
-                      <a16:colId xmlns:a16="http://schemas.microsoft.com/office/drawing/2014/main" val="2419015053"/>
-                    </a:ext>
-                  </a:extLst>
-                </a:gridCol>
-              </a:tblGrid>
-              <a:tr h="0">
-                <a:tc>
-                  <a:txBody>
-                    <a:bodyPr/>
-                    <a:lstStyle/>
-                    <a:p>
-                      <a:endParaRPr lang="en-US" dirty="0">
-                        <a:latin typeface="Arial" panose="020B0604020202020204" pitchFamily="34" charset="0"/>
-                        <a:cs typeface="Arial" panose="020B0604020202020204" pitchFamily="34" charset="0"/>
-                      </a:endParaRPr>
-                    </a:p>
-                  </a:txBody>
-                  <a:tcPr/>
-                </a:tc>
-                <a:tc>
-                  <a:txBody>
-                    <a:bodyPr/>
-                    <a:lstStyle/>
-                    <a:p>
-                      <a:r>
-                        <a:rPr lang="en-US" dirty="0"/>
-                        <a:t>ESP32</a:t>
-                      </a:r>
-                      <a:endParaRPr lang="en-US" dirty="0">
-                        <a:latin typeface="Arial" panose="020B0604020202020204" pitchFamily="34" charset="0"/>
-                        <a:cs typeface="Arial" panose="020B0604020202020204" pitchFamily="34" charset="0"/>
-                      </a:endParaRPr>
-                    </a:p>
-                  </a:txBody>
-                  <a:tcPr/>
-                </a:tc>
-                <a:tc>
-                  <a:txBody>
-                    <a:bodyPr/>
-                    <a:lstStyle/>
-                    <a:p>
-                      <a:r>
-                        <a:rPr lang="en-US" dirty="0"/>
-                        <a:t>Arduino nano</a:t>
-                      </a:r>
-                      <a:endParaRPr lang="en-US" dirty="0">
-                        <a:latin typeface="Arial" panose="020B0604020202020204" pitchFamily="34" charset="0"/>
-                        <a:cs typeface="Arial" panose="020B0604020202020204" pitchFamily="34" charset="0"/>
-                      </a:endParaRPr>
-                    </a:p>
-                  </a:txBody>
-                  <a:tcPr/>
-                </a:tc>
-                <a:extLst>
-                  <a:ext uri="{0D108BD9-81ED-4DB2-BD59-A6C34878D82A}">
-                    <a16:rowId xmlns:a16="http://schemas.microsoft.com/office/drawing/2014/main" val="1520508676"/>
-                  </a:ext>
-                </a:extLst>
-              </a:tr>
-              <a:tr h="370840">
-                <a:tc>
-                  <a:txBody>
-                    <a:bodyPr/>
-                    <a:lstStyle/>
-                    <a:p>
-                      <a:r>
-                        <a:rPr lang="en-US" dirty="0"/>
-                        <a:t>Clock rate</a:t>
-                      </a:r>
-                      <a:endParaRPr lang="en-US" dirty="0">
-                        <a:latin typeface="Arial" panose="020B0604020202020204" pitchFamily="34" charset="0"/>
-                        <a:cs typeface="Arial" panose="020B0604020202020204" pitchFamily="34" charset="0"/>
-                      </a:endParaRPr>
-                    </a:p>
-                  </a:txBody>
-                  <a:tcPr/>
-                </a:tc>
-                <a:tc>
-                  <a:txBody>
-                    <a:bodyPr/>
-                    <a:lstStyle/>
-                    <a:p>
-                      <a:r>
-                        <a:rPr lang="en-US" sz="1800" b="0" kern="1200" dirty="0">
-                          <a:solidFill>
-                            <a:schemeClr val="dk1"/>
-                          </a:solidFill>
-                          <a:effectLst/>
-                        </a:rPr>
-                        <a:t>80 MHz</a:t>
-                      </a:r>
-                      <a:endParaRPr lang="en-US" dirty="0">
-                        <a:latin typeface="Arial" panose="020B0604020202020204" pitchFamily="34" charset="0"/>
-                        <a:cs typeface="Arial" panose="020B0604020202020204" pitchFamily="34" charset="0"/>
-                      </a:endParaRPr>
-                    </a:p>
-                  </a:txBody>
-                  <a:tcPr/>
-                </a:tc>
-                <a:tc>
-                  <a:txBody>
-                    <a:bodyPr/>
-                    <a:lstStyle/>
-                    <a:p>
-                      <a:r>
-                        <a:rPr lang="en-US" dirty="0"/>
-                        <a:t>16 MHz</a:t>
-                      </a:r>
-                      <a:endParaRPr lang="en-US" dirty="0">
-                        <a:latin typeface="Arial" panose="020B0604020202020204" pitchFamily="34" charset="0"/>
-                        <a:cs typeface="Arial" panose="020B0604020202020204" pitchFamily="34" charset="0"/>
-                      </a:endParaRPr>
-                    </a:p>
-                  </a:txBody>
-                  <a:tcPr/>
-                </a:tc>
-                <a:extLst>
-                  <a:ext uri="{0D108BD9-81ED-4DB2-BD59-A6C34878D82A}">
-                    <a16:rowId xmlns:a16="http://schemas.microsoft.com/office/drawing/2014/main" val="2581021940"/>
-                  </a:ext>
-                </a:extLst>
-              </a:tr>
-              <a:tr h="370840">
-                <a:tc>
-                  <a:txBody>
-                    <a:bodyPr/>
-                    <a:lstStyle/>
-                    <a:p>
-                      <a:r>
-                        <a:rPr lang="en-US" dirty="0"/>
-                        <a:t>Memory size</a:t>
-                      </a:r>
-                      <a:endParaRPr lang="en-US" dirty="0">
-                        <a:latin typeface="Arial" panose="020B0604020202020204" pitchFamily="34" charset="0"/>
-                        <a:cs typeface="Arial" panose="020B0604020202020204" pitchFamily="34" charset="0"/>
-                      </a:endParaRPr>
-                    </a:p>
-                  </a:txBody>
-                  <a:tcPr/>
-                </a:tc>
-                <a:tc>
-                  <a:txBody>
-                    <a:bodyPr/>
-                    <a:lstStyle/>
-                    <a:p>
-                      <a:r>
-                        <a:rPr lang="en-US" sz="1800" b="0" kern="1200" dirty="0">
-                          <a:solidFill>
-                            <a:schemeClr val="dk1"/>
-                          </a:solidFill>
-                          <a:effectLst/>
-                        </a:rPr>
-                        <a:t>520 KB SRAM</a:t>
-                      </a:r>
-                    </a:p>
-                    <a:p>
-                      <a:r>
-                        <a:rPr lang="en-US" sz="1800" b="0" kern="1200" dirty="0">
-                          <a:solidFill>
-                            <a:schemeClr val="dk1"/>
-                          </a:solidFill>
-                          <a:effectLst/>
-                        </a:rPr>
-                        <a:t>4 MB flash memory</a:t>
-                      </a:r>
-                    </a:p>
-                    <a:p>
-                      <a:endParaRPr lang="en-US" dirty="0">
-                        <a:latin typeface="Arial" panose="020B0604020202020204" pitchFamily="34" charset="0"/>
-                        <a:cs typeface="Arial" panose="020B0604020202020204" pitchFamily="34" charset="0"/>
-                      </a:endParaRPr>
-                    </a:p>
-                  </a:txBody>
-                  <a:tcPr/>
-                </a:tc>
-                <a:tc>
-                  <a:txBody>
-                    <a:bodyPr/>
-                    <a:lstStyle/>
-                    <a:p>
-                      <a:r>
-                        <a:rPr lang="en-US" dirty="0"/>
-                        <a:t>2 KB SRAM</a:t>
-                      </a:r>
-                    </a:p>
-                    <a:p>
-                      <a:r>
-                        <a:rPr lang="en-US" sz="1800" b="0" kern="1200" dirty="0">
-                          <a:solidFill>
-                            <a:schemeClr val="dk1"/>
-                          </a:solidFill>
-                          <a:effectLst/>
-                        </a:rPr>
-                        <a:t>32 KB flash </a:t>
-                      </a:r>
-                      <a:endParaRPr lang="en-US" sz="1800" b="0" i="0" kern="1200" dirty="0">
-                        <a:solidFill>
-                          <a:schemeClr val="dk1"/>
-                        </a:solidFill>
-                        <a:effectLst/>
-                        <a:latin typeface="Arial" panose="020B0604020202020204" pitchFamily="34" charset="0"/>
-                        <a:ea typeface="+mn-ea"/>
-                        <a:cs typeface="Arial" panose="020B0604020202020204" pitchFamily="34" charset="0"/>
-                      </a:endParaRPr>
-                    </a:p>
-                  </a:txBody>
-                  <a:tcPr/>
-                </a:tc>
-                <a:extLst>
-                  <a:ext uri="{0D108BD9-81ED-4DB2-BD59-A6C34878D82A}">
-                    <a16:rowId xmlns:a16="http://schemas.microsoft.com/office/drawing/2014/main" val="1915485891"/>
-                  </a:ext>
-                </a:extLst>
-              </a:tr>
-            </a:tbl>
-          </a:graphicData>
-        </a:graphic>
-      </p:graphicFrame>
-      <p:pic>
-        <p:nvPicPr>
-          <p:cNvPr id="2050" name="Picture 2" descr="ESP32-DEVKITC-32D Espressif Systems | RF/IF ו- RFID | DigiKey">
-            <a:extLst>
-              <a:ext uri="{FF2B5EF4-FFF2-40B4-BE49-F238E27FC236}">
-                <a16:creationId xmlns:a16="http://schemas.microsoft.com/office/drawing/2014/main" id="{3C58C095-129A-45B6-A3E9-361FCE6FC02A}"/>
-              </a:ext>
-            </a:extLst>
-          </p:cNvPr>
-          <p:cNvPicPr>
-            <a:picLocks noChangeAspect="1" noChangeArrowheads="1"/>
-          </p:cNvPicPr>
-          <p:nvPr/>
-        </p:nvPicPr>
-        <p:blipFill>
-          <a:blip r:embed="rId2">
-            <a:extLst>
-              <a:ext uri="{28A0092B-C50C-407E-A947-70E740481C1C}">
-                <a14:useLocalDpi xmlns:a14="http://schemas.microsoft.com/office/drawing/2010/main" val="0"/>
-              </a:ext>
-            </a:extLst>
-          </a:blip>
-          <a:srcRect/>
-          <a:stretch>
-            <a:fillRect/>
-          </a:stretch>
-        </p:blipFill>
-        <p:spPr bwMode="auto">
-          <a:xfrm>
-            <a:off x="8653272" y="1857168"/>
-            <a:ext cx="3324492" cy="2903745"/>
-          </a:xfrm>
-          <a:prstGeom prst="roundRect">
-            <a:avLst>
-              <a:gd name="adj" fmla="val 8594"/>
-            </a:avLst>
-          </a:prstGeom>
-          <a:solidFill>
-            <a:srgbClr val="FFFFFF">
-              <a:shade val="85000"/>
-            </a:srgbClr>
-          </a:solidFill>
-          <a:ln>
-            <a:noFill/>
-          </a:ln>
-          <a:effectLst>
-            <a:reflection blurRad="12700" stA="38000" endPos="28000" dist="5000" dir="5400000" sy="-100000" algn="bl" rotWithShape="0"/>
-          </a:effectLst>
-        </p:spPr>
-      </p:pic>
     </p:spTree>
     <p:extLst>
       <p:ext uri="{BB962C8B-B14F-4D97-AF65-F5344CB8AC3E}">
-        <p14:creationId xmlns:p14="http://schemas.microsoft.com/office/powerpoint/2010/main" val="2432230716"/>
+        <p14:creationId xmlns:p14="http://schemas.microsoft.com/office/powerpoint/2010/main" val="1733496395"/>
       </p:ext>
     </p:extLst>
   </p:cSld>
   <p:clrMapOvr>
     <a:masterClrMapping/>
   </p:clrMapOvr>
-  <p:timing>
-    <p:tnLst>
-      <p:par>
-        <p:cTn id="1" dur="indefinite" restart="never" nodeType="tmRoot">
-          <p:childTnLst>
-            <p:seq concurrent="1" nextAc="seek">
-              <p:cTn id="2" dur="indefinite" nodeType="mainSeq">
-                <p:childTnLst>
-                  <p:par>
-                    <p:cTn id="3" fill="hold">
-                      <p:stCondLst>
-                        <p:cond delay="indefinite"/>
-                      </p:stCondLst>
-                      <p:childTnLst>
-                        <p:par>
-                          <p:cTn id="4" fill="hold">
-                            <p:stCondLst>
-                              <p:cond delay="0"/>
-                            </p:stCondLst>
-                            <p:childTnLst>
-                              <p:par>
-                                <p:cTn id="5" presetID="1" presetClass="entr" presetSubtype="0" fill="hold" grpId="0" nodeType="clickEffect">
-                                  <p:stCondLst>
-                                    <p:cond delay="0"/>
-                                  </p:stCondLst>
-                                  <p:childTnLst>
-                                    <p:set>
-                                      <p:cBhvr>
-                                        <p:cTn id="6" dur="1" fill="hold">
-                                          <p:stCondLst>
-                                            <p:cond delay="0"/>
-                                          </p:stCondLst>
-                                        </p:cTn>
-                                        <p:tgtEl>
-                                          <p:spTgt spid="3">
-                                            <p:txEl>
-                                              <p:pRg st="0" end="0"/>
-                                            </p:txEl>
-                                          </p:spTgt>
-                                        </p:tgtEl>
-                                        <p:attrNameLst>
-                                          <p:attrName>style.visibility</p:attrName>
-                                        </p:attrNameLst>
-                                      </p:cBhvr>
-                                      <p:to>
-                                        <p:strVal val="visible"/>
-                                      </p:to>
-                                    </p:set>
-                                  </p:childTnLst>
-                                </p:cTn>
-                              </p:par>
-                            </p:childTnLst>
-                          </p:cTn>
-                        </p:par>
-                      </p:childTnLst>
-                    </p:cTn>
-                  </p:par>
-                  <p:par>
-                    <p:cTn id="7" fill="hold">
-                      <p:stCondLst>
-                        <p:cond delay="indefinite"/>
-                      </p:stCondLst>
-                      <p:childTnLst>
-                        <p:par>
-                          <p:cTn id="8" fill="hold">
-                            <p:stCondLst>
-                              <p:cond delay="0"/>
-                            </p:stCondLst>
-                            <p:childTnLst>
-                              <p:par>
-                                <p:cTn id="9" presetID="1" presetClass="entr" presetSubtype="0" fill="hold" grpId="0" nodeType="clickEffect">
-                                  <p:stCondLst>
-                                    <p:cond delay="0"/>
-                                  </p:stCondLst>
-                                  <p:childTnLst>
-                                    <p:set>
-                                      <p:cBhvr>
-                                        <p:cTn id="10" dur="1" fill="hold">
-                                          <p:stCondLst>
-                                            <p:cond delay="0"/>
-                                          </p:stCondLst>
-                                        </p:cTn>
-                                        <p:tgtEl>
-                                          <p:spTgt spid="3">
-                                            <p:txEl>
-                                              <p:pRg st="1" end="1"/>
-                                            </p:txEl>
-                                          </p:spTgt>
-                                        </p:tgtEl>
-                                        <p:attrNameLst>
-                                          <p:attrName>style.visibility</p:attrName>
-                                        </p:attrNameLst>
-                                      </p:cBhvr>
-                                      <p:to>
-                                        <p:strVal val="visible"/>
-                                      </p:to>
-                                    </p:set>
-                                  </p:childTnLst>
-                                </p:cTn>
-                              </p:par>
-                            </p:childTnLst>
-                          </p:cTn>
-                        </p:par>
-                      </p:childTnLst>
-                    </p:cTn>
-                  </p:par>
-                  <p:par>
-                    <p:cTn id="11" fill="hold">
-                      <p:stCondLst>
-                        <p:cond delay="indefinite"/>
-                      </p:stCondLst>
-                      <p:childTnLst>
-                        <p:par>
-                          <p:cTn id="12" fill="hold">
-                            <p:stCondLst>
-                              <p:cond delay="0"/>
-                            </p:stCondLst>
-                            <p:childTnLst>
-                              <p:par>
-                                <p:cTn id="13" presetID="1" presetClass="entr" presetSubtype="0" fill="hold" grpId="0" nodeType="clickEffect">
-                                  <p:stCondLst>
-                                    <p:cond delay="0"/>
-                                  </p:stCondLst>
-                                  <p:childTnLst>
-                                    <p:set>
-                                      <p:cBhvr>
-                                        <p:cTn id="14" dur="1" fill="hold">
-                                          <p:stCondLst>
-                                            <p:cond delay="0"/>
-                                          </p:stCondLst>
-                                        </p:cTn>
-                                        <p:tgtEl>
-                                          <p:spTgt spid="3">
-                                            <p:txEl>
-                                              <p:pRg st="6" end="6"/>
-                                            </p:txEl>
-                                          </p:spTgt>
-                                        </p:tgtEl>
-                                        <p:attrNameLst>
-                                          <p:attrName>style.visibility</p:attrName>
-                                        </p:attrNameLst>
-                                      </p:cBhvr>
-                                      <p:to>
-                                        <p:strVal val="visible"/>
-                                      </p:to>
-                                    </p:set>
-                                  </p:childTnLst>
-                                </p:cTn>
-                              </p:par>
-                            </p:childTnLst>
-                          </p:cTn>
-                        </p:par>
-                      </p:childTnLst>
-                    </p:cTn>
-                  </p:par>
-                </p:childTnLst>
-              </p:cTn>
-              <p:prevCondLst>
-                <p:cond evt="onPrev" delay="0">
-                  <p:tgtEl>
-                    <p:sldTgt/>
-                  </p:tgtEl>
-                </p:cond>
-              </p:prevCondLst>
-              <p:nextCondLst>
-                <p:cond evt="onNext" delay="0">
-                  <p:tgtEl>
-                    <p:sldTgt/>
-                  </p:tgtEl>
-                </p:cond>
-              </p:nextCondLst>
-            </p:seq>
-          </p:childTnLst>
-        </p:cTn>
-      </p:par>
-    </p:tnLst>
-    <p:bldLst>
-      <p:bldP spid="3" grpId="0" build="p"/>
-    </p:bldLst>
-  </p:timing>
 </p:sld>
 </file>
 

</xml_diff>

<commit_message>
update work mod diagram
</commit_message>
<xml_diff>
--- a/Presntations/Midterm presentation IOT Barcode checker 7681.pptx
+++ b/Presntations/Midterm presentation IOT Barcode checker 7681.pptx
@@ -5,7 +5,7 @@
     <p:sldMasterId id="2147483726" r:id="rId1"/>
   </p:sldMasterIdLst>
   <p:notesMasterIdLst>
-    <p:notesMasterId r:id="rId15"/>
+    <p:notesMasterId r:id="rId17"/>
   </p:notesMasterIdLst>
   <p:sldIdLst>
     <p:sldId id="256" r:id="rId2"/>
@@ -17,10 +17,12 @@
     <p:sldId id="282" r:id="rId8"/>
     <p:sldId id="280" r:id="rId9"/>
     <p:sldId id="284" r:id="rId10"/>
-    <p:sldId id="270" r:id="rId11"/>
-    <p:sldId id="260" r:id="rId12"/>
-    <p:sldId id="275" r:id="rId13"/>
-    <p:sldId id="276" r:id="rId14"/>
+    <p:sldId id="285" r:id="rId11"/>
+    <p:sldId id="286" r:id="rId12"/>
+    <p:sldId id="270" r:id="rId13"/>
+    <p:sldId id="260" r:id="rId14"/>
+    <p:sldId id="275" r:id="rId15"/>
+    <p:sldId id="276" r:id="rId16"/>
   </p:sldIdLst>
   <p:sldSz cx="12192000" cy="6858000"/>
   <p:notesSz cx="6858000" cy="9144000"/>
@@ -766,7 +768,7 @@
           <a:p>
             <a:fld id="{4966AAC7-B74A-48E8-841A-BDDA799A8381}" type="slidenum">
               <a:rPr lang="en-IL" smtClean="0"/>
-              <a:t>12</a:t>
+              <a:t>14</a:t>
             </a:fld>
             <a:endParaRPr lang="en-IL"/>
           </a:p>
@@ -835,7 +837,7 @@
           <a:noFill/>
           <a:extLst>
             <a:ext uri="{909E8E84-426E-40dd-AFC4-6F175D3DCCD1}">
-              <a14:hiddenFill xmlns="" xmlns:a14="http://schemas.microsoft.com/office/drawing/2010/main">
+              <a14:hiddenFill xmlns:a14="http://schemas.microsoft.com/office/drawing/2010/main" xmlns="">
                 <a:solidFill>
                   <a:srgbClr val="FFFFFF"/>
                 </a:solidFill>
@@ -895,7 +897,7 @@
             </a:ln>
             <a:extLst>
               <a:ext uri="{91240B29-F687-4f45-9708-019B960494DF}">
-                <a14:hiddenLine xmlns="" xmlns:a14="http://schemas.microsoft.com/office/drawing/2010/main" w="9525">
+                <a14:hiddenLine xmlns:a14="http://schemas.microsoft.com/office/drawing/2010/main" xmlns="" w="9525">
                   <a:solidFill>
                     <a:srgbClr val="000000"/>
                   </a:solidFill>
@@ -985,7 +987,7 @@
             </a:ln>
             <a:extLst>
               <a:ext uri="{91240B29-F687-4f45-9708-019B960494DF}">
-                <a14:hiddenLine xmlns="" xmlns:a14="http://schemas.microsoft.com/office/drawing/2010/main" w="9525">
+                <a14:hiddenLine xmlns:a14="http://schemas.microsoft.com/office/drawing/2010/main" xmlns="" w="9525">
                   <a:solidFill>
                     <a:srgbClr val="000000"/>
                   </a:solidFill>
@@ -1075,7 +1077,7 @@
             </a:ln>
             <a:extLst>
               <a:ext uri="{91240B29-F687-4f45-9708-019B960494DF}">
-                <a14:hiddenLine xmlns="" xmlns:a14="http://schemas.microsoft.com/office/drawing/2010/main" w="9525">
+                <a14:hiddenLine xmlns:a14="http://schemas.microsoft.com/office/drawing/2010/main" xmlns="" w="9525">
                   <a:solidFill>
                     <a:srgbClr val="000000"/>
                   </a:solidFill>
@@ -1109,7 +1111,7 @@
             </a:ln>
             <a:extLst>
               <a:ext uri="{91240B29-F687-4f45-9708-019B960494DF}">
-                <a14:hiddenLine xmlns="" xmlns:a14="http://schemas.microsoft.com/office/drawing/2010/main" w="9525">
+                <a14:hiddenLine xmlns:a14="http://schemas.microsoft.com/office/drawing/2010/main" xmlns="" w="9525">
                   <a:solidFill>
                     <a:srgbClr val="000000"/>
                   </a:solidFill>
@@ -1199,7 +1201,7 @@
             </a:ln>
             <a:extLst>
               <a:ext uri="{91240B29-F687-4f45-9708-019B960494DF}">
-                <a14:hiddenLine xmlns="" xmlns:a14="http://schemas.microsoft.com/office/drawing/2010/main" w="9525">
+                <a14:hiddenLine xmlns:a14="http://schemas.microsoft.com/office/drawing/2010/main" xmlns="" w="9525">
                   <a:solidFill>
                     <a:srgbClr val="000000"/>
                   </a:solidFill>
@@ -1261,7 +1263,7 @@
             </a:ln>
             <a:extLst>
               <a:ext uri="{91240B29-F687-4f45-9708-019B960494DF}">
-                <a14:hiddenLine xmlns="" xmlns:a14="http://schemas.microsoft.com/office/drawing/2010/main" w="9525">
+                <a14:hiddenLine xmlns:a14="http://schemas.microsoft.com/office/drawing/2010/main" xmlns="" w="9525">
                   <a:solidFill>
                     <a:srgbClr val="000000"/>
                   </a:solidFill>
@@ -1323,7 +1325,7 @@
             </a:ln>
             <a:extLst>
               <a:ext uri="{91240B29-F687-4f45-9708-019B960494DF}">
-                <a14:hiddenLine xmlns="" xmlns:a14="http://schemas.microsoft.com/office/drawing/2010/main" w="9525">
+                <a14:hiddenLine xmlns:a14="http://schemas.microsoft.com/office/drawing/2010/main" xmlns="" w="9525">
                   <a:solidFill>
                     <a:srgbClr val="000000"/>
                   </a:solidFill>
@@ -1413,7 +1415,7 @@
             </a:ln>
             <a:extLst>
               <a:ext uri="{91240B29-F687-4f45-9708-019B960494DF}">
-                <a14:hiddenLine xmlns="" xmlns:a14="http://schemas.microsoft.com/office/drawing/2010/main" w="9525">
+                <a14:hiddenLine xmlns:a14="http://schemas.microsoft.com/office/drawing/2010/main" xmlns="" w="9525">
                   <a:solidFill>
                     <a:srgbClr val="000000"/>
                   </a:solidFill>
@@ -1475,7 +1477,7 @@
             </a:ln>
             <a:extLst>
               <a:ext uri="{91240B29-F687-4f45-9708-019B960494DF}">
-                <a14:hiddenLine xmlns="" xmlns:a14="http://schemas.microsoft.com/office/drawing/2010/main" w="9525">
+                <a14:hiddenLine xmlns:a14="http://schemas.microsoft.com/office/drawing/2010/main" xmlns="" w="9525">
                   <a:solidFill>
                     <a:srgbClr val="000000"/>
                   </a:solidFill>
@@ -1537,7 +1539,7 @@
             </a:ln>
             <a:extLst>
               <a:ext uri="{91240B29-F687-4f45-9708-019B960494DF}">
-                <a14:hiddenLine xmlns="" xmlns:a14="http://schemas.microsoft.com/office/drawing/2010/main" w="9525">
+                <a14:hiddenLine xmlns:a14="http://schemas.microsoft.com/office/drawing/2010/main" xmlns="" w="9525">
                   <a:solidFill>
                     <a:srgbClr val="000000"/>
                   </a:solidFill>
@@ -1627,7 +1629,7 @@
             </a:ln>
             <a:extLst>
               <a:ext uri="{91240B29-F687-4f45-9708-019B960494DF}">
-                <a14:hiddenLine xmlns="" xmlns:a14="http://schemas.microsoft.com/office/drawing/2010/main" w="9525">
+                <a14:hiddenLine xmlns:a14="http://schemas.microsoft.com/office/drawing/2010/main" xmlns="" w="9525">
                   <a:solidFill>
                     <a:srgbClr val="000000"/>
                   </a:solidFill>
@@ -1717,7 +1719,7 @@
             </a:ln>
             <a:extLst>
               <a:ext uri="{91240B29-F687-4f45-9708-019B960494DF}">
-                <a14:hiddenLine xmlns="" xmlns:a14="http://schemas.microsoft.com/office/drawing/2010/main" w="9525">
+                <a14:hiddenLine xmlns:a14="http://schemas.microsoft.com/office/drawing/2010/main" xmlns="" w="9525">
                   <a:solidFill>
                     <a:srgbClr val="000000"/>
                   </a:solidFill>
@@ -1779,7 +1781,7 @@
             </a:ln>
             <a:extLst>
               <a:ext uri="{91240B29-F687-4f45-9708-019B960494DF}">
-                <a14:hiddenLine xmlns="" xmlns:a14="http://schemas.microsoft.com/office/drawing/2010/main" w="9525">
+                <a14:hiddenLine xmlns:a14="http://schemas.microsoft.com/office/drawing/2010/main" xmlns="" w="9525">
                   <a:solidFill>
                     <a:srgbClr val="000000"/>
                   </a:solidFill>
@@ -1889,7 +1891,7 @@
             </a:ln>
             <a:extLst>
               <a:ext uri="{91240B29-F687-4f45-9708-019B960494DF}">
-                <a14:hiddenLine xmlns="" xmlns:a14="http://schemas.microsoft.com/office/drawing/2010/main" w="9525">
+                <a14:hiddenLine xmlns:a14="http://schemas.microsoft.com/office/drawing/2010/main" xmlns="" w="9525">
                   <a:solidFill>
                     <a:srgbClr val="000000"/>
                   </a:solidFill>
@@ -1951,7 +1953,7 @@
             </a:ln>
             <a:extLst>
               <a:ext uri="{91240B29-F687-4f45-9708-019B960494DF}">
-                <a14:hiddenLine xmlns="" xmlns:a14="http://schemas.microsoft.com/office/drawing/2010/main" w="9525">
+                <a14:hiddenLine xmlns:a14="http://schemas.microsoft.com/office/drawing/2010/main" xmlns="" w="9525">
                   <a:solidFill>
                     <a:srgbClr val="000000"/>
                   </a:solidFill>
@@ -2041,7 +2043,7 @@
             </a:ln>
             <a:extLst>
               <a:ext uri="{91240B29-F687-4f45-9708-019B960494DF}">
-                <a14:hiddenLine xmlns="" xmlns:a14="http://schemas.microsoft.com/office/drawing/2010/main" w="9525">
+                <a14:hiddenLine xmlns:a14="http://schemas.microsoft.com/office/drawing/2010/main" xmlns="" w="9525">
                   <a:solidFill>
                     <a:srgbClr val="000000"/>
                   </a:solidFill>
@@ -2131,7 +2133,7 @@
             </a:ln>
             <a:extLst>
               <a:ext uri="{91240B29-F687-4f45-9708-019B960494DF}">
-                <a14:hiddenLine xmlns="" xmlns:a14="http://schemas.microsoft.com/office/drawing/2010/main" w="9525">
+                <a14:hiddenLine xmlns:a14="http://schemas.microsoft.com/office/drawing/2010/main" xmlns="" w="9525">
                   <a:solidFill>
                     <a:srgbClr val="000000"/>
                   </a:solidFill>
@@ -2193,7 +2195,7 @@
             </a:ln>
             <a:extLst>
               <a:ext uri="{91240B29-F687-4f45-9708-019B960494DF}">
-                <a14:hiddenLine xmlns="" xmlns:a14="http://schemas.microsoft.com/office/drawing/2010/main" w="9525">
+                <a14:hiddenLine xmlns:a14="http://schemas.microsoft.com/office/drawing/2010/main" xmlns="" w="9525">
                   <a:solidFill>
                     <a:srgbClr val="000000"/>
                   </a:solidFill>
@@ -2283,7 +2285,7 @@
             </a:ln>
             <a:extLst>
               <a:ext uri="{91240B29-F687-4f45-9708-019B960494DF}">
-                <a14:hiddenLine xmlns="" xmlns:a14="http://schemas.microsoft.com/office/drawing/2010/main" w="9525">
+                <a14:hiddenLine xmlns:a14="http://schemas.microsoft.com/office/drawing/2010/main" xmlns="" w="9525">
                   <a:solidFill>
                     <a:srgbClr val="000000"/>
                   </a:solidFill>
@@ -2373,7 +2375,7 @@
             </a:ln>
             <a:extLst>
               <a:ext uri="{91240B29-F687-4f45-9708-019B960494DF}">
-                <a14:hiddenLine xmlns="" xmlns:a14="http://schemas.microsoft.com/office/drawing/2010/main" w="9525">
+                <a14:hiddenLine xmlns:a14="http://schemas.microsoft.com/office/drawing/2010/main" xmlns="" w="9525">
                   <a:solidFill>
                     <a:srgbClr val="000000"/>
                   </a:solidFill>
@@ -2429,7 +2431,7 @@
             </a:ln>
             <a:extLst>
               <a:ext uri="{91240B29-F687-4f45-9708-019B960494DF}">
-                <a14:hiddenLine xmlns="" xmlns:a14="http://schemas.microsoft.com/office/drawing/2010/main" w="9525">
+                <a14:hiddenLine xmlns:a14="http://schemas.microsoft.com/office/drawing/2010/main" xmlns="" w="9525">
                   <a:solidFill>
                     <a:srgbClr val="000000"/>
                   </a:solidFill>
@@ -2519,7 +2521,7 @@
             </a:ln>
             <a:extLst>
               <a:ext uri="{91240B29-F687-4f45-9708-019B960494DF}">
-                <a14:hiddenLine xmlns="" xmlns:a14="http://schemas.microsoft.com/office/drawing/2010/main" w="9525">
+                <a14:hiddenLine xmlns:a14="http://schemas.microsoft.com/office/drawing/2010/main" xmlns="" w="9525">
                   <a:solidFill>
                     <a:srgbClr val="000000"/>
                   </a:solidFill>
@@ -2575,7 +2577,7 @@
             </a:ln>
             <a:extLst>
               <a:ext uri="{91240B29-F687-4f45-9708-019B960494DF}">
-                <a14:hiddenLine xmlns="" xmlns:a14="http://schemas.microsoft.com/office/drawing/2010/main" w="9525">
+                <a14:hiddenLine xmlns:a14="http://schemas.microsoft.com/office/drawing/2010/main" xmlns="" w="9525">
                   <a:solidFill>
                     <a:srgbClr val="000000"/>
                   </a:solidFill>
@@ -2665,7 +2667,7 @@
             </a:ln>
             <a:extLst>
               <a:ext uri="{91240B29-F687-4f45-9708-019B960494DF}">
-                <a14:hiddenLine xmlns="" xmlns:a14="http://schemas.microsoft.com/office/drawing/2010/main" w="9525">
+                <a14:hiddenLine xmlns:a14="http://schemas.microsoft.com/office/drawing/2010/main" xmlns="" w="9525">
                   <a:solidFill>
                     <a:srgbClr val="000000"/>
                   </a:solidFill>
@@ -2733,7 +2735,7 @@
             </a:ln>
             <a:extLst>
               <a:ext uri="{91240B29-F687-4f45-9708-019B960494DF}">
-                <a14:hiddenLine xmlns="" xmlns:a14="http://schemas.microsoft.com/office/drawing/2010/main" w="9525">
+                <a14:hiddenLine xmlns:a14="http://schemas.microsoft.com/office/drawing/2010/main" xmlns="" w="9525">
                   <a:solidFill>
                     <a:srgbClr val="000000"/>
                   </a:solidFill>
@@ -2823,7 +2825,7 @@
             </a:ln>
             <a:extLst>
               <a:ext uri="{91240B29-F687-4f45-9708-019B960494DF}">
-                <a14:hiddenLine xmlns="" xmlns:a14="http://schemas.microsoft.com/office/drawing/2010/main" w="9525">
+                <a14:hiddenLine xmlns:a14="http://schemas.microsoft.com/office/drawing/2010/main" xmlns="" w="9525">
                   <a:solidFill>
                     <a:srgbClr val="000000"/>
                   </a:solidFill>
@@ -2891,7 +2893,7 @@
             </a:ln>
             <a:extLst>
               <a:ext uri="{91240B29-F687-4f45-9708-019B960494DF}">
-                <a14:hiddenLine xmlns="" xmlns:a14="http://schemas.microsoft.com/office/drawing/2010/main" w="9525">
+                <a14:hiddenLine xmlns:a14="http://schemas.microsoft.com/office/drawing/2010/main" xmlns="" w="9525">
                   <a:solidFill>
                     <a:srgbClr val="000000"/>
                   </a:solidFill>
@@ -2981,7 +2983,7 @@
             </a:ln>
             <a:extLst>
               <a:ext uri="{91240B29-F687-4f45-9708-019B960494DF}">
-                <a14:hiddenLine xmlns="" xmlns:a14="http://schemas.microsoft.com/office/drawing/2010/main" w="9525">
+                <a14:hiddenLine xmlns:a14="http://schemas.microsoft.com/office/drawing/2010/main" xmlns="" w="9525">
                   <a:solidFill>
                     <a:srgbClr val="000000"/>
                   </a:solidFill>
@@ -3015,7 +3017,7 @@
             </a:ln>
             <a:extLst>
               <a:ext uri="{91240B29-F687-4f45-9708-019B960494DF}">
-                <a14:hiddenLine xmlns="" xmlns:a14="http://schemas.microsoft.com/office/drawing/2010/main" w="9525">
+                <a14:hiddenLine xmlns:a14="http://schemas.microsoft.com/office/drawing/2010/main" xmlns="" w="9525">
                   <a:solidFill>
                     <a:srgbClr val="000000"/>
                   </a:solidFill>
@@ -3105,7 +3107,7 @@
             </a:ln>
             <a:extLst>
               <a:ext uri="{91240B29-F687-4f45-9708-019B960494DF}">
-                <a14:hiddenLine xmlns="" xmlns:a14="http://schemas.microsoft.com/office/drawing/2010/main" w="9525">
+                <a14:hiddenLine xmlns:a14="http://schemas.microsoft.com/office/drawing/2010/main" xmlns="" w="9525">
                   <a:solidFill>
                     <a:srgbClr val="000000"/>
                   </a:solidFill>
@@ -3167,7 +3169,7 @@
             </a:ln>
             <a:extLst>
               <a:ext uri="{91240B29-F687-4f45-9708-019B960494DF}">
-                <a14:hiddenLine xmlns="" xmlns:a14="http://schemas.microsoft.com/office/drawing/2010/main" w="9525">
+                <a14:hiddenLine xmlns:a14="http://schemas.microsoft.com/office/drawing/2010/main" xmlns="" w="9525">
                   <a:solidFill>
                     <a:srgbClr val="000000"/>
                   </a:solidFill>
@@ -3229,7 +3231,7 @@
             </a:ln>
             <a:extLst>
               <a:ext uri="{91240B29-F687-4f45-9708-019B960494DF}">
-                <a14:hiddenLine xmlns="" xmlns:a14="http://schemas.microsoft.com/office/drawing/2010/main" w="9525">
+                <a14:hiddenLine xmlns:a14="http://schemas.microsoft.com/office/drawing/2010/main" xmlns="" w="9525">
                   <a:solidFill>
                     <a:srgbClr val="000000"/>
                   </a:solidFill>
@@ -3319,7 +3321,7 @@
             </a:ln>
             <a:extLst>
               <a:ext uri="{91240B29-F687-4f45-9708-019B960494DF}">
-                <a14:hiddenLine xmlns="" xmlns:a14="http://schemas.microsoft.com/office/drawing/2010/main" w="9525">
+                <a14:hiddenLine xmlns:a14="http://schemas.microsoft.com/office/drawing/2010/main" xmlns="" w="9525">
                   <a:solidFill>
                     <a:srgbClr val="000000"/>
                   </a:solidFill>
@@ -3387,7 +3389,7 @@
             </a:ln>
             <a:extLst>
               <a:ext uri="{91240B29-F687-4f45-9708-019B960494DF}">
-                <a14:hiddenLine xmlns="" xmlns:a14="http://schemas.microsoft.com/office/drawing/2010/main" w="9525">
+                <a14:hiddenLine xmlns:a14="http://schemas.microsoft.com/office/drawing/2010/main" xmlns="" w="9525">
                   <a:solidFill>
                     <a:srgbClr val="000000"/>
                   </a:solidFill>
@@ -3449,7 +3451,7 @@
             </a:ln>
             <a:extLst>
               <a:ext uri="{91240B29-F687-4f45-9708-019B960494DF}">
-                <a14:hiddenLine xmlns="" xmlns:a14="http://schemas.microsoft.com/office/drawing/2010/main" w="9525">
+                <a14:hiddenLine xmlns:a14="http://schemas.microsoft.com/office/drawing/2010/main" xmlns="" w="9525">
                   <a:solidFill>
                     <a:srgbClr val="000000"/>
                   </a:solidFill>
@@ -3539,7 +3541,7 @@
             </a:ln>
             <a:extLst>
               <a:ext uri="{91240B29-F687-4f45-9708-019B960494DF}">
-                <a14:hiddenLine xmlns="" xmlns:a14="http://schemas.microsoft.com/office/drawing/2010/main" w="9525">
+                <a14:hiddenLine xmlns:a14="http://schemas.microsoft.com/office/drawing/2010/main" xmlns="" w="9525">
                   <a:solidFill>
                     <a:srgbClr val="000000"/>
                   </a:solidFill>
@@ -3601,7 +3603,7 @@
             </a:ln>
             <a:extLst>
               <a:ext uri="{91240B29-F687-4f45-9708-019B960494DF}">
-                <a14:hiddenLine xmlns="" xmlns:a14="http://schemas.microsoft.com/office/drawing/2010/main" w="9525">
+                <a14:hiddenLine xmlns:a14="http://schemas.microsoft.com/office/drawing/2010/main" xmlns="" w="9525">
                   <a:solidFill>
                     <a:srgbClr val="000000"/>
                   </a:solidFill>
@@ -3691,7 +3693,7 @@
             </a:ln>
             <a:extLst>
               <a:ext uri="{91240B29-F687-4f45-9708-019B960494DF}">
-                <a14:hiddenLine xmlns="" xmlns:a14="http://schemas.microsoft.com/office/drawing/2010/main" w="9525">
+                <a14:hiddenLine xmlns:a14="http://schemas.microsoft.com/office/drawing/2010/main" xmlns="" w="9525">
                   <a:solidFill>
                     <a:srgbClr val="000000"/>
                   </a:solidFill>
@@ -3753,7 +3755,7 @@
             </a:ln>
             <a:extLst>
               <a:ext uri="{91240B29-F687-4f45-9708-019B960494DF}">
-                <a14:hiddenLine xmlns="" xmlns:a14="http://schemas.microsoft.com/office/drawing/2010/main" w="9525">
+                <a14:hiddenLine xmlns:a14="http://schemas.microsoft.com/office/drawing/2010/main" xmlns="" w="9525">
                   <a:solidFill>
                     <a:srgbClr val="000000"/>
                   </a:solidFill>
@@ -3843,7 +3845,7 @@
             </a:ln>
             <a:extLst>
               <a:ext uri="{91240B29-F687-4f45-9708-019B960494DF}">
-                <a14:hiddenLine xmlns="" xmlns:a14="http://schemas.microsoft.com/office/drawing/2010/main" w="9525">
+                <a14:hiddenLine xmlns:a14="http://schemas.microsoft.com/office/drawing/2010/main" xmlns="" w="9525">
                   <a:solidFill>
                     <a:srgbClr val="000000"/>
                   </a:solidFill>
@@ -3877,7 +3879,7 @@
             </a:ln>
             <a:extLst>
               <a:ext uri="{91240B29-F687-4f45-9708-019B960494DF}">
-                <a14:hiddenLine xmlns="" xmlns:a14="http://schemas.microsoft.com/office/drawing/2010/main" w="9525">
+                <a14:hiddenLine xmlns:a14="http://schemas.microsoft.com/office/drawing/2010/main" xmlns="" w="9525">
                   <a:solidFill>
                     <a:srgbClr val="000000"/>
                   </a:solidFill>
@@ -3942,7 +3944,7 @@
             </a:ln>
             <a:extLst>
               <a:ext uri="{91240B29-F687-4f45-9708-019B960494DF}">
-                <a14:hiddenLine xmlns="" xmlns:a14="http://schemas.microsoft.com/office/drawing/2010/main" w="9525">
+                <a14:hiddenLine xmlns:a14="http://schemas.microsoft.com/office/drawing/2010/main" xmlns="" w="9525">
                   <a:solidFill>
                     <a:srgbClr val="000000"/>
                   </a:solidFill>
@@ -4032,7 +4034,7 @@
             </a:ln>
             <a:extLst>
               <a:ext uri="{91240B29-F687-4f45-9708-019B960494DF}">
-                <a14:hiddenLine xmlns="" xmlns:a14="http://schemas.microsoft.com/office/drawing/2010/main" w="9525">
+                <a14:hiddenLine xmlns:a14="http://schemas.microsoft.com/office/drawing/2010/main" xmlns="" w="9525">
                   <a:solidFill>
                     <a:srgbClr val="000000"/>
                   </a:solidFill>
@@ -4094,7 +4096,7 @@
             </a:ln>
             <a:extLst>
               <a:ext uri="{91240B29-F687-4f45-9708-019B960494DF}">
-                <a14:hiddenLine xmlns="" xmlns:a14="http://schemas.microsoft.com/office/drawing/2010/main" w="9525">
+                <a14:hiddenLine xmlns:a14="http://schemas.microsoft.com/office/drawing/2010/main" xmlns="" w="9525">
                   <a:solidFill>
                     <a:srgbClr val="000000"/>
                   </a:solidFill>
@@ -4184,7 +4186,7 @@
             </a:ln>
             <a:extLst>
               <a:ext uri="{91240B29-F687-4f45-9708-019B960494DF}">
-                <a14:hiddenLine xmlns="" xmlns:a14="http://schemas.microsoft.com/office/drawing/2010/main" w="9525">
+                <a14:hiddenLine xmlns:a14="http://schemas.microsoft.com/office/drawing/2010/main" xmlns="" w="9525">
                   <a:solidFill>
                     <a:srgbClr val="000000"/>
                   </a:solidFill>
@@ -4274,7 +4276,7 @@
             </a:ln>
             <a:extLst>
               <a:ext uri="{91240B29-F687-4f45-9708-019B960494DF}">
-                <a14:hiddenLine xmlns="" xmlns:a14="http://schemas.microsoft.com/office/drawing/2010/main" w="9525">
+                <a14:hiddenLine xmlns:a14="http://schemas.microsoft.com/office/drawing/2010/main" xmlns="" w="9525">
                   <a:solidFill>
                     <a:srgbClr val="000000"/>
                   </a:solidFill>
@@ -4339,7 +4341,7 @@
             </a:ln>
             <a:extLst>
               <a:ext uri="{91240B29-F687-4f45-9708-019B960494DF}">
-                <a14:hiddenLine xmlns="" xmlns:a14="http://schemas.microsoft.com/office/drawing/2010/main" w="9525">
+                <a14:hiddenLine xmlns:a14="http://schemas.microsoft.com/office/drawing/2010/main" xmlns="" w="9525">
                   <a:solidFill>
                     <a:srgbClr val="000000"/>
                   </a:solidFill>
@@ -4401,7 +4403,7 @@
             </a:ln>
             <a:extLst>
               <a:ext uri="{91240B29-F687-4f45-9708-019B960494DF}">
-                <a14:hiddenLine xmlns="" xmlns:a14="http://schemas.microsoft.com/office/drawing/2010/main" w="9525">
+                <a14:hiddenLine xmlns:a14="http://schemas.microsoft.com/office/drawing/2010/main" xmlns="" w="9525">
                   <a:solidFill>
                     <a:srgbClr val="000000"/>
                   </a:solidFill>
@@ -4491,7 +4493,7 @@
             </a:ln>
             <a:extLst>
               <a:ext uri="{91240B29-F687-4f45-9708-019B960494DF}">
-                <a14:hiddenLine xmlns="" xmlns:a14="http://schemas.microsoft.com/office/drawing/2010/main" w="9525">
+                <a14:hiddenLine xmlns:a14="http://schemas.microsoft.com/office/drawing/2010/main" xmlns="" w="9525">
                   <a:solidFill>
                     <a:srgbClr val="000000"/>
                   </a:solidFill>
@@ -4581,7 +4583,7 @@
             </a:ln>
             <a:extLst>
               <a:ext uri="{91240B29-F687-4f45-9708-019B960494DF}">
-                <a14:hiddenLine xmlns="" xmlns:a14="http://schemas.microsoft.com/office/drawing/2010/main" w="9525">
+                <a14:hiddenLine xmlns:a14="http://schemas.microsoft.com/office/drawing/2010/main" xmlns="" w="9525">
                   <a:solidFill>
                     <a:srgbClr val="000000"/>
                   </a:solidFill>
@@ -4643,7 +4645,7 @@
             </a:ln>
             <a:extLst>
               <a:ext uri="{91240B29-F687-4f45-9708-019B960494DF}">
-                <a14:hiddenLine xmlns="" xmlns:a14="http://schemas.microsoft.com/office/drawing/2010/main" w="9525">
+                <a14:hiddenLine xmlns:a14="http://schemas.microsoft.com/office/drawing/2010/main" xmlns="" w="9525">
                   <a:solidFill>
                     <a:srgbClr val="000000"/>
                   </a:solidFill>
@@ -4763,7 +4765,7 @@
             </a:ln>
             <a:extLst>
               <a:ext uri="{91240B29-F687-4f45-9708-019B960494DF}">
-                <a14:hiddenLine xmlns="" xmlns:a14="http://schemas.microsoft.com/office/drawing/2010/main" w="9525">
+                <a14:hiddenLine xmlns:a14="http://schemas.microsoft.com/office/drawing/2010/main" xmlns="" w="9525">
                   <a:solidFill>
                     <a:srgbClr val="000000"/>
                   </a:solidFill>
@@ -4831,7 +4833,7 @@
             </a:ln>
             <a:extLst>
               <a:ext uri="{91240B29-F687-4f45-9708-019B960494DF}">
-                <a14:hiddenLine xmlns="" xmlns:a14="http://schemas.microsoft.com/office/drawing/2010/main" w="9525">
+                <a14:hiddenLine xmlns:a14="http://schemas.microsoft.com/office/drawing/2010/main" xmlns="" w="9525">
                   <a:solidFill>
                     <a:srgbClr val="000000"/>
                   </a:solidFill>
@@ -4921,7 +4923,7 @@
             </a:ln>
             <a:extLst>
               <a:ext uri="{91240B29-F687-4f45-9708-019B960494DF}">
-                <a14:hiddenLine xmlns="" xmlns:a14="http://schemas.microsoft.com/office/drawing/2010/main" w="9525">
+                <a14:hiddenLine xmlns:a14="http://schemas.microsoft.com/office/drawing/2010/main" xmlns="" w="9525">
                   <a:solidFill>
                     <a:srgbClr val="000000"/>
                   </a:solidFill>
@@ -9728,7 +9730,7 @@
           <a:noFill/>
           <a:extLst>
             <a:ext uri="{909E8E84-426E-40dd-AFC4-6F175D3DCCD1}">
-              <a14:hiddenFill xmlns="" xmlns:a14="http://schemas.microsoft.com/office/drawing/2010/main">
+              <a14:hiddenFill xmlns:a14="http://schemas.microsoft.com/office/drawing/2010/main" xmlns="">
                 <a:solidFill>
                   <a:srgbClr val="FFFFFF"/>
                 </a:solidFill>
@@ -9802,7 +9804,7 @@
               </a:ln>
               <a:extLst>
                 <a:ext uri="{91240B29-F687-4f45-9708-019B960494DF}">
-                  <a14:hiddenLine xmlns="" xmlns:a14="http://schemas.microsoft.com/office/drawing/2010/main" w="9525">
+                  <a14:hiddenLine xmlns:a14="http://schemas.microsoft.com/office/drawing/2010/main" xmlns="" w="9525">
                     <a:solidFill>
                       <a:srgbClr val="000000"/>
                     </a:solidFill>
@@ -9892,7 +9894,7 @@
               </a:ln>
               <a:extLst>
                 <a:ext uri="{91240B29-F687-4f45-9708-019B960494DF}">
-                  <a14:hiddenLine xmlns="" xmlns:a14="http://schemas.microsoft.com/office/drawing/2010/main" w="9525">
+                  <a14:hiddenLine xmlns:a14="http://schemas.microsoft.com/office/drawing/2010/main" xmlns="" w="9525">
                     <a:solidFill>
                       <a:srgbClr val="000000"/>
                     </a:solidFill>
@@ -9982,7 +9984,7 @@
               </a:ln>
               <a:extLst>
                 <a:ext uri="{91240B29-F687-4f45-9708-019B960494DF}">
-                  <a14:hiddenLine xmlns="" xmlns:a14="http://schemas.microsoft.com/office/drawing/2010/main" w="9525">
+                  <a14:hiddenLine xmlns:a14="http://schemas.microsoft.com/office/drawing/2010/main" xmlns="" w="9525">
                     <a:solidFill>
                       <a:srgbClr val="000000"/>
                     </a:solidFill>
@@ -10044,7 +10046,7 @@
               </a:ln>
               <a:extLst>
                 <a:ext uri="{91240B29-F687-4f45-9708-019B960494DF}">
-                  <a14:hiddenLine xmlns="" xmlns:a14="http://schemas.microsoft.com/office/drawing/2010/main" w="9525">
+                  <a14:hiddenLine xmlns:a14="http://schemas.microsoft.com/office/drawing/2010/main" xmlns="" w="9525">
                     <a:solidFill>
                       <a:srgbClr val="000000"/>
                     </a:solidFill>
@@ -10134,7 +10136,7 @@
               </a:ln>
               <a:extLst>
                 <a:ext uri="{91240B29-F687-4f45-9708-019B960494DF}">
-                  <a14:hiddenLine xmlns="" xmlns:a14="http://schemas.microsoft.com/office/drawing/2010/main" w="9525">
+                  <a14:hiddenLine xmlns:a14="http://schemas.microsoft.com/office/drawing/2010/main" xmlns="" w="9525">
                     <a:solidFill>
                       <a:srgbClr val="000000"/>
                     </a:solidFill>
@@ -10196,7 +10198,7 @@
               </a:ln>
               <a:extLst>
                 <a:ext uri="{91240B29-F687-4f45-9708-019B960494DF}">
-                  <a14:hiddenLine xmlns="" xmlns:a14="http://schemas.microsoft.com/office/drawing/2010/main" w="9525">
+                  <a14:hiddenLine xmlns:a14="http://schemas.microsoft.com/office/drawing/2010/main" xmlns="" w="9525">
                     <a:solidFill>
                       <a:srgbClr val="000000"/>
                     </a:solidFill>
@@ -10258,7 +10260,7 @@
               </a:ln>
               <a:extLst>
                 <a:ext uri="{91240B29-F687-4f45-9708-019B960494DF}">
-                  <a14:hiddenLine xmlns="" xmlns:a14="http://schemas.microsoft.com/office/drawing/2010/main" w="9525">
+                  <a14:hiddenLine xmlns:a14="http://schemas.microsoft.com/office/drawing/2010/main" xmlns="" w="9525">
                     <a:solidFill>
                       <a:srgbClr val="000000"/>
                     </a:solidFill>
@@ -10348,7 +10350,7 @@
               </a:ln>
               <a:extLst>
                 <a:ext uri="{91240B29-F687-4f45-9708-019B960494DF}">
-                  <a14:hiddenLine xmlns="" xmlns:a14="http://schemas.microsoft.com/office/drawing/2010/main" w="9525">
+                  <a14:hiddenLine xmlns:a14="http://schemas.microsoft.com/office/drawing/2010/main" xmlns="" w="9525">
                     <a:solidFill>
                       <a:srgbClr val="000000"/>
                     </a:solidFill>
@@ -10438,7 +10440,7 @@
               </a:ln>
               <a:extLst>
                 <a:ext uri="{91240B29-F687-4f45-9708-019B960494DF}">
-                  <a14:hiddenLine xmlns="" xmlns:a14="http://schemas.microsoft.com/office/drawing/2010/main" w="9525">
+                  <a14:hiddenLine xmlns:a14="http://schemas.microsoft.com/office/drawing/2010/main" xmlns="" w="9525">
                     <a:solidFill>
                       <a:srgbClr val="000000"/>
                     </a:solidFill>
@@ -10500,7 +10502,7 @@
               </a:ln>
               <a:extLst>
                 <a:ext uri="{91240B29-F687-4f45-9708-019B960494DF}">
-                  <a14:hiddenLine xmlns="" xmlns:a14="http://schemas.microsoft.com/office/drawing/2010/main" w="9525">
+                  <a14:hiddenLine xmlns:a14="http://schemas.microsoft.com/office/drawing/2010/main" xmlns="" w="9525">
                     <a:solidFill>
                       <a:srgbClr val="000000"/>
                     </a:solidFill>
@@ -10610,7 +10612,7 @@
               </a:ln>
               <a:extLst>
                 <a:ext uri="{91240B29-F687-4f45-9708-019B960494DF}">
-                  <a14:hiddenLine xmlns="" xmlns:a14="http://schemas.microsoft.com/office/drawing/2010/main" w="9525">
+                  <a14:hiddenLine xmlns:a14="http://schemas.microsoft.com/office/drawing/2010/main" xmlns="" w="9525">
                     <a:solidFill>
                       <a:srgbClr val="000000"/>
                     </a:solidFill>
@@ -10694,7 +10696,7 @@
               </a:ln>
               <a:extLst>
                 <a:ext uri="{91240B29-F687-4f45-9708-019B960494DF}">
-                  <a14:hiddenLine xmlns="" xmlns:a14="http://schemas.microsoft.com/office/drawing/2010/main" w="9525">
+                  <a14:hiddenLine xmlns:a14="http://schemas.microsoft.com/office/drawing/2010/main" xmlns="" w="9525">
                     <a:solidFill>
                       <a:srgbClr val="000000"/>
                     </a:solidFill>
@@ -10756,7 +10758,7 @@
               </a:ln>
               <a:extLst>
                 <a:ext uri="{91240B29-F687-4f45-9708-019B960494DF}">
-                  <a14:hiddenLine xmlns="" xmlns:a14="http://schemas.microsoft.com/office/drawing/2010/main" w="9525">
+                  <a14:hiddenLine xmlns:a14="http://schemas.microsoft.com/office/drawing/2010/main" xmlns="" w="9525">
                     <a:solidFill>
                       <a:srgbClr val="000000"/>
                     </a:solidFill>
@@ -10818,7 +10820,7 @@
               </a:ln>
               <a:extLst>
                 <a:ext uri="{91240B29-F687-4f45-9708-019B960494DF}">
-                  <a14:hiddenLine xmlns="" xmlns:a14="http://schemas.microsoft.com/office/drawing/2010/main" w="9525">
+                  <a14:hiddenLine xmlns:a14="http://schemas.microsoft.com/office/drawing/2010/main" xmlns="" w="9525">
                     <a:solidFill>
                       <a:srgbClr val="000000"/>
                     </a:solidFill>
@@ -10908,7 +10910,7 @@
               </a:ln>
               <a:extLst>
                 <a:ext uri="{91240B29-F687-4f45-9708-019B960494DF}">
-                  <a14:hiddenLine xmlns="" xmlns:a14="http://schemas.microsoft.com/office/drawing/2010/main" w="9525">
+                  <a14:hiddenLine xmlns:a14="http://schemas.microsoft.com/office/drawing/2010/main" xmlns="" w="9525">
                     <a:solidFill>
                       <a:srgbClr val="000000"/>
                     </a:solidFill>
@@ -10942,7 +10944,7 @@
               </a:ln>
               <a:extLst>
                 <a:ext uri="{91240B29-F687-4f45-9708-019B960494DF}">
-                  <a14:hiddenLine xmlns="" xmlns:a14="http://schemas.microsoft.com/office/drawing/2010/main" w="9525">
+                  <a14:hiddenLine xmlns:a14="http://schemas.microsoft.com/office/drawing/2010/main" xmlns="" w="9525">
                     <a:solidFill>
                       <a:srgbClr val="000000"/>
                     </a:solidFill>
@@ -11007,7 +11009,7 @@
               </a:ln>
               <a:extLst>
                 <a:ext uri="{91240B29-F687-4f45-9708-019B960494DF}">
-                  <a14:hiddenLine xmlns="" xmlns:a14="http://schemas.microsoft.com/office/drawing/2010/main" w="9525">
+                  <a14:hiddenLine xmlns:a14="http://schemas.microsoft.com/office/drawing/2010/main" xmlns="" w="9525">
                     <a:solidFill>
                       <a:srgbClr val="000000"/>
                     </a:solidFill>
@@ -11097,7 +11099,7 @@
               </a:ln>
               <a:extLst>
                 <a:ext uri="{91240B29-F687-4f45-9708-019B960494DF}">
-                  <a14:hiddenLine xmlns="" xmlns:a14="http://schemas.microsoft.com/office/drawing/2010/main" w="9525">
+                  <a14:hiddenLine xmlns:a14="http://schemas.microsoft.com/office/drawing/2010/main" xmlns="" w="9525">
                     <a:solidFill>
                       <a:srgbClr val="000000"/>
                     </a:solidFill>
@@ -11159,7 +11161,7 @@
               </a:ln>
               <a:extLst>
                 <a:ext uri="{91240B29-F687-4f45-9708-019B960494DF}">
-                  <a14:hiddenLine xmlns="" xmlns:a14="http://schemas.microsoft.com/office/drawing/2010/main" w="9525">
+                  <a14:hiddenLine xmlns:a14="http://schemas.microsoft.com/office/drawing/2010/main" xmlns="" w="9525">
                     <a:solidFill>
                       <a:srgbClr val="000000"/>
                     </a:solidFill>
@@ -11249,7 +11251,7 @@
               </a:ln>
               <a:extLst>
                 <a:ext uri="{91240B29-F687-4f45-9708-019B960494DF}">
-                  <a14:hiddenLine xmlns="" xmlns:a14="http://schemas.microsoft.com/office/drawing/2010/main" w="9525">
+                  <a14:hiddenLine xmlns:a14="http://schemas.microsoft.com/office/drawing/2010/main" xmlns="" w="9525">
                     <a:solidFill>
                       <a:srgbClr val="000000"/>
                     </a:solidFill>
@@ -11314,7 +11316,7 @@
               </a:ln>
               <a:extLst>
                 <a:ext uri="{91240B29-F687-4f45-9708-019B960494DF}">
-                  <a14:hiddenLine xmlns="" xmlns:a14="http://schemas.microsoft.com/office/drawing/2010/main" w="9525">
+                  <a14:hiddenLine xmlns:a14="http://schemas.microsoft.com/office/drawing/2010/main" xmlns="" w="9525">
                     <a:solidFill>
                       <a:srgbClr val="000000"/>
                     </a:solidFill>
@@ -11376,7 +11378,7 @@
               </a:ln>
               <a:extLst>
                 <a:ext uri="{91240B29-F687-4f45-9708-019B960494DF}">
-                  <a14:hiddenLine xmlns="" xmlns:a14="http://schemas.microsoft.com/office/drawing/2010/main" w="9525">
+                  <a14:hiddenLine xmlns:a14="http://schemas.microsoft.com/office/drawing/2010/main" xmlns="" w="9525">
                     <a:solidFill>
                       <a:srgbClr val="000000"/>
                     </a:solidFill>
@@ -11466,7 +11468,7 @@
               </a:ln>
               <a:extLst>
                 <a:ext uri="{91240B29-F687-4f45-9708-019B960494DF}">
-                  <a14:hiddenLine xmlns="" xmlns:a14="http://schemas.microsoft.com/office/drawing/2010/main" w="9525">
+                  <a14:hiddenLine xmlns:a14="http://schemas.microsoft.com/office/drawing/2010/main" xmlns="" w="9525">
                     <a:solidFill>
                       <a:srgbClr val="000000"/>
                     </a:solidFill>
@@ -11556,7 +11558,7 @@
               </a:ln>
               <a:extLst>
                 <a:ext uri="{91240B29-F687-4f45-9708-019B960494DF}">
-                  <a14:hiddenLine xmlns="" xmlns:a14="http://schemas.microsoft.com/office/drawing/2010/main" w="9525">
+                  <a14:hiddenLine xmlns:a14="http://schemas.microsoft.com/office/drawing/2010/main" xmlns="" w="9525">
                     <a:solidFill>
                       <a:srgbClr val="000000"/>
                     </a:solidFill>
@@ -11621,7 +11623,7 @@
               </a:ln>
               <a:extLst>
                 <a:ext uri="{91240B29-F687-4f45-9708-019B960494DF}">
-                  <a14:hiddenLine xmlns="" xmlns:a14="http://schemas.microsoft.com/office/drawing/2010/main" w="9525">
+                  <a14:hiddenLine xmlns:a14="http://schemas.microsoft.com/office/drawing/2010/main" xmlns="" w="9525">
                     <a:solidFill>
                       <a:srgbClr val="000000"/>
                     </a:solidFill>
@@ -11741,7 +11743,7 @@
               </a:ln>
               <a:extLst>
                 <a:ext uri="{91240B29-F687-4f45-9708-019B960494DF}">
-                  <a14:hiddenLine xmlns="" xmlns:a14="http://schemas.microsoft.com/office/drawing/2010/main" w="9525">
+                  <a14:hiddenLine xmlns:a14="http://schemas.microsoft.com/office/drawing/2010/main" xmlns="" w="9525">
                     <a:solidFill>
                       <a:srgbClr val="000000"/>
                     </a:solidFill>
@@ -11839,7 +11841,7 @@
               </a:ln>
               <a:extLst>
                 <a:ext uri="{91240B29-F687-4f45-9708-019B960494DF}">
-                  <a14:hiddenLine xmlns="" xmlns:a14="http://schemas.microsoft.com/office/drawing/2010/main" w="9525">
+                  <a14:hiddenLine xmlns:a14="http://schemas.microsoft.com/office/drawing/2010/main" xmlns="" w="9525">
                     <a:solidFill>
                       <a:srgbClr val="000000"/>
                     </a:solidFill>
@@ -11954,7 +11956,7 @@
               </a:ln>
               <a:extLst>
                 <a:ext uri="{91240B29-F687-4f45-9708-019B960494DF}">
-                  <a14:hiddenLine xmlns="" xmlns:a14="http://schemas.microsoft.com/office/drawing/2010/main" w="9525">
+                  <a14:hiddenLine xmlns:a14="http://schemas.microsoft.com/office/drawing/2010/main" xmlns="" w="9525">
                     <a:solidFill>
                       <a:srgbClr val="000000"/>
                     </a:solidFill>
@@ -12044,7 +12046,7 @@
               </a:ln>
               <a:extLst>
                 <a:ext uri="{91240B29-F687-4f45-9708-019B960494DF}">
-                  <a14:hiddenLine xmlns="" xmlns:a14="http://schemas.microsoft.com/office/drawing/2010/main" w="9525">
+                  <a14:hiddenLine xmlns:a14="http://schemas.microsoft.com/office/drawing/2010/main" xmlns="" w="9525">
                     <a:solidFill>
                       <a:srgbClr val="000000"/>
                     </a:solidFill>
@@ -12109,7 +12111,7 @@
               </a:ln>
               <a:extLst>
                 <a:ext uri="{91240B29-F687-4f45-9708-019B960494DF}">
-                  <a14:hiddenLine xmlns="" xmlns:a14="http://schemas.microsoft.com/office/drawing/2010/main" w="9525">
+                  <a14:hiddenLine xmlns:a14="http://schemas.microsoft.com/office/drawing/2010/main" xmlns="" w="9525">
                     <a:solidFill>
                       <a:srgbClr val="000000"/>
                     </a:solidFill>
@@ -12199,7 +12201,7 @@
               </a:ln>
               <a:extLst>
                 <a:ext uri="{91240B29-F687-4f45-9708-019B960494DF}">
-                  <a14:hiddenLine xmlns="" xmlns:a14="http://schemas.microsoft.com/office/drawing/2010/main" w="9525">
+                  <a14:hiddenLine xmlns:a14="http://schemas.microsoft.com/office/drawing/2010/main" xmlns="" w="9525">
                     <a:solidFill>
                       <a:srgbClr val="000000"/>
                     </a:solidFill>
@@ -12267,7 +12269,7 @@
               </a:ln>
               <a:extLst>
                 <a:ext uri="{91240B29-F687-4f45-9708-019B960494DF}">
-                  <a14:hiddenLine xmlns="" xmlns:a14="http://schemas.microsoft.com/office/drawing/2010/main" w="9525">
+                  <a14:hiddenLine xmlns:a14="http://schemas.microsoft.com/office/drawing/2010/main" xmlns="" w="9525">
                     <a:solidFill>
                       <a:srgbClr val="000000"/>
                     </a:solidFill>
@@ -12357,7 +12359,7 @@
               </a:ln>
               <a:extLst>
                 <a:ext uri="{91240B29-F687-4f45-9708-019B960494DF}">
-                  <a14:hiddenLine xmlns="" xmlns:a14="http://schemas.microsoft.com/office/drawing/2010/main" w="9525">
+                  <a14:hiddenLine xmlns:a14="http://schemas.microsoft.com/office/drawing/2010/main" xmlns="" w="9525">
                     <a:solidFill>
                       <a:srgbClr val="000000"/>
                     </a:solidFill>
@@ -12425,7 +12427,7 @@
               </a:ln>
               <a:extLst>
                 <a:ext uri="{91240B29-F687-4f45-9708-019B960494DF}">
-                  <a14:hiddenLine xmlns="" xmlns:a14="http://schemas.microsoft.com/office/drawing/2010/main" w="9525">
+                  <a14:hiddenLine xmlns:a14="http://schemas.microsoft.com/office/drawing/2010/main" xmlns="" w="9525">
                     <a:solidFill>
                       <a:srgbClr val="000000"/>
                     </a:solidFill>
@@ -12515,7 +12517,7 @@
               </a:ln>
               <a:extLst>
                 <a:ext uri="{91240B29-F687-4f45-9708-019B960494DF}">
-                  <a14:hiddenLine xmlns="" xmlns:a14="http://schemas.microsoft.com/office/drawing/2010/main" w="9525">
+                  <a14:hiddenLine xmlns:a14="http://schemas.microsoft.com/office/drawing/2010/main" xmlns="" w="9525">
                     <a:solidFill>
                       <a:srgbClr val="000000"/>
                     </a:solidFill>
@@ -12549,7 +12551,7 @@
               </a:ln>
               <a:extLst>
                 <a:ext uri="{91240B29-F687-4f45-9708-019B960494DF}">
-                  <a14:hiddenLine xmlns="" xmlns:a14="http://schemas.microsoft.com/office/drawing/2010/main" w="9525">
+                  <a14:hiddenLine xmlns:a14="http://schemas.microsoft.com/office/drawing/2010/main" xmlns="" w="9525">
                     <a:solidFill>
                       <a:srgbClr val="000000"/>
                     </a:solidFill>
@@ -13341,6 +13343,252 @@
 </file>
 
 <file path=ppt/slides/slide10.xml><?xml version="1.0" encoding="utf-8"?>
+<p:sld xmlns:a="http://schemas.openxmlformats.org/drawingml/2006/main" xmlns:r="http://schemas.openxmlformats.org/officeDocument/2006/relationships" xmlns:p="http://schemas.openxmlformats.org/presentationml/2006/main">
+  <p:cSld>
+    <p:spTree>
+      <p:nvGrpSpPr>
+        <p:cNvPr id="1" name=""/>
+        <p:cNvGrpSpPr/>
+        <p:nvPr/>
+      </p:nvGrpSpPr>
+      <p:grpSpPr>
+        <a:xfrm>
+          <a:off x="0" y="0"/>
+          <a:ext cx="0" cy="0"/>
+          <a:chOff x="0" y="0"/>
+          <a:chExt cx="0" cy="0"/>
+        </a:xfrm>
+      </p:grpSpPr>
+      <p:sp>
+        <p:nvSpPr>
+          <p:cNvPr id="2" name="Title 1">
+            <a:extLst>
+              <a:ext uri="{FF2B5EF4-FFF2-40B4-BE49-F238E27FC236}">
+                <a16:creationId xmlns:a16="http://schemas.microsoft.com/office/drawing/2014/main" id="{AA722F3D-B1EF-09DE-246B-FB029DBB9D81}"/>
+              </a:ext>
+            </a:extLst>
+          </p:cNvPr>
+          <p:cNvSpPr>
+            <a:spLocks noGrp="1"/>
+          </p:cNvSpPr>
+          <p:nvPr>
+            <p:ph type="title"/>
+          </p:nvPr>
+        </p:nvSpPr>
+        <p:spPr>
+          <a:xfrm>
+            <a:off x="1141413" y="0"/>
+            <a:ext cx="9905998" cy="1478570"/>
+          </a:xfrm>
+        </p:spPr>
+        <p:txBody>
+          <a:bodyPr/>
+          <a:lstStyle/>
+          <a:p>
+            <a:r>
+              <a:rPr lang="en-US" dirty="0"/>
+              <a:t>Layout - TOP</a:t>
+            </a:r>
+            <a:endParaRPr lang="en-IL" dirty="0"/>
+          </a:p>
+        </p:txBody>
+      </p:sp>
+      <p:pic>
+        <p:nvPicPr>
+          <p:cNvPr id="5" name="Content Placeholder 4">
+            <a:extLst>
+              <a:ext uri="{FF2B5EF4-FFF2-40B4-BE49-F238E27FC236}">
+                <a16:creationId xmlns:a16="http://schemas.microsoft.com/office/drawing/2014/main" id="{4656C551-9BCD-425A-B5A9-8FABCB264863}"/>
+              </a:ext>
+            </a:extLst>
+          </p:cNvPr>
+          <p:cNvPicPr>
+            <a:picLocks noGrp="1" noChangeAspect="1"/>
+          </p:cNvPicPr>
+          <p:nvPr>
+            <p:ph idx="1"/>
+          </p:nvPr>
+        </p:nvPicPr>
+        <p:blipFill>
+          <a:blip r:embed="rId2"/>
+          <a:stretch>
+            <a:fillRect/>
+          </a:stretch>
+        </p:blipFill>
+        <p:spPr>
+          <a:xfrm>
+            <a:off x="1141413" y="1647188"/>
+            <a:ext cx="4954588" cy="3773899"/>
+          </a:xfrm>
+        </p:spPr>
+      </p:pic>
+      <p:pic>
+        <p:nvPicPr>
+          <p:cNvPr id="7" name="Picture 6">
+            <a:extLst>
+              <a:ext uri="{FF2B5EF4-FFF2-40B4-BE49-F238E27FC236}">
+                <a16:creationId xmlns:a16="http://schemas.microsoft.com/office/drawing/2014/main" id="{E3FF636B-B5F3-943F-4773-F4F6755AEA79}"/>
+              </a:ext>
+            </a:extLst>
+          </p:cNvPr>
+          <p:cNvPicPr>
+            <a:picLocks noChangeAspect="1"/>
+          </p:cNvPicPr>
+          <p:nvPr/>
+        </p:nvPicPr>
+        <p:blipFill>
+          <a:blip r:embed="rId3"/>
+          <a:stretch>
+            <a:fillRect/>
+          </a:stretch>
+        </p:blipFill>
+        <p:spPr>
+          <a:xfrm>
+            <a:off x="6803571" y="1647188"/>
+            <a:ext cx="4691742" cy="3773899"/>
+          </a:xfrm>
+          <a:prstGeom prst="rect">
+            <a:avLst/>
+          </a:prstGeom>
+        </p:spPr>
+      </p:pic>
+    </p:spTree>
+    <p:extLst>
+      <p:ext uri="{BB962C8B-B14F-4D97-AF65-F5344CB8AC3E}">
+        <p14:creationId xmlns:p14="http://schemas.microsoft.com/office/powerpoint/2010/main" val="662210323"/>
+      </p:ext>
+    </p:extLst>
+  </p:cSld>
+  <p:clrMapOvr>
+    <a:masterClrMapping/>
+  </p:clrMapOvr>
+</p:sld>
+</file>
+
+<file path=ppt/slides/slide11.xml><?xml version="1.0" encoding="utf-8"?>
+<p:sld xmlns:a="http://schemas.openxmlformats.org/drawingml/2006/main" xmlns:r="http://schemas.openxmlformats.org/officeDocument/2006/relationships" xmlns:p="http://schemas.openxmlformats.org/presentationml/2006/main">
+  <p:cSld>
+    <p:spTree>
+      <p:nvGrpSpPr>
+        <p:cNvPr id="1" name=""/>
+        <p:cNvGrpSpPr/>
+        <p:nvPr/>
+      </p:nvGrpSpPr>
+      <p:grpSpPr>
+        <a:xfrm>
+          <a:off x="0" y="0"/>
+          <a:ext cx="0" cy="0"/>
+          <a:chOff x="0" y="0"/>
+          <a:chExt cx="0" cy="0"/>
+        </a:xfrm>
+      </p:grpSpPr>
+      <p:sp>
+        <p:nvSpPr>
+          <p:cNvPr id="2" name="Title 1">
+            <a:extLst>
+              <a:ext uri="{FF2B5EF4-FFF2-40B4-BE49-F238E27FC236}">
+                <a16:creationId xmlns:a16="http://schemas.microsoft.com/office/drawing/2014/main" id="{AA722F3D-B1EF-09DE-246B-FB029DBB9D81}"/>
+              </a:ext>
+            </a:extLst>
+          </p:cNvPr>
+          <p:cNvSpPr>
+            <a:spLocks noGrp="1"/>
+          </p:cNvSpPr>
+          <p:nvPr>
+            <p:ph type="title"/>
+          </p:nvPr>
+        </p:nvSpPr>
+        <p:spPr>
+          <a:xfrm>
+            <a:off x="1141413" y="0"/>
+            <a:ext cx="9905998" cy="1478570"/>
+          </a:xfrm>
+        </p:spPr>
+        <p:txBody>
+          <a:bodyPr/>
+          <a:lstStyle/>
+          <a:p>
+            <a:r>
+              <a:rPr lang="en-US" dirty="0"/>
+              <a:t>Layout - BOTTOM</a:t>
+            </a:r>
+            <a:endParaRPr lang="en-IL" dirty="0"/>
+          </a:p>
+        </p:txBody>
+      </p:sp>
+      <p:pic>
+        <p:nvPicPr>
+          <p:cNvPr id="8" name="Content Placeholder 7">
+            <a:extLst>
+              <a:ext uri="{FF2B5EF4-FFF2-40B4-BE49-F238E27FC236}">
+                <a16:creationId xmlns:a16="http://schemas.microsoft.com/office/drawing/2014/main" id="{38E79BCD-599A-14E3-A22B-DA8E793ECD02}"/>
+              </a:ext>
+            </a:extLst>
+          </p:cNvPr>
+          <p:cNvPicPr>
+            <a:picLocks noGrp="1" noChangeAspect="1"/>
+          </p:cNvPicPr>
+          <p:nvPr>
+            <p:ph idx="1"/>
+          </p:nvPr>
+        </p:nvPicPr>
+        <p:blipFill>
+          <a:blip r:embed="rId2"/>
+          <a:stretch>
+            <a:fillRect/>
+          </a:stretch>
+        </p:blipFill>
+        <p:spPr>
+          <a:xfrm>
+            <a:off x="814842" y="1478571"/>
+            <a:ext cx="4911044" cy="3942516"/>
+          </a:xfrm>
+        </p:spPr>
+      </p:pic>
+      <p:pic>
+        <p:nvPicPr>
+          <p:cNvPr id="10" name="Picture 9">
+            <a:extLst>
+              <a:ext uri="{FF2B5EF4-FFF2-40B4-BE49-F238E27FC236}">
+                <a16:creationId xmlns:a16="http://schemas.microsoft.com/office/drawing/2014/main" id="{CE4E56EF-9E66-5338-0D2B-B6B5FD40F0A8}"/>
+              </a:ext>
+            </a:extLst>
+          </p:cNvPr>
+          <p:cNvPicPr>
+            <a:picLocks noChangeAspect="1"/>
+          </p:cNvPicPr>
+          <p:nvPr/>
+        </p:nvPicPr>
+        <p:blipFill>
+          <a:blip r:embed="rId3"/>
+          <a:stretch>
+            <a:fillRect/>
+          </a:stretch>
+        </p:blipFill>
+        <p:spPr>
+          <a:xfrm>
+            <a:off x="6595156" y="1478570"/>
+            <a:ext cx="4911044" cy="3942517"/>
+          </a:xfrm>
+          <a:prstGeom prst="rect">
+            <a:avLst/>
+          </a:prstGeom>
+        </p:spPr>
+      </p:pic>
+    </p:spTree>
+    <p:extLst>
+      <p:ext uri="{BB962C8B-B14F-4D97-AF65-F5344CB8AC3E}">
+        <p14:creationId xmlns:p14="http://schemas.microsoft.com/office/powerpoint/2010/main" val="3043757513"/>
+      </p:ext>
+    </p:extLst>
+  </p:cSld>
+  <p:clrMapOvr>
+    <a:masterClrMapping/>
+  </p:clrMapOvr>
+</p:sld>
+</file>
+
+<file path=ppt/slides/slide12.xml><?xml version="1.0" encoding="utf-8"?>
 <p:sld xmlns:a="http://schemas.openxmlformats.org/drawingml/2006/main" xmlns:r="http://schemas.openxmlformats.org/officeDocument/2006/relationships" xmlns:p="http://schemas.openxmlformats.org/presentationml/2006/main">
   <p:cSld>
     <p:spTree>
@@ -13975,7 +14223,7 @@
 </p:sld>
 </file>
 
-<file path=ppt/slides/slide11.xml><?xml version="1.0" encoding="utf-8"?>
+<file path=ppt/slides/slide13.xml><?xml version="1.0" encoding="utf-8"?>
 <p:sld xmlns:a="http://schemas.openxmlformats.org/drawingml/2006/main" xmlns:r="http://schemas.openxmlformats.org/officeDocument/2006/relationships" xmlns:p="http://schemas.openxmlformats.org/presentationml/2006/main">
   <p:cSld>
     <p:spTree>
@@ -14164,7 +14412,7 @@
 </p:sld>
 </file>
 
-<file path=ppt/slides/slide12.xml><?xml version="1.0" encoding="utf-8"?>
+<file path=ppt/slides/slide14.xml><?xml version="1.0" encoding="utf-8"?>
 <p:sld xmlns:a="http://schemas.openxmlformats.org/drawingml/2006/main" xmlns:r="http://schemas.openxmlformats.org/officeDocument/2006/relationships" xmlns:p="http://schemas.openxmlformats.org/presentationml/2006/main">
   <p:cSld>
     <p:spTree>
@@ -14279,7 +14527,7 @@
 </p:sld>
 </file>
 
-<file path=ppt/slides/slide13.xml><?xml version="1.0" encoding="utf-8"?>
+<file path=ppt/slides/slide15.xml><?xml version="1.0" encoding="utf-8"?>
 <p:sld xmlns:a="http://schemas.openxmlformats.org/drawingml/2006/main" xmlns:r="http://schemas.openxmlformats.org/officeDocument/2006/relationships" xmlns:p="http://schemas.openxmlformats.org/presentationml/2006/main">
   <p:cSld>
     <p:spTree>
@@ -14344,8 +14592,8 @@
         </p:nvSpPr>
         <p:spPr>
           <a:xfrm>
-            <a:off x="742248" y="2779379"/>
-            <a:ext cx="2567880" cy="471412"/>
+            <a:off x="742247" y="2779379"/>
+            <a:ext cx="1799357" cy="471412"/>
           </a:xfrm>
           <a:prstGeom prst="rect">
             <a:avLst/>
@@ -14428,14 +14676,14 @@
         </p:nvSpPr>
         <p:spPr>
           <a:xfrm>
-            <a:off x="2026188" y="4122791"/>
-            <a:ext cx="3789397" cy="471412"/>
+            <a:off x="2026188" y="3872979"/>
+            <a:ext cx="2741755" cy="471412"/>
           </a:xfrm>
           <a:prstGeom prst="rect">
             <a:avLst/>
           </a:prstGeom>
           <a:solidFill>
-            <a:srgbClr val="7030A0"/>
+            <a:srgbClr val="00B0F0"/>
           </a:solidFill>
           <a:ln>
             <a:noFill/>
@@ -14486,7 +14734,7 @@
                   <a:schemeClr val="tx1"/>
                 </a:solidFill>
               </a:rPr>
-              <a:t>Code bring - up</a:t>
+              <a:t>Software development</a:t>
             </a:r>
             <a:endParaRPr lang="en-IL" b="1" dirty="0">
               <a:solidFill>
@@ -14510,8 +14758,8 @@
         </p:nvSpPr>
         <p:spPr>
           <a:xfrm>
-            <a:off x="2541605" y="3432487"/>
-            <a:ext cx="3273980" cy="471412"/>
+            <a:off x="2026188" y="3304459"/>
+            <a:ext cx="2741755" cy="471412"/>
           </a:xfrm>
           <a:prstGeom prst="rect">
             <a:avLst/>
@@ -14594,8 +14842,8 @@
         </p:nvSpPr>
         <p:spPr>
           <a:xfrm>
-            <a:off x="5815585" y="4775899"/>
-            <a:ext cx="2532887" cy="471412"/>
+            <a:off x="6559871" y="2779379"/>
+            <a:ext cx="1281300" cy="471412"/>
           </a:xfrm>
           <a:prstGeom prst="rect">
             <a:avLst/>
@@ -14715,7 +14963,7 @@
                   <a:schemeClr val="tx1"/>
                 </a:solidFill>
               </a:rPr>
-              <a:t>|   13august24   |   20august24   |   27august24   |   3sep24   |   10sep24   |   17sep24   |   24sep24   |</a:t>
+              <a:t>|   18Aug24   |   25Aug24   |   1Sep24   |   22Sep24   |   29Sep24   |   5Oct24   |   19Oct24   |10Nov24</a:t>
             </a:r>
             <a:endParaRPr lang="en-IL" b="1" dirty="0">
               <a:solidFill>
@@ -14831,8 +15079,8 @@
         </p:nvSpPr>
         <p:spPr>
           <a:xfrm>
-            <a:off x="8348473" y="5532913"/>
-            <a:ext cx="2615184" cy="471412"/>
+            <a:off x="9129904" y="4746821"/>
+            <a:ext cx="1799357" cy="888114"/>
           </a:xfrm>
           <a:prstGeom prst="rect">
             <a:avLst/>
@@ -14890,6 +15138,254 @@
                 </a:solidFill>
               </a:rPr>
               <a:t>Final presentation</a:t>
+            </a:r>
+            <a:endParaRPr lang="en-IL" b="1" dirty="0">
+              <a:solidFill>
+                <a:schemeClr val="tx1"/>
+              </a:solidFill>
+            </a:endParaRPr>
+          </a:p>
+        </p:txBody>
+      </p:sp>
+      <p:sp>
+        <p:nvSpPr>
+          <p:cNvPr id="8" name="Rectangle 7">
+            <a:extLst>
+              <a:ext uri="{FF2B5EF4-FFF2-40B4-BE49-F238E27FC236}">
+                <a16:creationId xmlns:a16="http://schemas.microsoft.com/office/drawing/2014/main" id="{644AC0FE-04CD-422B-916F-5A955B1B0A41}"/>
+              </a:ext>
+            </a:extLst>
+          </p:cNvPr>
+          <p:cNvSpPr/>
+          <p:nvPr/>
+        </p:nvSpPr>
+        <p:spPr>
+          <a:xfrm>
+            <a:off x="4767943" y="2787031"/>
+            <a:ext cx="1799357" cy="3937799"/>
+          </a:xfrm>
+          <a:prstGeom prst="rect">
+            <a:avLst/>
+          </a:prstGeom>
+          <a:solidFill>
+            <a:schemeClr val="bg1">
+              <a:lumMod val="65000"/>
+            </a:schemeClr>
+          </a:solidFill>
+          <a:ln>
+            <a:noFill/>
+          </a:ln>
+          <a:effectLst>
+            <a:outerShdw blurRad="44450" dist="27940" dir="5400000" algn="ctr">
+              <a:srgbClr val="000000">
+                <a:alpha val="32000"/>
+              </a:srgbClr>
+            </a:outerShdw>
+          </a:effectLst>
+          <a:scene3d>
+            <a:camera prst="orthographicFront">
+              <a:rot lat="0" lon="0" rev="0"/>
+            </a:camera>
+            <a:lightRig rig="balanced" dir="t">
+              <a:rot lat="0" lon="0" rev="8700000"/>
+            </a:lightRig>
+          </a:scene3d>
+          <a:sp3d>
+            <a:bevelT w="190500" h="38100"/>
+          </a:sp3d>
+        </p:spPr>
+        <p:style>
+          <a:lnRef idx="2">
+            <a:schemeClr val="accent1">
+              <a:shade val="15000"/>
+            </a:schemeClr>
+          </a:lnRef>
+          <a:fillRef idx="1">
+            <a:schemeClr val="accent1"/>
+          </a:fillRef>
+          <a:effectRef idx="0">
+            <a:schemeClr val="accent1"/>
+          </a:effectRef>
+          <a:fontRef idx="minor">
+            <a:schemeClr val="lt1"/>
+          </a:fontRef>
+        </p:style>
+        <p:txBody>
+          <a:bodyPr rtlCol="0" anchor="ctr"/>
+          <a:lstStyle/>
+          <a:p>
+            <a:pPr algn="ctr"/>
+            <a:r>
+              <a:rPr lang="en-US" b="1" dirty="0">
+                <a:solidFill>
+                  <a:schemeClr val="tx1"/>
+                </a:solidFill>
+              </a:rPr>
+              <a:t>Exams</a:t>
+            </a:r>
+            <a:endParaRPr lang="en-IL" b="1" dirty="0">
+              <a:solidFill>
+                <a:schemeClr val="tx1"/>
+              </a:solidFill>
+            </a:endParaRPr>
+          </a:p>
+        </p:txBody>
+      </p:sp>
+      <p:sp>
+        <p:nvSpPr>
+          <p:cNvPr id="9" name="Rectangle 8">
+            <a:extLst>
+              <a:ext uri="{FF2B5EF4-FFF2-40B4-BE49-F238E27FC236}">
+                <a16:creationId xmlns:a16="http://schemas.microsoft.com/office/drawing/2014/main" id="{4DFB4887-2B3A-48D6-970A-A2338D6054A7}"/>
+              </a:ext>
+            </a:extLst>
+          </p:cNvPr>
+          <p:cNvSpPr/>
+          <p:nvPr/>
+        </p:nvSpPr>
+        <p:spPr>
+          <a:xfrm>
+            <a:off x="6567300" y="3457085"/>
+            <a:ext cx="1281302" cy="669581"/>
+          </a:xfrm>
+          <a:prstGeom prst="rect">
+            <a:avLst/>
+          </a:prstGeom>
+          <a:solidFill>
+            <a:srgbClr val="FD8D8D"/>
+          </a:solidFill>
+          <a:ln>
+            <a:noFill/>
+          </a:ln>
+          <a:effectLst>
+            <a:outerShdw blurRad="44450" dist="27940" dir="5400000" algn="ctr">
+              <a:srgbClr val="000000">
+                <a:alpha val="32000"/>
+              </a:srgbClr>
+            </a:outerShdw>
+          </a:effectLst>
+          <a:scene3d>
+            <a:camera prst="orthographicFront">
+              <a:rot lat="0" lon="0" rev="0"/>
+            </a:camera>
+            <a:lightRig rig="balanced" dir="t">
+              <a:rot lat="0" lon="0" rev="8700000"/>
+            </a:lightRig>
+          </a:scene3d>
+          <a:sp3d>
+            <a:bevelT w="190500" h="38100"/>
+          </a:sp3d>
+        </p:spPr>
+        <p:style>
+          <a:lnRef idx="2">
+            <a:schemeClr val="accent1">
+              <a:shade val="15000"/>
+            </a:schemeClr>
+          </a:lnRef>
+          <a:fillRef idx="1">
+            <a:schemeClr val="accent1"/>
+          </a:fillRef>
+          <a:effectRef idx="0">
+            <a:schemeClr val="accent1"/>
+          </a:effectRef>
+          <a:fontRef idx="minor">
+            <a:schemeClr val="lt1"/>
+          </a:fontRef>
+        </p:style>
+        <p:txBody>
+          <a:bodyPr rtlCol="0" anchor="ctr"/>
+          <a:lstStyle/>
+          <a:p>
+            <a:pPr algn="ctr"/>
+            <a:r>
+              <a:rPr lang="en-US" b="1" dirty="0">
+                <a:solidFill>
+                  <a:schemeClr val="tx1"/>
+                </a:solidFill>
+              </a:rPr>
+              <a:t>Hardware bring-up</a:t>
+            </a:r>
+            <a:endParaRPr lang="en-IL" b="1" dirty="0">
+              <a:solidFill>
+                <a:schemeClr val="tx1"/>
+              </a:solidFill>
+            </a:endParaRPr>
+          </a:p>
+        </p:txBody>
+      </p:sp>
+      <p:sp>
+        <p:nvSpPr>
+          <p:cNvPr id="10" name="Rectangle 9">
+            <a:extLst>
+              <a:ext uri="{FF2B5EF4-FFF2-40B4-BE49-F238E27FC236}">
+                <a16:creationId xmlns:a16="http://schemas.microsoft.com/office/drawing/2014/main" id="{7C147B8E-97FD-CE13-B845-F110D0198243}"/>
+              </a:ext>
+            </a:extLst>
+          </p:cNvPr>
+          <p:cNvSpPr/>
+          <p:nvPr/>
+        </p:nvSpPr>
+        <p:spPr>
+          <a:xfrm>
+            <a:off x="7848602" y="4224223"/>
+            <a:ext cx="1281302" cy="471412"/>
+          </a:xfrm>
+          <a:prstGeom prst="rect">
+            <a:avLst/>
+          </a:prstGeom>
+          <a:solidFill>
+            <a:srgbClr val="FD8D8D"/>
+          </a:solidFill>
+          <a:ln>
+            <a:noFill/>
+          </a:ln>
+          <a:effectLst>
+            <a:outerShdw blurRad="44450" dist="27940" dir="5400000" algn="ctr">
+              <a:srgbClr val="000000">
+                <a:alpha val="32000"/>
+              </a:srgbClr>
+            </a:outerShdw>
+          </a:effectLst>
+          <a:scene3d>
+            <a:camera prst="orthographicFront">
+              <a:rot lat="0" lon="0" rev="0"/>
+            </a:camera>
+            <a:lightRig rig="balanced" dir="t">
+              <a:rot lat="0" lon="0" rev="8700000"/>
+            </a:lightRig>
+          </a:scene3d>
+          <a:sp3d>
+            <a:bevelT w="190500" h="38100"/>
+          </a:sp3d>
+        </p:spPr>
+        <p:style>
+          <a:lnRef idx="2">
+            <a:schemeClr val="accent1">
+              <a:shade val="15000"/>
+            </a:schemeClr>
+          </a:lnRef>
+          <a:fillRef idx="1">
+            <a:schemeClr val="accent1"/>
+          </a:fillRef>
+          <a:effectRef idx="0">
+            <a:schemeClr val="accent1"/>
+          </a:effectRef>
+          <a:fontRef idx="minor">
+            <a:schemeClr val="lt1"/>
+          </a:fontRef>
+        </p:style>
+        <p:txBody>
+          <a:bodyPr rtlCol="0" anchor="ctr"/>
+          <a:lstStyle/>
+          <a:p>
+            <a:pPr algn="ctr"/>
+            <a:r>
+              <a:rPr lang="en-US" b="1" dirty="0">
+                <a:solidFill>
+                  <a:schemeClr val="tx1"/>
+                </a:solidFill>
+              </a:rPr>
+              <a:t>Integration</a:t>
             </a:r>
             <a:endParaRPr lang="en-IL" b="1" dirty="0">
               <a:solidFill>
@@ -15185,6 +15681,111 @@
                                   </p:childTnLst>
                                 </p:cTn>
                               </p:par>
+                              <p:par>
+                                <p:cTn id="25" presetID="21" presetClass="entr" presetSubtype="1" fill="hold" grpId="0" nodeType="withEffect">
+                                  <p:stCondLst>
+                                    <p:cond delay="0"/>
+                                  </p:stCondLst>
+                                  <p:childTnLst>
+                                    <p:set>
+                                      <p:cBhvr>
+                                        <p:cTn id="26" dur="1" fill="hold">
+                                          <p:stCondLst>
+                                            <p:cond delay="0"/>
+                                          </p:stCondLst>
+                                        </p:cTn>
+                                        <p:tgtEl>
+                                          <p:spTgt spid="8"/>
+                                        </p:tgtEl>
+                                        <p:attrNameLst>
+                                          <p:attrName>style.visibility</p:attrName>
+                                        </p:attrNameLst>
+                                      </p:cBhvr>
+                                      <p:to>
+                                        <p:strVal val="visible"/>
+                                      </p:to>
+                                    </p:set>
+                                    <p:animEffect transition="in" filter="wheel(1)">
+                                      <p:cBhvr>
+                                        <p:cTn id="27" dur="2000"/>
+                                        <p:tgtEl>
+                                          <p:spTgt spid="8"/>
+                                        </p:tgtEl>
+                                      </p:cBhvr>
+                                    </p:animEffect>
+                                  </p:childTnLst>
+                                </p:cTn>
+                              </p:par>
+                              <p:par>
+                                <p:cTn id="28" presetID="21" presetClass="entr" presetSubtype="1" fill="hold" grpId="0" nodeType="withEffect">
+                                  <p:stCondLst>
+                                    <p:cond delay="0"/>
+                                  </p:stCondLst>
+                                  <p:childTnLst>
+                                    <p:set>
+                                      <p:cBhvr>
+                                        <p:cTn id="29" dur="1" fill="hold">
+                                          <p:stCondLst>
+                                            <p:cond delay="0"/>
+                                          </p:stCondLst>
+                                        </p:cTn>
+                                        <p:tgtEl>
+                                          <p:spTgt spid="9"/>
+                                        </p:tgtEl>
+                                        <p:attrNameLst>
+                                          <p:attrName>style.visibility</p:attrName>
+                                        </p:attrNameLst>
+                                      </p:cBhvr>
+                                      <p:to>
+                                        <p:strVal val="visible"/>
+                                      </p:to>
+                                    </p:set>
+                                    <p:animEffect transition="in" filter="wheel(1)">
+                                      <p:cBhvr>
+                                        <p:cTn id="30" dur="2000"/>
+                                        <p:tgtEl>
+                                          <p:spTgt spid="9"/>
+                                        </p:tgtEl>
+                                      </p:cBhvr>
+                                    </p:animEffect>
+                                  </p:childTnLst>
+                                </p:cTn>
+                              </p:par>
+                              <p:par>
+                                <p:cTn id="31" presetID="21" presetClass="entr" presetSubtype="1" fill="hold" grpId="0" nodeType="withEffect">
+                                  <p:stCondLst>
+                                    <p:cond delay="0"/>
+                                  </p:stCondLst>
+                                  <p:childTnLst>
+                                    <p:set>
+                                      <p:cBhvr>
+                                        <p:cTn id="32" dur="1" fill="hold">
+                                          <p:stCondLst>
+                                            <p:cond delay="0"/>
+                                          </p:stCondLst>
+                                        </p:cTn>
+                                        <p:tgtEl>
+                                          <p:spTgt spid="10"/>
+                                        </p:tgtEl>
+                                        <p:attrNameLst>
+                                          <p:attrName>style.visibility</p:attrName>
+                                        </p:attrNameLst>
+                                      </p:cBhvr>
+                                      <p:to>
+                                        <p:strVal val="visible"/>
+                                      </p:to>
+                                    </p:set>
+                                    <p:animEffect transition="in" filter="wheel(1)">
+                                      <p:cBhvr>
+                                        <p:cTn id="33" dur="2000"/>
+                                        <p:tgtEl>
+                                          <p:spTgt spid="10"/>
+                                        </p:tgtEl>
+                                      </p:cBhvr>
+                                    </p:animEffect>
+                                  </p:childTnLst>
+                                </p:cTn>
+                              </p:par>
                             </p:childTnLst>
                           </p:cTn>
                         </p:par>
@@ -15219,6 +15820,9 @@
       <p:bldP spid="15" grpId="0" animBg="1"/>
       <p:bldP spid="18" grpId="0" animBg="1"/>
       <p:bldP spid="7" grpId="0" animBg="1"/>
+      <p:bldP spid="8" grpId="0" animBg="1"/>
+      <p:bldP spid="9" grpId="0" animBg="1"/>
+      <p:bldP spid="10" grpId="0" animBg="1"/>
     </p:bldLst>
   </p:timing>
 </p:sld>
@@ -15536,8 +16140,8 @@
         </p:nvSpPr>
         <p:spPr>
           <a:xfrm>
-            <a:off x="1269427" y="1625890"/>
-            <a:ext cx="9905998" cy="4207982"/>
+            <a:off x="1141411" y="1262743"/>
+            <a:ext cx="10245046" cy="5268685"/>
           </a:xfrm>
         </p:spPr>
         <p:txBody>
@@ -15597,12 +16201,9 @@
             </a:r>
             <a:r>
               <a:rPr lang="en-US" u="sng" dirty="0"/>
-              <a:t>The tool should </a:t>
+              <a:t>The tool should :</a:t>
             </a:r>
-            <a:r>
-              <a:rPr lang="en-US" dirty="0"/>
-              <a:t> </a:t>
-            </a:r>
+            <a:endParaRPr lang="en-US" dirty="0"/>
           </a:p>
           <a:p>
             <a:pPr>
@@ -15623,18 +16224,7 @@
             </a:pPr>
             <a:r>
               <a:rPr lang="en-US" dirty="0"/>
-              <a:t>communicatee via Wi-Fi with a computer.</a:t>
-            </a:r>
-          </a:p>
-          <a:p>
-            <a:pPr>
-              <a:lnSpc>
-                <a:spcPct val="110000"/>
-              </a:lnSpc>
-            </a:pPr>
-            <a:r>
-              <a:rPr lang="en-US" dirty="0"/>
-              <a:t>Save barcodes.</a:t>
+              <a:t>Save the scanned barcodes and the results.</a:t>
             </a:r>
           </a:p>
           <a:p>
@@ -15646,6 +16236,28 @@
             <a:r>
               <a:rPr lang="en-US" dirty="0"/>
               <a:t>Mobile, compact and Re-chargeable.</a:t>
+            </a:r>
+          </a:p>
+          <a:p>
+            <a:pPr>
+              <a:lnSpc>
+                <a:spcPct val="110000"/>
+              </a:lnSpc>
+            </a:pPr>
+            <a:r>
+              <a:rPr lang="en-US" dirty="0"/>
+              <a:t>communicatee via Wi-Fi with a computer.</a:t>
+            </a:r>
+          </a:p>
+          <a:p>
+            <a:pPr>
+              <a:lnSpc>
+                <a:spcPct val="110000"/>
+              </a:lnSpc>
+            </a:pPr>
+            <a:r>
+              <a:rPr lang="en-US" dirty="0"/>
+              <a:t>Provide a log with all the scanning results.</a:t>
             </a:r>
           </a:p>
           <a:p>
@@ -17082,7 +17694,7 @@
             <a:solidFill>
               <a:schemeClr val="tx1"/>
             </a:solidFill>
-            <a:prstDash val="solid"/>
+            <a:prstDash val="sysDot"/>
             <a:round/>
             <a:headEnd type="none" w="med" len="med"/>
             <a:tailEnd type="arrow" w="med" len="med"/>
@@ -17175,7 +17787,7 @@
             <a:pPr algn="ctr"/>
             <a:r>
               <a:rPr lang="en-US" b="1" dirty="0"/>
-              <a:t>OUR DEVICE</a:t>
+              <a:t>DEVICE</a:t>
             </a:r>
           </a:p>
           <a:p>
@@ -17977,8 +18589,8 @@
         </p:nvSpPr>
         <p:spPr>
           <a:xfrm>
-            <a:off x="1188324" y="2645786"/>
-            <a:ext cx="1216058" cy="925969"/>
+            <a:off x="690916" y="2576608"/>
+            <a:ext cx="2076077" cy="1504169"/>
           </a:xfrm>
           <a:prstGeom prst="rect">
             <a:avLst/>
@@ -18051,8 +18663,8 @@
         </p:nvSpPr>
         <p:spPr>
           <a:xfrm>
-            <a:off x="3044858" y="1564849"/>
-            <a:ext cx="2076077" cy="1264632"/>
+            <a:off x="3461824" y="2576609"/>
+            <a:ext cx="2076077" cy="1504169"/>
           </a:xfrm>
           <a:prstGeom prst="rect">
             <a:avLst/>
@@ -18100,7 +18712,7 @@
                 </a:solidFill>
                 <a:cs typeface="Arial" panose="020B0604020202020204" pitchFamily="34" charset="0"/>
               </a:rPr>
-              <a:t>Scan the “Golden barcode” &amp; save it to the SD card</a:t>
+              <a:t>Scan the “Golden barcode”</a:t>
             </a:r>
             <a:endParaRPr lang="en-IL" b="1" dirty="0">
               <a:solidFill>
@@ -18125,8 +18737,8 @@
         </p:nvSpPr>
         <p:spPr>
           <a:xfrm>
-            <a:off x="5874977" y="1564848"/>
-            <a:ext cx="1892605" cy="1264633"/>
+            <a:off x="6232732" y="2630070"/>
+            <a:ext cx="2076077" cy="1410479"/>
           </a:xfrm>
           <a:prstGeom prst="rect">
             <a:avLst/>
@@ -18174,7 +18786,7 @@
                 </a:solidFill>
                 <a:cs typeface="Arial" panose="020B0604020202020204" pitchFamily="34" charset="0"/>
               </a:rPr>
-              <a:t>Scan a barcode we want to compare to the Golden</a:t>
+              <a:t>Scan the target barcode</a:t>
             </a:r>
             <a:endParaRPr lang="en-IL" b="1" dirty="0">
               <a:solidFill>
@@ -18199,8 +18811,8 @@
         </p:nvSpPr>
         <p:spPr>
           <a:xfrm>
-            <a:off x="8521625" y="1564849"/>
-            <a:ext cx="1968631" cy="1264637"/>
+            <a:off x="9003640" y="2057399"/>
+            <a:ext cx="2988424" cy="2558143"/>
           </a:xfrm>
           <a:prstGeom prst="rect">
             <a:avLst/>
@@ -18249,87 +18861,13 @@
                 <a:latin typeface="Arial" panose="020B0604020202020204" pitchFamily="34" charset="0"/>
                 <a:cs typeface="Arial" panose="020B0604020202020204" pitchFamily="34" charset="0"/>
               </a:rPr>
-              <a:t>Get the result via sound + screen, and save the result</a:t>
+              <a:t>Show the result via sound + screen &amp; LED’s, and save the result </a:t>
             </a:r>
             <a:endParaRPr lang="en-IL" b="1" dirty="0">
               <a:solidFill>
                 <a:sysClr val="windowText" lastClr="000000"/>
               </a:solidFill>
               <a:latin typeface="Arial" panose="020B0604020202020204" pitchFamily="34" charset="0"/>
-              <a:cs typeface="Arial" panose="020B0604020202020204" pitchFamily="34" charset="0"/>
-            </a:endParaRPr>
-          </a:p>
-        </p:txBody>
-      </p:sp>
-      <p:sp>
-        <p:nvSpPr>
-          <p:cNvPr id="8" name="Rectangle 7">
-            <a:extLst>
-              <a:ext uri="{FF2B5EF4-FFF2-40B4-BE49-F238E27FC236}">
-                <a16:creationId xmlns:a16="http://schemas.microsoft.com/office/drawing/2014/main" id="{4CD27ACC-C224-BE3B-C1B8-5127D1C78267}"/>
-              </a:ext>
-            </a:extLst>
-          </p:cNvPr>
-          <p:cNvSpPr/>
-          <p:nvPr/>
-        </p:nvSpPr>
-        <p:spPr>
-          <a:xfrm>
-            <a:off x="3044856" y="3494214"/>
-            <a:ext cx="2076077" cy="1264633"/>
-          </a:xfrm>
-          <a:prstGeom prst="rect">
-            <a:avLst/>
-          </a:prstGeom>
-          <a:solidFill>
-            <a:srgbClr val="FFFF00"/>
-          </a:solidFill>
-          <a:ln>
-            <a:noFill/>
-          </a:ln>
-          <a:effectLst/>
-          <a:scene3d>
-            <a:camera prst="orthographicFront"/>
-            <a:lightRig rig="threePt" dir="t"/>
-          </a:scene3d>
-          <a:sp3d>
-            <a:bevelT w="165100" prst="coolSlant"/>
-          </a:sp3d>
-        </p:spPr>
-        <p:style>
-          <a:lnRef idx="2">
-            <a:schemeClr val="accent1">
-              <a:shade val="15000"/>
-            </a:schemeClr>
-          </a:lnRef>
-          <a:fillRef idx="1">
-            <a:schemeClr val="accent1"/>
-          </a:fillRef>
-          <a:effectRef idx="0">
-            <a:schemeClr val="accent1"/>
-          </a:effectRef>
-          <a:fontRef idx="minor">
-            <a:schemeClr val="lt1"/>
-          </a:fontRef>
-        </p:style>
-        <p:txBody>
-          <a:bodyPr rtlCol="0" anchor="ctr"/>
-          <a:lstStyle/>
-          <a:p>
-            <a:pPr algn="ctr"/>
-            <a:r>
-              <a:rPr lang="en-US" b="1" dirty="0">
-                <a:solidFill>
-                  <a:sysClr val="windowText" lastClr="000000"/>
-                </a:solidFill>
-                <a:cs typeface="Arial" panose="020B0604020202020204" pitchFamily="34" charset="0"/>
-              </a:rPr>
-              <a:t>Scan the target barcode and save it to the SD Card</a:t>
-            </a:r>
-            <a:endParaRPr lang="en-IL" b="1" dirty="0">
-              <a:solidFill>
-                <a:sysClr val="windowText" lastClr="000000"/>
-              </a:solidFill>
               <a:cs typeface="Arial" panose="020B0604020202020204" pitchFamily="34" charset="0"/>
             </a:endParaRPr>
           </a:p>
@@ -18353,8 +18891,8 @@
         </p:nvCxnSpPr>
         <p:spPr>
           <a:xfrm>
-            <a:off x="5120935" y="2197165"/>
-            <a:ext cx="754042" cy="0"/>
+            <a:off x="5537901" y="3328694"/>
+            <a:ext cx="694831" cy="6616"/>
           </a:xfrm>
           <a:prstGeom prst="straightConnector1">
             <a:avLst/>
@@ -18402,8 +18940,8 @@
         </p:nvCxnSpPr>
         <p:spPr>
           <a:xfrm>
-            <a:off x="7767582" y="2197165"/>
-            <a:ext cx="754043" cy="3"/>
+            <a:off x="8308809" y="3335310"/>
+            <a:ext cx="694831" cy="1161"/>
           </a:xfrm>
           <a:prstGeom prst="straightConnector1">
             <a:avLst/>
@@ -18411,102 +18949,6 @@
           <a:ln w="57150" cap="flat" cmpd="sng" algn="ctr">
             <a:solidFill>
               <a:schemeClr val="tx1"/>
-            </a:solidFill>
-            <a:prstDash val="solid"/>
-            <a:round/>
-            <a:headEnd type="none" w="med" len="med"/>
-            <a:tailEnd type="arrow" w="med" len="med"/>
-          </a:ln>
-        </p:spPr>
-        <p:style>
-          <a:lnRef idx="0">
-            <a:scrgbClr r="0" g="0" b="0"/>
-          </a:lnRef>
-          <a:fillRef idx="0">
-            <a:scrgbClr r="0" g="0" b="0"/>
-          </a:fillRef>
-          <a:effectRef idx="0">
-            <a:scrgbClr r="0" g="0" b="0"/>
-          </a:effectRef>
-          <a:fontRef idx="minor">
-            <a:schemeClr val="tx1"/>
-          </a:fontRef>
-        </p:style>
-      </p:cxnSp>
-      <p:cxnSp>
-        <p:nvCxnSpPr>
-          <p:cNvPr id="19" name="Straight Arrow Connector 18">
-            <a:extLst>
-              <a:ext uri="{FF2B5EF4-FFF2-40B4-BE49-F238E27FC236}">
-                <a16:creationId xmlns:a16="http://schemas.microsoft.com/office/drawing/2014/main" id="{6436CC70-D52C-1E00-9316-81DD041531BE}"/>
-              </a:ext>
-            </a:extLst>
-          </p:cNvPr>
-          <p:cNvCxnSpPr>
-            <a:cxnSpLocks/>
-            <a:endCxn id="6" idx="0"/>
-          </p:cNvCxnSpPr>
-          <p:nvPr/>
-        </p:nvCxnSpPr>
-        <p:spPr>
-          <a:xfrm>
-            <a:off x="6821279" y="530352"/>
-            <a:ext cx="1" cy="1034496"/>
-          </a:xfrm>
-          <a:prstGeom prst="straightConnector1">
-            <a:avLst/>
-          </a:prstGeom>
-          <a:ln w="57150" cap="flat" cmpd="sng" algn="ctr">
-            <a:solidFill>
-              <a:schemeClr val="tx1"/>
-            </a:solidFill>
-            <a:prstDash val="solid"/>
-            <a:round/>
-            <a:headEnd type="none" w="med" len="med"/>
-            <a:tailEnd type="arrow" w="med" len="med"/>
-          </a:ln>
-        </p:spPr>
-        <p:style>
-          <a:lnRef idx="0">
-            <a:scrgbClr r="0" g="0" b="0"/>
-          </a:lnRef>
-          <a:fillRef idx="0">
-            <a:scrgbClr r="0" g="0" b="0"/>
-          </a:fillRef>
-          <a:effectRef idx="0">
-            <a:scrgbClr r="0" g="0" b="0"/>
-          </a:effectRef>
-          <a:fontRef idx="minor">
-            <a:schemeClr val="tx1"/>
-          </a:fontRef>
-        </p:style>
-      </p:cxnSp>
-      <p:cxnSp>
-        <p:nvCxnSpPr>
-          <p:cNvPr id="30" name="Straight Arrow Connector 29">
-            <a:extLst>
-              <a:ext uri="{FF2B5EF4-FFF2-40B4-BE49-F238E27FC236}">
-                <a16:creationId xmlns:a16="http://schemas.microsoft.com/office/drawing/2014/main" id="{4AC19F2B-F4CF-E14C-1196-57E281F94263}"/>
-              </a:ext>
-            </a:extLst>
-          </p:cNvPr>
-          <p:cNvCxnSpPr>
-            <a:cxnSpLocks/>
-            <a:endCxn id="8" idx="1"/>
-          </p:cNvCxnSpPr>
-          <p:nvPr/>
-        </p:nvCxnSpPr>
-        <p:spPr>
-          <a:xfrm>
-            <a:off x="2378676" y="3363786"/>
-            <a:ext cx="666180" cy="762745"/>
-          </a:xfrm>
-          <a:prstGeom prst="straightConnector1">
-            <a:avLst/>
-          </a:prstGeom>
-          <a:ln w="53975" cap="flat" cmpd="sng" algn="ctr">
-            <a:solidFill>
-              <a:schemeClr val="dk1"/>
             </a:solidFill>
             <a:prstDash val="solid"/>
             <a:round/>
@@ -18540,14 +18982,15 @@
           </p:cNvPr>
           <p:cNvCxnSpPr>
             <a:cxnSpLocks/>
+            <a:stCxn id="4" idx="3"/>
             <a:endCxn id="5" idx="1"/>
           </p:cNvCxnSpPr>
           <p:nvPr/>
         </p:nvCxnSpPr>
         <p:spPr>
-          <a:xfrm flipV="1">
-            <a:off x="2378676" y="2197165"/>
-            <a:ext cx="666182" cy="632322"/>
+          <a:xfrm>
+            <a:off x="2766993" y="3328693"/>
+            <a:ext cx="694831" cy="1"/>
           </a:xfrm>
           <a:prstGeom prst="straightConnector1">
             <a:avLst/>
@@ -18634,28 +19077,28 @@
       </p:sp>
       <p:cxnSp>
         <p:nvCxnSpPr>
-          <p:cNvPr id="28" name="Connector: Elbow 27">
+          <p:cNvPr id="31" name="Connector: Elbow 30">
             <a:extLst>
               <a:ext uri="{FF2B5EF4-FFF2-40B4-BE49-F238E27FC236}">
-                <a16:creationId xmlns:a16="http://schemas.microsoft.com/office/drawing/2014/main" id="{7ECF522A-D499-51A7-EA0A-22AAC80557DF}"/>
+                <a16:creationId xmlns:a16="http://schemas.microsoft.com/office/drawing/2014/main" id="{8A3C0CAF-A03E-FFC7-94C5-F8C9F5A53F8F}"/>
               </a:ext>
             </a:extLst>
           </p:cNvPr>
           <p:cNvCxnSpPr>
             <a:cxnSpLocks/>
-            <a:stCxn id="8" idx="2"/>
-            <a:endCxn id="4" idx="2"/>
+            <a:stCxn id="7" idx="0"/>
+            <a:endCxn id="4" idx="0"/>
           </p:cNvCxnSpPr>
           <p:nvPr/>
         </p:nvCxnSpPr>
         <p:spPr>
-          <a:xfrm rot="5400000" flipH="1">
-            <a:off x="2346078" y="3022030"/>
-            <a:ext cx="1187092" cy="2286542"/>
+          <a:xfrm rot="16200000" flipH="1" flipV="1">
+            <a:off x="5853799" y="-2067446"/>
+            <a:ext cx="519209" cy="8768897"/>
           </a:xfrm>
           <a:prstGeom prst="bentConnector3">
             <a:avLst>
-              <a:gd name="adj1" fmla="val -19257"/>
+              <a:gd name="adj1" fmla="val -44029"/>
             </a:avLst>
           </a:prstGeom>
           <a:ln w="50800" cap="flat" cmpd="sng" algn="ctr">
@@ -18685,33 +19128,30 @@
       </p:cxnSp>
       <p:cxnSp>
         <p:nvCxnSpPr>
-          <p:cNvPr id="31" name="Connector: Elbow 30">
+          <p:cNvPr id="2" name="Straight Arrow Connector 1">
             <a:extLst>
               <a:ext uri="{FF2B5EF4-FFF2-40B4-BE49-F238E27FC236}">
-                <a16:creationId xmlns:a16="http://schemas.microsoft.com/office/drawing/2014/main" id="{8A3C0CAF-A03E-FFC7-94C5-F8C9F5A53F8F}"/>
+                <a16:creationId xmlns:a16="http://schemas.microsoft.com/office/drawing/2014/main" id="{E91DB71B-F0F5-AB7A-BEE9-E3144CFEC854}"/>
               </a:ext>
             </a:extLst>
           </p:cNvPr>
           <p:cNvCxnSpPr>
             <a:cxnSpLocks/>
-            <a:stCxn id="7" idx="0"/>
-            <a:endCxn id="4" idx="0"/>
+            <a:endCxn id="5" idx="0"/>
           </p:cNvCxnSpPr>
           <p:nvPr/>
         </p:nvCxnSpPr>
         <p:spPr>
-          <a:xfrm rot="16200000" flipH="1" flipV="1">
-            <a:off x="5110678" y="-1749477"/>
-            <a:ext cx="1080937" cy="7709588"/>
+          <a:xfrm>
+            <a:off x="4499863" y="1839686"/>
+            <a:ext cx="0" cy="736923"/>
           </a:xfrm>
-          <a:prstGeom prst="bentConnector3">
-            <a:avLst>
-              <a:gd name="adj1" fmla="val -98128"/>
-            </a:avLst>
+          <a:prstGeom prst="straightConnector1">
+            <a:avLst/>
           </a:prstGeom>
-          <a:ln w="50800" cap="flat" cmpd="sng" algn="ctr">
+          <a:ln w="57150" cap="flat" cmpd="sng" algn="ctr">
             <a:solidFill>
-              <a:schemeClr val="dk1"/>
+              <a:schemeClr val="tx1"/>
             </a:solidFill>
             <a:prstDash val="solid"/>
             <a:round/>
@@ -18977,7 +19417,7 @@
                             </p:stCondLst>
                             <p:childTnLst>
                               <p:par>
-                                <p:cTn id="25" presetID="10" presetClass="entr" presetSubtype="0" fill="hold" grpId="0" nodeType="clickEffect">
+                                <p:cTn id="25" presetID="53" presetClass="entr" presetSubtype="16" fill="hold" nodeType="clickEffect">
                                   <p:stCondLst>
                                     <p:cond delay="0"/>
                                   </p:stCondLst>
@@ -18985,59 +19425,6 @@
                                     <p:set>
                                       <p:cBhvr>
                                         <p:cTn id="26" dur="1" fill="hold">
-                                          <p:stCondLst>
-                                            <p:cond delay="0"/>
-                                          </p:stCondLst>
-                                        </p:cTn>
-                                        <p:tgtEl>
-                                          <p:spTgt spid="8"/>
-                                        </p:tgtEl>
-                                        <p:attrNameLst>
-                                          <p:attrName>style.visibility</p:attrName>
-                                        </p:attrNameLst>
-                                      </p:cBhvr>
-                                      <p:to>
-                                        <p:strVal val="visible"/>
-                                      </p:to>
-                                    </p:set>
-                                    <p:animEffect transition="in" filter="fade">
-                                      <p:cBhvr>
-                                        <p:cTn id="27" dur="500"/>
-                                        <p:tgtEl>
-                                          <p:spTgt spid="8"/>
-                                        </p:tgtEl>
-                                      </p:cBhvr>
-                                    </p:animEffect>
-                                  </p:childTnLst>
-                                </p:cTn>
-                              </p:par>
-                            </p:childTnLst>
-                          </p:cTn>
-                        </p:par>
-                      </p:childTnLst>
-                    </p:cTn>
-                  </p:par>
-                  <p:par>
-                    <p:cTn id="28" fill="hold">
-                      <p:stCondLst>
-                        <p:cond delay="indefinite"/>
-                      </p:stCondLst>
-                      <p:childTnLst>
-                        <p:par>
-                          <p:cTn id="29" fill="hold">
-                            <p:stCondLst>
-                              <p:cond delay="0"/>
-                            </p:stCondLst>
-                            <p:childTnLst>
-                              <p:par>
-                                <p:cTn id="30" presetID="53" presetClass="entr" presetSubtype="16" fill="hold" nodeType="clickEffect">
-                                  <p:stCondLst>
-                                    <p:cond delay="0"/>
-                                  </p:stCondLst>
-                                  <p:childTnLst>
-                                    <p:set>
-                                      <p:cBhvr>
-                                        <p:cTn id="31" dur="1" fill="hold">
                                           <p:stCondLst>
                                             <p:cond delay="0"/>
                                           </p:stCondLst>
@@ -19055,7 +19442,7 @@
                                     </p:set>
                                     <p:anim calcmode="lin" valueType="num">
                                       <p:cBhvr>
-                                        <p:cTn id="32" dur="500" fill="hold"/>
+                                        <p:cTn id="27" dur="500" fill="hold"/>
                                         <p:tgtEl>
                                           <p:spTgt spid="9"/>
                                         </p:tgtEl>
@@ -19078,7 +19465,7 @@
                                     </p:anim>
                                     <p:anim calcmode="lin" valueType="num">
                                       <p:cBhvr>
-                                        <p:cTn id="33" dur="500" fill="hold"/>
+                                        <p:cTn id="28" dur="500" fill="hold"/>
                                         <p:tgtEl>
                                           <p:spTgt spid="9"/>
                                         </p:tgtEl>
@@ -19101,7 +19488,7 @@
                                     </p:anim>
                                     <p:animEffect transition="in" filter="fade">
                                       <p:cBhvr>
-                                        <p:cTn id="34" dur="500"/>
+                                        <p:cTn id="29" dur="500"/>
                                         <p:tgtEl>
                                           <p:spTgt spid="9"/>
                                         </p:tgtEl>
@@ -19117,26 +19504,26 @@
                     </p:cTn>
                   </p:par>
                   <p:par>
-                    <p:cTn id="35" fill="hold">
+                    <p:cTn id="30" fill="hold">
                       <p:stCondLst>
                         <p:cond delay="indefinite"/>
                       </p:stCondLst>
                       <p:childTnLst>
                         <p:par>
-                          <p:cTn id="36" fill="hold">
+                          <p:cTn id="31" fill="hold">
                             <p:stCondLst>
                               <p:cond delay="0"/>
                             </p:stCondLst>
                             <p:childTnLst>
                               <p:par>
-                                <p:cTn id="37" presetID="53" presetClass="entr" presetSubtype="16" fill="hold" nodeType="clickEffect">
+                                <p:cTn id="32" presetID="53" presetClass="entr" presetSubtype="16" fill="hold" nodeType="clickEffect">
                                   <p:stCondLst>
                                     <p:cond delay="0"/>
                                   </p:stCondLst>
                                   <p:childTnLst>
                                     <p:set>
                                       <p:cBhvr>
-                                        <p:cTn id="38" dur="1" fill="hold">
+                                        <p:cTn id="33" dur="1" fill="hold">
                                           <p:stCondLst>
                                             <p:cond delay="0"/>
                                           </p:stCondLst>
@@ -19154,7 +19541,7 @@
                                     </p:set>
                                     <p:anim calcmode="lin" valueType="num">
                                       <p:cBhvr>
-                                        <p:cTn id="39" dur="500" fill="hold"/>
+                                        <p:cTn id="34" dur="500" fill="hold"/>
                                         <p:tgtEl>
                                           <p:spTgt spid="12"/>
                                         </p:tgtEl>
@@ -19177,7 +19564,7 @@
                                     </p:anim>
                                     <p:anim calcmode="lin" valueType="num">
                                       <p:cBhvr>
-                                        <p:cTn id="40" dur="500" fill="hold"/>
+                                        <p:cTn id="35" dur="500" fill="hold"/>
                                         <p:tgtEl>
                                           <p:spTgt spid="12"/>
                                         </p:tgtEl>
@@ -19200,7 +19587,7 @@
                                     </p:anim>
                                     <p:animEffect transition="in" filter="fade">
                                       <p:cBhvr>
-                                        <p:cTn id="41" dur="500"/>
+                                        <p:cTn id="36" dur="500"/>
                                         <p:tgtEl>
                                           <p:spTgt spid="12"/>
                                         </p:tgtEl>
@@ -19216,224 +19603,26 @@
                     </p:cTn>
                   </p:par>
                   <p:par>
-                    <p:cTn id="42" fill="hold">
+                    <p:cTn id="37" fill="hold">
                       <p:stCondLst>
                         <p:cond delay="indefinite"/>
                       </p:stCondLst>
                       <p:childTnLst>
                         <p:par>
-                          <p:cTn id="43" fill="hold">
+                          <p:cTn id="38" fill="hold">
                             <p:stCondLst>
                               <p:cond delay="0"/>
                             </p:stCondLst>
                             <p:childTnLst>
                               <p:par>
-                                <p:cTn id="44" presetID="53" presetClass="entr" presetSubtype="16" fill="hold" nodeType="clickEffect">
+                                <p:cTn id="39" presetID="53" presetClass="entr" presetSubtype="16" fill="hold" nodeType="clickEffect">
                                   <p:stCondLst>
                                     <p:cond delay="0"/>
                                   </p:stCondLst>
                                   <p:childTnLst>
                                     <p:set>
                                       <p:cBhvr>
-                                        <p:cTn id="45" dur="1" fill="hold">
-                                          <p:stCondLst>
-                                            <p:cond delay="0"/>
-                                          </p:stCondLst>
-                                        </p:cTn>
-                                        <p:tgtEl>
-                                          <p:spTgt spid="19"/>
-                                        </p:tgtEl>
-                                        <p:attrNameLst>
-                                          <p:attrName>style.visibility</p:attrName>
-                                        </p:attrNameLst>
-                                      </p:cBhvr>
-                                      <p:to>
-                                        <p:strVal val="visible"/>
-                                      </p:to>
-                                    </p:set>
-                                    <p:anim calcmode="lin" valueType="num">
-                                      <p:cBhvr>
-                                        <p:cTn id="46" dur="500" fill="hold"/>
-                                        <p:tgtEl>
-                                          <p:spTgt spid="19"/>
-                                        </p:tgtEl>
-                                        <p:attrNameLst>
-                                          <p:attrName>ppt_w</p:attrName>
-                                        </p:attrNameLst>
-                                      </p:cBhvr>
-                                      <p:tavLst>
-                                        <p:tav tm="0">
-                                          <p:val>
-                                            <p:fltVal val="0"/>
-                                          </p:val>
-                                        </p:tav>
-                                        <p:tav tm="100000">
-                                          <p:val>
-                                            <p:strVal val="#ppt_w"/>
-                                          </p:val>
-                                        </p:tav>
-                                      </p:tavLst>
-                                    </p:anim>
-                                    <p:anim calcmode="lin" valueType="num">
-                                      <p:cBhvr>
-                                        <p:cTn id="47" dur="500" fill="hold"/>
-                                        <p:tgtEl>
-                                          <p:spTgt spid="19"/>
-                                        </p:tgtEl>
-                                        <p:attrNameLst>
-                                          <p:attrName>ppt_h</p:attrName>
-                                        </p:attrNameLst>
-                                      </p:cBhvr>
-                                      <p:tavLst>
-                                        <p:tav tm="0">
-                                          <p:val>
-                                            <p:fltVal val="0"/>
-                                          </p:val>
-                                        </p:tav>
-                                        <p:tav tm="100000">
-                                          <p:val>
-                                            <p:strVal val="#ppt_h"/>
-                                          </p:val>
-                                        </p:tav>
-                                      </p:tavLst>
-                                    </p:anim>
-                                    <p:animEffect transition="in" filter="fade">
-                                      <p:cBhvr>
-                                        <p:cTn id="48" dur="500"/>
-                                        <p:tgtEl>
-                                          <p:spTgt spid="19"/>
-                                        </p:tgtEl>
-                                      </p:cBhvr>
-                                    </p:animEffect>
-                                  </p:childTnLst>
-                                </p:cTn>
-                              </p:par>
-                            </p:childTnLst>
-                          </p:cTn>
-                        </p:par>
-                      </p:childTnLst>
-                    </p:cTn>
-                  </p:par>
-                  <p:par>
-                    <p:cTn id="49" fill="hold">
-                      <p:stCondLst>
-                        <p:cond delay="indefinite"/>
-                      </p:stCondLst>
-                      <p:childTnLst>
-                        <p:par>
-                          <p:cTn id="50" fill="hold">
-                            <p:stCondLst>
-                              <p:cond delay="0"/>
-                            </p:stCondLst>
-                            <p:childTnLst>
-                              <p:par>
-                                <p:cTn id="51" presetID="53" presetClass="entr" presetSubtype="16" fill="hold" nodeType="clickEffect">
-                                  <p:stCondLst>
-                                    <p:cond delay="0"/>
-                                  </p:stCondLst>
-                                  <p:childTnLst>
-                                    <p:set>
-                                      <p:cBhvr>
-                                        <p:cTn id="52" dur="1" fill="hold">
-                                          <p:stCondLst>
-                                            <p:cond delay="0"/>
-                                          </p:stCondLst>
-                                        </p:cTn>
-                                        <p:tgtEl>
-                                          <p:spTgt spid="30"/>
-                                        </p:tgtEl>
-                                        <p:attrNameLst>
-                                          <p:attrName>style.visibility</p:attrName>
-                                        </p:attrNameLst>
-                                      </p:cBhvr>
-                                      <p:to>
-                                        <p:strVal val="visible"/>
-                                      </p:to>
-                                    </p:set>
-                                    <p:anim calcmode="lin" valueType="num">
-                                      <p:cBhvr>
-                                        <p:cTn id="53" dur="500" fill="hold"/>
-                                        <p:tgtEl>
-                                          <p:spTgt spid="30"/>
-                                        </p:tgtEl>
-                                        <p:attrNameLst>
-                                          <p:attrName>ppt_w</p:attrName>
-                                        </p:attrNameLst>
-                                      </p:cBhvr>
-                                      <p:tavLst>
-                                        <p:tav tm="0">
-                                          <p:val>
-                                            <p:fltVal val="0"/>
-                                          </p:val>
-                                        </p:tav>
-                                        <p:tav tm="100000">
-                                          <p:val>
-                                            <p:strVal val="#ppt_w"/>
-                                          </p:val>
-                                        </p:tav>
-                                      </p:tavLst>
-                                    </p:anim>
-                                    <p:anim calcmode="lin" valueType="num">
-                                      <p:cBhvr>
-                                        <p:cTn id="54" dur="500" fill="hold"/>
-                                        <p:tgtEl>
-                                          <p:spTgt spid="30"/>
-                                        </p:tgtEl>
-                                        <p:attrNameLst>
-                                          <p:attrName>ppt_h</p:attrName>
-                                        </p:attrNameLst>
-                                      </p:cBhvr>
-                                      <p:tavLst>
-                                        <p:tav tm="0">
-                                          <p:val>
-                                            <p:fltVal val="0"/>
-                                          </p:val>
-                                        </p:tav>
-                                        <p:tav tm="100000">
-                                          <p:val>
-                                            <p:strVal val="#ppt_h"/>
-                                          </p:val>
-                                        </p:tav>
-                                      </p:tavLst>
-                                    </p:anim>
-                                    <p:animEffect transition="in" filter="fade">
-                                      <p:cBhvr>
-                                        <p:cTn id="55" dur="500"/>
-                                        <p:tgtEl>
-                                          <p:spTgt spid="30"/>
-                                        </p:tgtEl>
-                                      </p:cBhvr>
-                                    </p:animEffect>
-                                  </p:childTnLst>
-                                </p:cTn>
-                              </p:par>
-                            </p:childTnLst>
-                          </p:cTn>
-                        </p:par>
-                      </p:childTnLst>
-                    </p:cTn>
-                  </p:par>
-                  <p:par>
-                    <p:cTn id="56" fill="hold">
-                      <p:stCondLst>
-                        <p:cond delay="indefinite"/>
-                      </p:stCondLst>
-                      <p:childTnLst>
-                        <p:par>
-                          <p:cTn id="57" fill="hold">
-                            <p:stCondLst>
-                              <p:cond delay="0"/>
-                            </p:stCondLst>
-                            <p:childTnLst>
-                              <p:par>
-                                <p:cTn id="58" presetID="53" presetClass="entr" presetSubtype="16" fill="hold" nodeType="clickEffect">
-                                  <p:stCondLst>
-                                    <p:cond delay="0"/>
-                                  </p:stCondLst>
-                                  <p:childTnLst>
-                                    <p:set>
-                                      <p:cBhvr>
-                                        <p:cTn id="59" dur="1" fill="hold">
+                                        <p:cTn id="40" dur="1" fill="hold">
                                           <p:stCondLst>
                                             <p:cond delay="0"/>
                                           </p:stCondLst>
@@ -19451,7 +19640,7 @@
                                     </p:set>
                                     <p:anim calcmode="lin" valueType="num">
                                       <p:cBhvr>
-                                        <p:cTn id="60" dur="500" fill="hold"/>
+                                        <p:cTn id="41" dur="500" fill="hold"/>
                                         <p:tgtEl>
                                           <p:spTgt spid="32"/>
                                         </p:tgtEl>
@@ -19474,7 +19663,7 @@
                                     </p:anim>
                                     <p:anim calcmode="lin" valueType="num">
                                       <p:cBhvr>
-                                        <p:cTn id="61" dur="500" fill="hold"/>
+                                        <p:cTn id="42" dur="500" fill="hold"/>
                                         <p:tgtEl>
                                           <p:spTgt spid="32"/>
                                         </p:tgtEl>
@@ -19497,9 +19686,108 @@
                                     </p:anim>
                                     <p:animEffect transition="in" filter="fade">
                                       <p:cBhvr>
-                                        <p:cTn id="62" dur="500"/>
+                                        <p:cTn id="43" dur="500"/>
                                         <p:tgtEl>
                                           <p:spTgt spid="32"/>
+                                        </p:tgtEl>
+                                      </p:cBhvr>
+                                    </p:animEffect>
+                                  </p:childTnLst>
+                                </p:cTn>
+                              </p:par>
+                            </p:childTnLst>
+                          </p:cTn>
+                        </p:par>
+                      </p:childTnLst>
+                    </p:cTn>
+                  </p:par>
+                  <p:par>
+                    <p:cTn id="44" fill="hold">
+                      <p:stCondLst>
+                        <p:cond delay="indefinite"/>
+                      </p:stCondLst>
+                      <p:childTnLst>
+                        <p:par>
+                          <p:cTn id="45" fill="hold">
+                            <p:stCondLst>
+                              <p:cond delay="0"/>
+                            </p:stCondLst>
+                            <p:childTnLst>
+                              <p:par>
+                                <p:cTn id="46" presetID="53" presetClass="entr" presetSubtype="16" fill="hold" nodeType="clickEffect">
+                                  <p:stCondLst>
+                                    <p:cond delay="0"/>
+                                  </p:stCondLst>
+                                  <p:childTnLst>
+                                    <p:set>
+                                      <p:cBhvr>
+                                        <p:cTn id="47" dur="1" fill="hold">
+                                          <p:stCondLst>
+                                            <p:cond delay="0"/>
+                                          </p:stCondLst>
+                                        </p:cTn>
+                                        <p:tgtEl>
+                                          <p:spTgt spid="2"/>
+                                        </p:tgtEl>
+                                        <p:attrNameLst>
+                                          <p:attrName>style.visibility</p:attrName>
+                                        </p:attrNameLst>
+                                      </p:cBhvr>
+                                      <p:to>
+                                        <p:strVal val="visible"/>
+                                      </p:to>
+                                    </p:set>
+                                    <p:anim calcmode="lin" valueType="num">
+                                      <p:cBhvr>
+                                        <p:cTn id="48" dur="500" fill="hold"/>
+                                        <p:tgtEl>
+                                          <p:spTgt spid="2"/>
+                                        </p:tgtEl>
+                                        <p:attrNameLst>
+                                          <p:attrName>ppt_w</p:attrName>
+                                        </p:attrNameLst>
+                                      </p:cBhvr>
+                                      <p:tavLst>
+                                        <p:tav tm="0">
+                                          <p:val>
+                                            <p:fltVal val="0"/>
+                                          </p:val>
+                                        </p:tav>
+                                        <p:tav tm="100000">
+                                          <p:val>
+                                            <p:strVal val="#ppt_w"/>
+                                          </p:val>
+                                        </p:tav>
+                                      </p:tavLst>
+                                    </p:anim>
+                                    <p:anim calcmode="lin" valueType="num">
+                                      <p:cBhvr>
+                                        <p:cTn id="49" dur="500" fill="hold"/>
+                                        <p:tgtEl>
+                                          <p:spTgt spid="2"/>
+                                        </p:tgtEl>
+                                        <p:attrNameLst>
+                                          <p:attrName>ppt_h</p:attrName>
+                                        </p:attrNameLst>
+                                      </p:cBhvr>
+                                      <p:tavLst>
+                                        <p:tav tm="0">
+                                          <p:val>
+                                            <p:fltVal val="0"/>
+                                          </p:val>
+                                        </p:tav>
+                                        <p:tav tm="100000">
+                                          <p:val>
+                                            <p:strVal val="#ppt_h"/>
+                                          </p:val>
+                                        </p:tav>
+                                      </p:tavLst>
+                                    </p:anim>
+                                    <p:animEffect transition="in" filter="fade">
+                                      <p:cBhvr>
+                                        <p:cTn id="50" dur="500"/>
+                                        <p:tgtEl>
+                                          <p:spTgt spid="2"/>
                                         </p:tgtEl>
                                       </p:cBhvr>
                                     </p:animEffect>
@@ -19538,7 +19826,6 @@
       <p:bldP spid="5" grpId="0" animBg="1"/>
       <p:bldP spid="6" grpId="0" animBg="1"/>
       <p:bldP spid="7" grpId="0" animBg="1"/>
-      <p:bldP spid="8" grpId="0" animBg="1"/>
     </p:bldLst>
   </p:timing>
 </p:sld>
@@ -19577,7 +19864,7 @@
         </p:nvCxnSpPr>
         <p:spPr>
           <a:xfrm flipH="1">
-            <a:off x="7535342" y="4345321"/>
+            <a:off x="7535342" y="4608756"/>
             <a:ext cx="1031850" cy="0"/>
           </a:xfrm>
           <a:prstGeom prst="straightConnector1">
@@ -20341,7 +20628,7 @@
         </p:nvSpPr>
         <p:spPr>
           <a:xfrm>
-            <a:off x="8567192" y="4061433"/>
+            <a:off x="8547085" y="4385543"/>
             <a:ext cx="1216058" cy="798922"/>
           </a:xfrm>
           <a:prstGeom prst="rect">
@@ -20429,7 +20716,7 @@
         </p:nvCxnSpPr>
         <p:spPr>
           <a:xfrm>
-            <a:off x="7535342" y="4589770"/>
+            <a:off x="7535342" y="4853205"/>
             <a:ext cx="1031850" cy="0"/>
           </a:xfrm>
           <a:prstGeom prst="straightConnector1">
@@ -21067,7 +21354,7 @@
         </p:nvCxnSpPr>
         <p:spPr>
           <a:xfrm flipH="1">
-            <a:off x="9783250" y="4460894"/>
+            <a:off x="9763143" y="4785004"/>
             <a:ext cx="637213" cy="0"/>
           </a:xfrm>
           <a:prstGeom prst="straightConnector1">
@@ -21114,7 +21401,7 @@
         </p:nvSpPr>
         <p:spPr>
           <a:xfrm>
-            <a:off x="10420463" y="4061433"/>
+            <a:off x="10400356" y="4385543"/>
             <a:ext cx="1216058" cy="798922"/>
           </a:xfrm>
           <a:prstGeom prst="rect">
@@ -21200,7 +21487,7 @@
         </p:nvSpPr>
         <p:spPr>
           <a:xfrm>
-            <a:off x="10427619" y="2843829"/>
+            <a:off x="10400356" y="3415978"/>
             <a:ext cx="1216058" cy="798922"/>
           </a:xfrm>
           <a:prstGeom prst="rect">
@@ -21273,56 +21560,6 @@
           </a:p>
         </p:txBody>
       </p:sp>
-      <p:cxnSp>
-        <p:nvCxnSpPr>
-          <p:cNvPr id="81" name="Connector: Elbow 80">
-            <a:extLst>
-              <a:ext uri="{FF2B5EF4-FFF2-40B4-BE49-F238E27FC236}">
-                <a16:creationId xmlns:a16="http://schemas.microsoft.com/office/drawing/2014/main" id="{9A2BF255-D0CD-BB47-6214-0B9C596898F4}"/>
-              </a:ext>
-            </a:extLst>
-          </p:cNvPr>
-          <p:cNvCxnSpPr>
-            <a:cxnSpLocks/>
-            <a:endCxn id="80" idx="1"/>
-          </p:cNvCxnSpPr>
-          <p:nvPr/>
-        </p:nvCxnSpPr>
-        <p:spPr>
-          <a:xfrm flipV="1">
-            <a:off x="7535342" y="3243290"/>
-            <a:ext cx="2892277" cy="808844"/>
-          </a:xfrm>
-          <a:prstGeom prst="bentConnector3">
-            <a:avLst>
-              <a:gd name="adj1" fmla="val 7636"/>
-            </a:avLst>
-          </a:prstGeom>
-          <a:ln w="50800" cap="flat" cmpd="sng" algn="ctr">
-            <a:solidFill>
-              <a:schemeClr val="dk1"/>
-            </a:solidFill>
-            <a:prstDash val="solid"/>
-            <a:round/>
-            <a:headEnd type="none" w="med" len="med"/>
-            <a:tailEnd type="arrow" w="med" len="med"/>
-          </a:ln>
-        </p:spPr>
-        <p:style>
-          <a:lnRef idx="0">
-            <a:scrgbClr r="0" g="0" b="0"/>
-          </a:lnRef>
-          <a:fillRef idx="0">
-            <a:scrgbClr r="0" g="0" b="0"/>
-          </a:fillRef>
-          <a:effectRef idx="0">
-            <a:scrgbClr r="0" g="0" b="0"/>
-          </a:effectRef>
-          <a:fontRef idx="minor">
-            <a:schemeClr val="tx1"/>
-          </a:fontRef>
-        </p:style>
-      </p:cxnSp>
       <p:sp>
         <p:nvSpPr>
           <p:cNvPr id="94" name="Rectangle 93">
@@ -21575,7 +21812,7 @@
         </p:nvSpPr>
         <p:spPr>
           <a:xfrm>
-            <a:off x="8035106" y="2896538"/>
+            <a:off x="8296359" y="3687818"/>
             <a:ext cx="1717509" cy="369332"/>
           </a:xfrm>
           <a:prstGeom prst="rect">
@@ -21883,137 +22120,6 @@
             <a:round/>
             <a:headEnd type="arrow" w="med" len="med"/>
             <a:tailEnd type="none" w="med" len="med"/>
-          </a:ln>
-        </p:spPr>
-        <p:style>
-          <a:lnRef idx="0">
-            <a:scrgbClr r="0" g="0" b="0"/>
-          </a:lnRef>
-          <a:fillRef idx="0">
-            <a:scrgbClr r="0" g="0" b="0"/>
-          </a:fillRef>
-          <a:effectRef idx="0">
-            <a:scrgbClr r="0" g="0" b="0"/>
-          </a:effectRef>
-          <a:fontRef idx="minor">
-            <a:schemeClr val="tx1"/>
-          </a:fontRef>
-        </p:style>
-      </p:cxnSp>
-      <p:sp>
-        <p:nvSpPr>
-          <p:cNvPr id="66" name="Rectangle 65">
-            <a:extLst>
-              <a:ext uri="{FF2B5EF4-FFF2-40B4-BE49-F238E27FC236}">
-                <a16:creationId xmlns:a16="http://schemas.microsoft.com/office/drawing/2014/main" id="{AC876E1D-6389-EDBC-3740-2441CBCB4214}"/>
-              </a:ext>
-            </a:extLst>
-          </p:cNvPr>
-          <p:cNvSpPr/>
-          <p:nvPr/>
-        </p:nvSpPr>
-        <p:spPr>
-          <a:xfrm>
-            <a:off x="6835209" y="5599713"/>
-            <a:ext cx="1216058" cy="702230"/>
-          </a:xfrm>
-          <a:prstGeom prst="rect">
-            <a:avLst/>
-          </a:prstGeom>
-          <a:solidFill>
-            <a:srgbClr val="00B0F0"/>
-          </a:solidFill>
-          <a:ln>
-            <a:noFill/>
-          </a:ln>
-          <a:effectLst>
-            <a:outerShdw blurRad="44450" dist="27940" dir="5400000" algn="ctr">
-              <a:srgbClr val="000000">
-                <a:alpha val="32000"/>
-              </a:srgbClr>
-            </a:outerShdw>
-          </a:effectLst>
-          <a:scene3d>
-            <a:camera prst="orthographicFront">
-              <a:rot lat="0" lon="0" rev="0"/>
-            </a:camera>
-            <a:lightRig rig="balanced" dir="t">
-              <a:rot lat="0" lon="0" rev="8700000"/>
-            </a:lightRig>
-          </a:scene3d>
-          <a:sp3d>
-            <a:bevelT w="190500" h="38100"/>
-          </a:sp3d>
-        </p:spPr>
-        <p:style>
-          <a:lnRef idx="2">
-            <a:schemeClr val="accent1">
-              <a:shade val="15000"/>
-            </a:schemeClr>
-          </a:lnRef>
-          <a:fillRef idx="1">
-            <a:schemeClr val="accent1"/>
-          </a:fillRef>
-          <a:effectRef idx="0">
-            <a:schemeClr val="accent1"/>
-          </a:effectRef>
-          <a:fontRef idx="minor">
-            <a:schemeClr val="lt1"/>
-          </a:fontRef>
-        </p:style>
-        <p:txBody>
-          <a:bodyPr rtlCol="0" anchor="ctr"/>
-          <a:lstStyle/>
-          <a:p>
-            <a:pPr algn="ctr"/>
-            <a:r>
-              <a:rPr lang="en-US" b="1" dirty="0">
-                <a:solidFill>
-                  <a:sysClr val="windowText" lastClr="000000"/>
-                </a:solidFill>
-                <a:cs typeface="Arial" panose="020B0604020202020204" pitchFamily="34" charset="0"/>
-              </a:rPr>
-              <a:t>Arduino</a:t>
-            </a:r>
-            <a:endParaRPr lang="en-IL" b="1" dirty="0">
-              <a:solidFill>
-                <a:sysClr val="windowText" lastClr="000000"/>
-              </a:solidFill>
-              <a:cs typeface="Arial" panose="020B0604020202020204" pitchFamily="34" charset="0"/>
-            </a:endParaRPr>
-          </a:p>
-        </p:txBody>
-      </p:sp>
-      <p:cxnSp>
-        <p:nvCxnSpPr>
-          <p:cNvPr id="67" name="Straight Arrow Connector 66">
-            <a:extLst>
-              <a:ext uri="{FF2B5EF4-FFF2-40B4-BE49-F238E27FC236}">
-                <a16:creationId xmlns:a16="http://schemas.microsoft.com/office/drawing/2014/main" id="{0B9E767D-B635-756F-381A-1218615B56C9}"/>
-              </a:ext>
-            </a:extLst>
-          </p:cNvPr>
-          <p:cNvCxnSpPr>
-            <a:cxnSpLocks/>
-          </p:cNvCxnSpPr>
-          <p:nvPr/>
-        </p:nvCxnSpPr>
-        <p:spPr>
-          <a:xfrm flipV="1">
-            <a:off x="7149911" y="4996521"/>
-            <a:ext cx="0" cy="666779"/>
-          </a:xfrm>
-          <a:prstGeom prst="straightConnector1">
-            <a:avLst/>
-          </a:prstGeom>
-          <a:ln w="53975" cap="flat" cmpd="sng" algn="ctr">
-            <a:solidFill>
-              <a:srgbClr val="01FF00"/>
-            </a:solidFill>
-            <a:prstDash val="solid"/>
-            <a:round/>
-            <a:headEnd type="none" w="med" len="med"/>
-            <a:tailEnd type="arrow" w="med" len="med"/>
           </a:ln>
         </p:spPr>
         <p:style>
@@ -22242,6 +22348,53 @@
               </a:schemeClr>
             </a:solidFill>
             <a:prstDash val="solid"/>
+            <a:round/>
+            <a:headEnd type="none" w="med" len="med"/>
+            <a:tailEnd type="arrow" w="med" len="med"/>
+          </a:ln>
+        </p:spPr>
+        <p:style>
+          <a:lnRef idx="0">
+            <a:scrgbClr r="0" g="0" b="0"/>
+          </a:lnRef>
+          <a:fillRef idx="0">
+            <a:scrgbClr r="0" g="0" b="0"/>
+          </a:fillRef>
+          <a:effectRef idx="0">
+            <a:scrgbClr r="0" g="0" b="0"/>
+          </a:effectRef>
+          <a:fontRef idx="minor">
+            <a:schemeClr val="tx1"/>
+          </a:fontRef>
+        </p:style>
+      </p:cxnSp>
+      <p:cxnSp>
+        <p:nvCxnSpPr>
+          <p:cNvPr id="8" name="Straight Arrow Connector 7">
+            <a:extLst>
+              <a:ext uri="{FF2B5EF4-FFF2-40B4-BE49-F238E27FC236}">
+                <a16:creationId xmlns:a16="http://schemas.microsoft.com/office/drawing/2014/main" id="{4338EA67-8F7D-A749-3396-FCE49CE398E7}"/>
+              </a:ext>
+            </a:extLst>
+          </p:cNvPr>
+          <p:cNvCxnSpPr>
+            <a:cxnSpLocks/>
+          </p:cNvCxnSpPr>
+          <p:nvPr/>
+        </p:nvCxnSpPr>
+        <p:spPr>
+          <a:xfrm flipV="1">
+            <a:off x="7567412" y="4052395"/>
+            <a:ext cx="2832944" cy="1889"/>
+          </a:xfrm>
+          <a:prstGeom prst="straightConnector1">
+            <a:avLst/>
+          </a:prstGeom>
+          <a:ln w="57150" cap="flat" cmpd="sng" algn="ctr">
+            <a:solidFill>
+              <a:schemeClr val="tx1"/>
+            </a:solidFill>
+            <a:prstDash val="sysDash"/>
             <a:round/>
             <a:headEnd type="none" w="med" len="med"/>
             <a:tailEnd type="arrow" w="med" len="med"/>
@@ -23925,7 +24078,7 @@
                                           </p:stCondLst>
                                         </p:cTn>
                                         <p:tgtEl>
-                                          <p:spTgt spid="66"/>
+                                          <p:spTgt spid="17"/>
                                         </p:tgtEl>
                                         <p:attrNameLst>
                                           <p:attrName>style.visibility</p:attrName>
@@ -23939,7 +24092,7 @@
                                       <p:cBhvr>
                                         <p:cTn id="134" dur="500"/>
                                         <p:tgtEl>
-                                          <p:spTgt spid="66"/>
+                                          <p:spTgt spid="17"/>
                                         </p:tgtEl>
                                       </p:cBhvr>
                                     </p:animEffect>
@@ -23978,7 +24131,7 @@
                                           </p:stCondLst>
                                         </p:cTn>
                                         <p:tgtEl>
-                                          <p:spTgt spid="67"/>
+                                          <p:spTgt spid="41"/>
                                         </p:tgtEl>
                                         <p:attrNameLst>
                                           <p:attrName>style.visibility</p:attrName>
@@ -23992,7 +24145,7 @@
                                       <p:cBhvr>
                                         <p:cTn id="139" dur="500" fill="hold"/>
                                         <p:tgtEl>
-                                          <p:spTgt spid="67"/>
+                                          <p:spTgt spid="41"/>
                                         </p:tgtEl>
                                         <p:attrNameLst>
                                           <p:attrName>ppt_w</p:attrName>
@@ -24015,7 +24168,7 @@
                                       <p:cBhvr>
                                         <p:cTn id="140" dur="500" fill="hold"/>
                                         <p:tgtEl>
-                                          <p:spTgt spid="67"/>
+                                          <p:spTgt spid="41"/>
                                         </p:tgtEl>
                                         <p:attrNameLst>
                                           <p:attrName>ppt_h</p:attrName>
@@ -24038,7 +24191,7 @@
                                       <p:cBhvr>
                                         <p:cTn id="141" dur="500"/>
                                         <p:tgtEl>
-                                          <p:spTgt spid="67"/>
+                                          <p:spTgt spid="41"/>
                                         </p:tgtEl>
                                       </p:cBhvr>
                                     </p:animEffect>
@@ -24064,7 +24217,7 @@
                             </p:stCondLst>
                             <p:childTnLst>
                               <p:par>
-                                <p:cTn id="144" presetID="10" presetClass="entr" presetSubtype="0" fill="hold" grpId="0" nodeType="clickEffect">
+                                <p:cTn id="144" presetID="53" presetClass="entr" presetSubtype="16" fill="hold" nodeType="clickEffect">
                                   <p:stCondLst>
                                     <p:cond delay="0"/>
                                   </p:stCondLst>
@@ -24072,158 +24225,6 @@
                                     <p:set>
                                       <p:cBhvr>
                                         <p:cTn id="145" dur="1" fill="hold">
-                                          <p:stCondLst>
-                                            <p:cond delay="0"/>
-                                          </p:stCondLst>
-                                        </p:cTn>
-                                        <p:tgtEl>
-                                          <p:spTgt spid="17"/>
-                                        </p:tgtEl>
-                                        <p:attrNameLst>
-                                          <p:attrName>style.visibility</p:attrName>
-                                        </p:attrNameLst>
-                                      </p:cBhvr>
-                                      <p:to>
-                                        <p:strVal val="visible"/>
-                                      </p:to>
-                                    </p:set>
-                                    <p:animEffect transition="in" filter="fade">
-                                      <p:cBhvr>
-                                        <p:cTn id="146" dur="500"/>
-                                        <p:tgtEl>
-                                          <p:spTgt spid="17"/>
-                                        </p:tgtEl>
-                                      </p:cBhvr>
-                                    </p:animEffect>
-                                  </p:childTnLst>
-                                </p:cTn>
-                              </p:par>
-                            </p:childTnLst>
-                          </p:cTn>
-                        </p:par>
-                      </p:childTnLst>
-                    </p:cTn>
-                  </p:par>
-                  <p:par>
-                    <p:cTn id="147" fill="hold">
-                      <p:stCondLst>
-                        <p:cond delay="indefinite"/>
-                      </p:stCondLst>
-                      <p:childTnLst>
-                        <p:par>
-                          <p:cTn id="148" fill="hold">
-                            <p:stCondLst>
-                              <p:cond delay="0"/>
-                            </p:stCondLst>
-                            <p:childTnLst>
-                              <p:par>
-                                <p:cTn id="149" presetID="53" presetClass="entr" presetSubtype="16" fill="hold" nodeType="clickEffect">
-                                  <p:stCondLst>
-                                    <p:cond delay="0"/>
-                                  </p:stCondLst>
-                                  <p:childTnLst>
-                                    <p:set>
-                                      <p:cBhvr>
-                                        <p:cTn id="150" dur="1" fill="hold">
-                                          <p:stCondLst>
-                                            <p:cond delay="0"/>
-                                          </p:stCondLst>
-                                        </p:cTn>
-                                        <p:tgtEl>
-                                          <p:spTgt spid="41"/>
-                                        </p:tgtEl>
-                                        <p:attrNameLst>
-                                          <p:attrName>style.visibility</p:attrName>
-                                        </p:attrNameLst>
-                                      </p:cBhvr>
-                                      <p:to>
-                                        <p:strVal val="visible"/>
-                                      </p:to>
-                                    </p:set>
-                                    <p:anim calcmode="lin" valueType="num">
-                                      <p:cBhvr>
-                                        <p:cTn id="151" dur="500" fill="hold"/>
-                                        <p:tgtEl>
-                                          <p:spTgt spid="41"/>
-                                        </p:tgtEl>
-                                        <p:attrNameLst>
-                                          <p:attrName>ppt_w</p:attrName>
-                                        </p:attrNameLst>
-                                      </p:cBhvr>
-                                      <p:tavLst>
-                                        <p:tav tm="0">
-                                          <p:val>
-                                            <p:fltVal val="0"/>
-                                          </p:val>
-                                        </p:tav>
-                                        <p:tav tm="100000">
-                                          <p:val>
-                                            <p:strVal val="#ppt_w"/>
-                                          </p:val>
-                                        </p:tav>
-                                      </p:tavLst>
-                                    </p:anim>
-                                    <p:anim calcmode="lin" valueType="num">
-                                      <p:cBhvr>
-                                        <p:cTn id="152" dur="500" fill="hold"/>
-                                        <p:tgtEl>
-                                          <p:spTgt spid="41"/>
-                                        </p:tgtEl>
-                                        <p:attrNameLst>
-                                          <p:attrName>ppt_h</p:attrName>
-                                        </p:attrNameLst>
-                                      </p:cBhvr>
-                                      <p:tavLst>
-                                        <p:tav tm="0">
-                                          <p:val>
-                                            <p:fltVal val="0"/>
-                                          </p:val>
-                                        </p:tav>
-                                        <p:tav tm="100000">
-                                          <p:val>
-                                            <p:strVal val="#ppt_h"/>
-                                          </p:val>
-                                        </p:tav>
-                                      </p:tavLst>
-                                    </p:anim>
-                                    <p:animEffect transition="in" filter="fade">
-                                      <p:cBhvr>
-                                        <p:cTn id="153" dur="500"/>
-                                        <p:tgtEl>
-                                          <p:spTgt spid="41"/>
-                                        </p:tgtEl>
-                                      </p:cBhvr>
-                                    </p:animEffect>
-                                  </p:childTnLst>
-                                </p:cTn>
-                              </p:par>
-                            </p:childTnLst>
-                          </p:cTn>
-                        </p:par>
-                      </p:childTnLst>
-                    </p:cTn>
-                  </p:par>
-                  <p:par>
-                    <p:cTn id="154" fill="hold">
-                      <p:stCondLst>
-                        <p:cond delay="indefinite"/>
-                      </p:stCondLst>
-                      <p:childTnLst>
-                        <p:par>
-                          <p:cTn id="155" fill="hold">
-                            <p:stCondLst>
-                              <p:cond delay="0"/>
-                            </p:stCondLst>
-                            <p:childTnLst>
-                              <p:par>
-                                <p:cTn id="156" presetID="53" presetClass="entr" presetSubtype="16" fill="hold" nodeType="clickEffect">
-                                  <p:stCondLst>
-                                    <p:cond delay="0"/>
-                                  </p:stCondLst>
-                                  <p:childTnLst>
-                                    <p:set>
-                                      <p:cBhvr>
-                                        <p:cTn id="157" dur="1" fill="hold">
                                           <p:stCondLst>
                                             <p:cond delay="0"/>
                                           </p:stCondLst>
@@ -24241,7 +24242,7 @@
                                     </p:set>
                                     <p:anim calcmode="lin" valueType="num">
                                       <p:cBhvr>
-                                        <p:cTn id="158" dur="500" fill="hold"/>
+                                        <p:cTn id="146" dur="500" fill="hold"/>
                                         <p:tgtEl>
                                           <p:spTgt spid="61"/>
                                         </p:tgtEl>
@@ -24264,7 +24265,7 @@
                                     </p:anim>
                                     <p:anim calcmode="lin" valueType="num">
                                       <p:cBhvr>
-                                        <p:cTn id="159" dur="500" fill="hold"/>
+                                        <p:cTn id="147" dur="500" fill="hold"/>
                                         <p:tgtEl>
                                           <p:spTgt spid="61"/>
                                         </p:tgtEl>
@@ -24287,9 +24288,108 @@
                                     </p:anim>
                                     <p:animEffect transition="in" filter="fade">
                                       <p:cBhvr>
-                                        <p:cTn id="160" dur="500"/>
+                                        <p:cTn id="148" dur="500"/>
                                         <p:tgtEl>
                                           <p:spTgt spid="61"/>
+                                        </p:tgtEl>
+                                      </p:cBhvr>
+                                    </p:animEffect>
+                                  </p:childTnLst>
+                                </p:cTn>
+                              </p:par>
+                            </p:childTnLst>
+                          </p:cTn>
+                        </p:par>
+                      </p:childTnLst>
+                    </p:cTn>
+                  </p:par>
+                  <p:par>
+                    <p:cTn id="149" fill="hold">
+                      <p:stCondLst>
+                        <p:cond delay="indefinite"/>
+                      </p:stCondLst>
+                      <p:childTnLst>
+                        <p:par>
+                          <p:cTn id="150" fill="hold">
+                            <p:stCondLst>
+                              <p:cond delay="0"/>
+                            </p:stCondLst>
+                            <p:childTnLst>
+                              <p:par>
+                                <p:cTn id="151" presetID="53" presetClass="entr" presetSubtype="16" fill="hold" nodeType="clickEffect">
+                                  <p:stCondLst>
+                                    <p:cond delay="0"/>
+                                  </p:stCondLst>
+                                  <p:childTnLst>
+                                    <p:set>
+                                      <p:cBhvr>
+                                        <p:cTn id="152" dur="1" fill="hold">
+                                          <p:stCondLst>
+                                            <p:cond delay="0"/>
+                                          </p:stCondLst>
+                                        </p:cTn>
+                                        <p:tgtEl>
+                                          <p:spTgt spid="8"/>
+                                        </p:tgtEl>
+                                        <p:attrNameLst>
+                                          <p:attrName>style.visibility</p:attrName>
+                                        </p:attrNameLst>
+                                      </p:cBhvr>
+                                      <p:to>
+                                        <p:strVal val="visible"/>
+                                      </p:to>
+                                    </p:set>
+                                    <p:anim calcmode="lin" valueType="num">
+                                      <p:cBhvr>
+                                        <p:cTn id="153" dur="500" fill="hold"/>
+                                        <p:tgtEl>
+                                          <p:spTgt spid="8"/>
+                                        </p:tgtEl>
+                                        <p:attrNameLst>
+                                          <p:attrName>ppt_w</p:attrName>
+                                        </p:attrNameLst>
+                                      </p:cBhvr>
+                                      <p:tavLst>
+                                        <p:tav tm="0">
+                                          <p:val>
+                                            <p:fltVal val="0"/>
+                                          </p:val>
+                                        </p:tav>
+                                        <p:tav tm="100000">
+                                          <p:val>
+                                            <p:strVal val="#ppt_w"/>
+                                          </p:val>
+                                        </p:tav>
+                                      </p:tavLst>
+                                    </p:anim>
+                                    <p:anim calcmode="lin" valueType="num">
+                                      <p:cBhvr>
+                                        <p:cTn id="154" dur="500" fill="hold"/>
+                                        <p:tgtEl>
+                                          <p:spTgt spid="8"/>
+                                        </p:tgtEl>
+                                        <p:attrNameLst>
+                                          <p:attrName>ppt_h</p:attrName>
+                                        </p:attrNameLst>
+                                      </p:cBhvr>
+                                      <p:tavLst>
+                                        <p:tav tm="0">
+                                          <p:val>
+                                            <p:fltVal val="0"/>
+                                          </p:val>
+                                        </p:tav>
+                                        <p:tav tm="100000">
+                                          <p:val>
+                                            <p:strVal val="#ppt_h"/>
+                                          </p:val>
+                                        </p:tav>
+                                      </p:tavLst>
+                                    </p:anim>
+                                    <p:animEffect transition="in" filter="fade">
+                                      <p:cBhvr>
+                                        <p:cTn id="155" dur="500"/>
+                                        <p:tgtEl>
+                                          <p:spTgt spid="8"/>
                                         </p:tgtEl>
                                       </p:cBhvr>
                                     </p:animEffect>
@@ -24334,7 +24434,6 @@
       <p:bldP spid="76" grpId="0" animBg="1"/>
       <p:bldP spid="80" grpId="0" animBg="1"/>
       <p:bldP spid="94" grpId="0" animBg="1"/>
-      <p:bldP spid="66" grpId="0" animBg="1"/>
       <p:bldP spid="17" grpId="0" animBg="1"/>
     </p:bldLst>
   </p:timing>
@@ -24875,8 +24974,8 @@
         </p:nvSpPr>
         <p:spPr>
           <a:xfrm>
-            <a:off x="6167564" y="2828459"/>
-            <a:ext cx="2063892" cy="369332"/>
+            <a:off x="6167563" y="2828459"/>
+            <a:ext cx="3151393" cy="369332"/>
           </a:xfrm>
           <a:prstGeom prst="rect">
             <a:avLst/>
@@ -24891,7 +24990,7 @@
           <a:p>
             <a:r>
               <a:rPr lang="en-US" dirty="0"/>
-              <a:t>For Barcode reader</a:t>
+              <a:t>For Barcode reader &amp; screen</a:t>
             </a:r>
             <a:endParaRPr lang="en-IL" dirty="0"/>
           </a:p>
@@ -25955,8 +26054,8 @@
         </p:nvSpPr>
         <p:spPr>
           <a:xfrm>
-            <a:off x="2390097" y="3616009"/>
-            <a:ext cx="1216057" cy="702231"/>
+            <a:off x="2362201" y="3567664"/>
+            <a:ext cx="1243952" cy="798921"/>
           </a:xfrm>
           <a:prstGeom prst="rect">
             <a:avLst/>
@@ -26094,15 +26193,15 @@
             <a:r>
               <a:rPr lang="en-US" sz="2800" b="1" dirty="0">
                 <a:solidFill>
-                  <a:sysClr val="windowText" lastClr="000000"/>
+                  <a:schemeClr val="tx1"/>
                 </a:solidFill>
                 <a:cs typeface="Arial" panose="020B0604020202020204" pitchFamily="34" charset="0"/>
               </a:rPr>
-              <a:t>PCB</a:t>
+              <a:t>ESP32</a:t>
             </a:r>
             <a:endParaRPr lang="en-IL" sz="2800" b="1" dirty="0">
               <a:solidFill>
-                <a:sysClr val="windowText" lastClr="000000"/>
+                <a:schemeClr val="tx1"/>
               </a:solidFill>
               <a:cs typeface="Arial" panose="020B0604020202020204" pitchFamily="34" charset="0"/>
             </a:endParaRPr>
@@ -26330,10 +26429,170 @@
       </p:sp>
       <p:sp>
         <p:nvSpPr>
-          <p:cNvPr id="80" name="Rectangle 79">
+          <p:cNvPr id="117" name="TextBox 116">
             <a:extLst>
               <a:ext uri="{FF2B5EF4-FFF2-40B4-BE49-F238E27FC236}">
-                <a16:creationId xmlns:a16="http://schemas.microsoft.com/office/drawing/2014/main" id="{07D6BF6C-0335-4B8A-A0A3-56C47E695A6D}"/>
+                <a16:creationId xmlns:a16="http://schemas.microsoft.com/office/drawing/2014/main" id="{083CFD61-74A9-CDDE-822E-9483DE27E68F}"/>
+              </a:ext>
+            </a:extLst>
+          </p:cNvPr>
+          <p:cNvSpPr txBox="1"/>
+          <p:nvPr/>
+        </p:nvSpPr>
+        <p:spPr>
+          <a:xfrm>
+            <a:off x="3671886" y="3671585"/>
+            <a:ext cx="1012664" cy="369332"/>
+          </a:xfrm>
+          <a:prstGeom prst="rect">
+            <a:avLst/>
+          </a:prstGeom>
+          <a:noFill/>
+        </p:spPr>
+        <p:txBody>
+          <a:bodyPr wrap="square" rtlCol="0">
+            <a:spAutoFit/>
+          </a:bodyPr>
+          <a:lstStyle/>
+          <a:p>
+            <a:pPr algn="ctr"/>
+            <a:r>
+              <a:rPr lang="en-US" b="1" dirty="0"/>
+              <a:t>SPI</a:t>
+            </a:r>
+            <a:endParaRPr lang="en-IL" b="1" dirty="0"/>
+          </a:p>
+        </p:txBody>
+      </p:sp>
+      <p:cxnSp>
+        <p:nvCxnSpPr>
+          <p:cNvPr id="29" name="Straight Arrow Connector 28">
+            <a:extLst>
+              <a:ext uri="{FF2B5EF4-FFF2-40B4-BE49-F238E27FC236}">
+                <a16:creationId xmlns:a16="http://schemas.microsoft.com/office/drawing/2014/main" id="{645A6E61-7CB9-3597-6DA6-019F726F114B}"/>
+              </a:ext>
+            </a:extLst>
+          </p:cNvPr>
+          <p:cNvCxnSpPr>
+            <a:cxnSpLocks/>
+            <a:stCxn id="11" idx="1"/>
+            <a:endCxn id="9" idx="3"/>
+          </p:cNvCxnSpPr>
+          <p:nvPr/>
+        </p:nvCxnSpPr>
+        <p:spPr>
+          <a:xfrm flipH="1">
+            <a:off x="3606153" y="3967125"/>
+            <a:ext cx="1144130" cy="0"/>
+          </a:xfrm>
+          <a:prstGeom prst="straightConnector1">
+            <a:avLst/>
+          </a:prstGeom>
+          <a:ln w="57150" cap="flat" cmpd="sng" algn="ctr">
+            <a:solidFill>
+              <a:srgbClr val="01FF00"/>
+            </a:solidFill>
+            <a:prstDash val="solid"/>
+            <a:round/>
+            <a:headEnd type="arrow" w="med" len="med"/>
+            <a:tailEnd type="arrow" w="med" len="med"/>
+          </a:ln>
+        </p:spPr>
+        <p:style>
+          <a:lnRef idx="0">
+            <a:scrgbClr r="0" g="0" b="0"/>
+          </a:lnRef>
+          <a:fillRef idx="0">
+            <a:scrgbClr r="0" g="0" b="0"/>
+          </a:fillRef>
+          <a:effectRef idx="0">
+            <a:scrgbClr r="0" g="0" b="0"/>
+          </a:effectRef>
+          <a:fontRef idx="minor">
+            <a:schemeClr val="tx1"/>
+          </a:fontRef>
+        </p:style>
+      </p:cxnSp>
+      <p:sp>
+        <p:nvSpPr>
+          <p:cNvPr id="41" name="TextBox 40">
+            <a:extLst>
+              <a:ext uri="{FF2B5EF4-FFF2-40B4-BE49-F238E27FC236}">
+                <a16:creationId xmlns:a16="http://schemas.microsoft.com/office/drawing/2014/main" id="{645D09E2-0D09-3028-02E8-E53009B866E5}"/>
+              </a:ext>
+            </a:extLst>
+          </p:cNvPr>
+          <p:cNvSpPr txBox="1"/>
+          <p:nvPr/>
+        </p:nvSpPr>
+        <p:spPr>
+          <a:xfrm>
+            <a:off x="6784646" y="3612858"/>
+            <a:ext cx="1012664" cy="369332"/>
+          </a:xfrm>
+          <a:prstGeom prst="rect">
+            <a:avLst/>
+          </a:prstGeom>
+          <a:noFill/>
+        </p:spPr>
+        <p:txBody>
+          <a:bodyPr wrap="square" rtlCol="0">
+            <a:spAutoFit/>
+          </a:bodyPr>
+          <a:lstStyle/>
+          <a:p>
+            <a:pPr algn="ctr"/>
+            <a:r>
+              <a:rPr lang="en-US" b="1" dirty="0"/>
+              <a:t>UART</a:t>
+            </a:r>
+            <a:endParaRPr lang="en-IL" b="1" dirty="0"/>
+          </a:p>
+        </p:txBody>
+      </p:sp>
+      <p:sp>
+        <p:nvSpPr>
+          <p:cNvPr id="42" name="TextBox 41">
+            <a:extLst>
+              <a:ext uri="{FF2B5EF4-FFF2-40B4-BE49-F238E27FC236}">
+                <a16:creationId xmlns:a16="http://schemas.microsoft.com/office/drawing/2014/main" id="{02AE3EBD-C801-FDB8-A3B8-74EE52F67283}"/>
+              </a:ext>
+            </a:extLst>
+          </p:cNvPr>
+          <p:cNvSpPr txBox="1"/>
+          <p:nvPr/>
+        </p:nvSpPr>
+        <p:spPr>
+          <a:xfrm>
+            <a:off x="5032601" y="4691821"/>
+            <a:ext cx="1012664" cy="369332"/>
+          </a:xfrm>
+          <a:prstGeom prst="rect">
+            <a:avLst/>
+          </a:prstGeom>
+          <a:noFill/>
+        </p:spPr>
+        <p:txBody>
+          <a:bodyPr wrap="square" rtlCol="0">
+            <a:spAutoFit/>
+          </a:bodyPr>
+          <a:lstStyle/>
+          <a:p>
+            <a:pPr algn="ctr"/>
+            <a:r>
+              <a:rPr lang="en-US" b="1" dirty="0"/>
+              <a:t>SPI</a:t>
+            </a:r>
+            <a:endParaRPr lang="en-IL" b="1" dirty="0"/>
+          </a:p>
+        </p:txBody>
+      </p:sp>
+      <p:sp>
+        <p:nvSpPr>
+          <p:cNvPr id="17" name="Rectangle 16">
+            <a:extLst>
+              <a:ext uri="{FF2B5EF4-FFF2-40B4-BE49-F238E27FC236}">
+                <a16:creationId xmlns:a16="http://schemas.microsoft.com/office/drawing/2014/main" id="{791072E3-BEE0-90D9-0E9A-1BC659B031B2}"/>
               </a:ext>
             </a:extLst>
           </p:cNvPr>
@@ -26342,8 +26601,177 @@
         </p:nvSpPr>
         <p:spPr>
           <a:xfrm>
-            <a:off x="5126569" y="1793638"/>
-            <a:ext cx="1216058" cy="702230"/>
+            <a:off x="4373559" y="1723118"/>
+            <a:ext cx="1216058" cy="798922"/>
+          </a:xfrm>
+          <a:prstGeom prst="rect">
+            <a:avLst/>
+          </a:prstGeom>
+          <a:solidFill>
+            <a:schemeClr val="accent4"/>
+          </a:solidFill>
+          <a:ln>
+            <a:noFill/>
+          </a:ln>
+          <a:effectLst>
+            <a:outerShdw blurRad="44450" dist="27940" dir="5400000" algn="ctr">
+              <a:srgbClr val="000000">
+                <a:alpha val="32000"/>
+              </a:srgbClr>
+            </a:outerShdw>
+          </a:effectLst>
+          <a:scene3d>
+            <a:camera prst="orthographicFront">
+              <a:rot lat="0" lon="0" rev="0"/>
+            </a:camera>
+            <a:lightRig rig="balanced" dir="t">
+              <a:rot lat="0" lon="0" rev="8700000"/>
+            </a:lightRig>
+          </a:scene3d>
+          <a:sp3d>
+            <a:bevelT w="190500" h="38100"/>
+          </a:sp3d>
+        </p:spPr>
+        <p:style>
+          <a:lnRef idx="2">
+            <a:schemeClr val="accent1">
+              <a:shade val="15000"/>
+            </a:schemeClr>
+          </a:lnRef>
+          <a:fillRef idx="1">
+            <a:schemeClr val="accent1"/>
+          </a:fillRef>
+          <a:effectRef idx="0">
+            <a:schemeClr val="accent1"/>
+          </a:effectRef>
+          <a:fontRef idx="minor">
+            <a:schemeClr val="lt1"/>
+          </a:fontRef>
+        </p:style>
+        <p:txBody>
+          <a:bodyPr rtlCol="0" anchor="ctr"/>
+          <a:lstStyle/>
+          <a:p>
+            <a:pPr algn="ctr"/>
+            <a:r>
+              <a:rPr lang="en-US" b="1" dirty="0">
+                <a:solidFill>
+                  <a:schemeClr val="tx1"/>
+                </a:solidFill>
+                <a:cs typeface="Arial" panose="020B0604020202020204" pitchFamily="34" charset="0"/>
+              </a:rPr>
+              <a:t>RTC</a:t>
+            </a:r>
+            <a:endParaRPr lang="en-IL" b="1" dirty="0">
+              <a:solidFill>
+                <a:schemeClr val="tx1"/>
+              </a:solidFill>
+              <a:cs typeface="Arial" panose="020B0604020202020204" pitchFamily="34" charset="0"/>
+            </a:endParaRPr>
+          </a:p>
+        </p:txBody>
+      </p:sp>
+      <p:cxnSp>
+        <p:nvCxnSpPr>
+          <p:cNvPr id="22" name="Straight Arrow Connector 21">
+            <a:extLst>
+              <a:ext uri="{FF2B5EF4-FFF2-40B4-BE49-F238E27FC236}">
+                <a16:creationId xmlns:a16="http://schemas.microsoft.com/office/drawing/2014/main" id="{696A45B4-8498-C903-733D-1E056EEED4A9}"/>
+              </a:ext>
+            </a:extLst>
+          </p:cNvPr>
+          <p:cNvCxnSpPr>
+            <a:cxnSpLocks/>
+            <a:endCxn id="17" idx="2"/>
+          </p:cNvCxnSpPr>
+          <p:nvPr/>
+        </p:nvCxnSpPr>
+        <p:spPr>
+          <a:xfrm flipV="1">
+            <a:off x="4981588" y="2522040"/>
+            <a:ext cx="0" cy="906960"/>
+          </a:xfrm>
+          <a:prstGeom prst="straightConnector1">
+            <a:avLst/>
+          </a:prstGeom>
+          <a:ln w="53975" cap="flat" cmpd="sng" algn="ctr">
+            <a:solidFill>
+              <a:srgbClr val="01FF00"/>
+            </a:solidFill>
+            <a:prstDash val="solid"/>
+            <a:round/>
+            <a:headEnd type="arrow" w="med" len="med"/>
+            <a:tailEnd type="arrow" w="med" len="med"/>
+          </a:ln>
+        </p:spPr>
+        <p:style>
+          <a:lnRef idx="0">
+            <a:scrgbClr r="0" g="0" b="0"/>
+          </a:lnRef>
+          <a:fillRef idx="0">
+            <a:scrgbClr r="0" g="0" b="0"/>
+          </a:fillRef>
+          <a:effectRef idx="0">
+            <a:scrgbClr r="0" g="0" b="0"/>
+          </a:effectRef>
+          <a:fontRef idx="minor">
+            <a:schemeClr val="tx1"/>
+          </a:fontRef>
+        </p:style>
+      </p:cxnSp>
+      <p:sp>
+        <p:nvSpPr>
+          <p:cNvPr id="26" name="TextBox 25">
+            <a:extLst>
+              <a:ext uri="{FF2B5EF4-FFF2-40B4-BE49-F238E27FC236}">
+                <a16:creationId xmlns:a16="http://schemas.microsoft.com/office/drawing/2014/main" id="{4BE3386D-3041-251B-B8E6-5218CE9DD44B}"/>
+              </a:ext>
+            </a:extLst>
+          </p:cNvPr>
+          <p:cNvSpPr txBox="1"/>
+          <p:nvPr/>
+        </p:nvSpPr>
+        <p:spPr>
+          <a:xfrm>
+            <a:off x="4243951" y="2790854"/>
+            <a:ext cx="1012664" cy="369332"/>
+          </a:xfrm>
+          <a:prstGeom prst="rect">
+            <a:avLst/>
+          </a:prstGeom>
+          <a:noFill/>
+        </p:spPr>
+        <p:txBody>
+          <a:bodyPr wrap="square" rtlCol="0">
+            <a:spAutoFit/>
+          </a:bodyPr>
+          <a:lstStyle/>
+          <a:p>
+            <a:pPr algn="ctr"/>
+            <a:r>
+              <a:rPr lang="en-US" b="1" dirty="0"/>
+              <a:t>I2C</a:t>
+            </a:r>
+            <a:endParaRPr lang="en-IL" b="1" dirty="0"/>
+          </a:p>
+        </p:txBody>
+      </p:sp>
+      <p:sp>
+        <p:nvSpPr>
+          <p:cNvPr id="27" name="Rectangle 26">
+            <a:extLst>
+              <a:ext uri="{FF2B5EF4-FFF2-40B4-BE49-F238E27FC236}">
+                <a16:creationId xmlns:a16="http://schemas.microsoft.com/office/drawing/2014/main" id="{13A04941-24FC-FFA3-A240-15AA1B0A616B}"/>
+              </a:ext>
+            </a:extLst>
+          </p:cNvPr>
+          <p:cNvSpPr/>
+          <p:nvPr/>
+        </p:nvSpPr>
+        <p:spPr>
+          <a:xfrm>
+            <a:off x="5850250" y="1723118"/>
+            <a:ext cx="1216058" cy="798922"/>
           </a:xfrm>
           <a:prstGeom prst="rect">
             <a:avLst/>
@@ -26404,7 +26832,7 @@
                 </a:solidFill>
                 <a:cs typeface="Arial" panose="020B0604020202020204" pitchFamily="34" charset="0"/>
               </a:rPr>
-              <a:t>ESP32</a:t>
+              <a:t>Outsider PC</a:t>
             </a:r>
             <a:endParaRPr lang="en-IL" b="1" dirty="0">
               <a:solidFill>
@@ -26415,63 +26843,25 @@
           </a:p>
         </p:txBody>
       </p:sp>
-      <p:sp>
-        <p:nvSpPr>
-          <p:cNvPr id="117" name="TextBox 116">
+      <p:cxnSp>
+        <p:nvCxnSpPr>
+          <p:cNvPr id="28" name="Straight Arrow Connector 27">
             <a:extLst>
               <a:ext uri="{FF2B5EF4-FFF2-40B4-BE49-F238E27FC236}">
-                <a16:creationId xmlns:a16="http://schemas.microsoft.com/office/drawing/2014/main" id="{083CFD61-74A9-CDDE-822E-9483DE27E68F}"/>
-              </a:ext>
-            </a:extLst>
-          </p:cNvPr>
-          <p:cNvSpPr txBox="1"/>
-          <p:nvPr/>
-        </p:nvSpPr>
-        <p:spPr>
-          <a:xfrm>
-            <a:off x="3671886" y="3671585"/>
-            <a:ext cx="1012664" cy="369332"/>
-          </a:xfrm>
-          <a:prstGeom prst="rect">
-            <a:avLst/>
-          </a:prstGeom>
-          <a:noFill/>
-        </p:spPr>
-        <p:txBody>
-          <a:bodyPr wrap="square" rtlCol="0">
-            <a:spAutoFit/>
-          </a:bodyPr>
-          <a:lstStyle/>
-          <a:p>
-            <a:pPr algn="ctr"/>
-            <a:r>
-              <a:rPr lang="en-US" b="1" dirty="0"/>
-              <a:t>SPI</a:t>
-            </a:r>
-            <a:endParaRPr lang="en-IL" b="1" dirty="0"/>
-          </a:p>
-        </p:txBody>
-      </p:sp>
-      <p:cxnSp>
-        <p:nvCxnSpPr>
-          <p:cNvPr id="29" name="Straight Arrow Connector 28">
-            <a:extLst>
-              <a:ext uri="{FF2B5EF4-FFF2-40B4-BE49-F238E27FC236}">
-                <a16:creationId xmlns:a16="http://schemas.microsoft.com/office/drawing/2014/main" id="{645A6E61-7CB9-3597-6DA6-019F726F114B}"/>
+                <a16:creationId xmlns:a16="http://schemas.microsoft.com/office/drawing/2014/main" id="{B83DBC29-7339-F20B-135A-C55DBCD41640}"/>
               </a:ext>
             </a:extLst>
           </p:cNvPr>
           <p:cNvCxnSpPr>
             <a:cxnSpLocks/>
-            <a:stCxn id="11" idx="1"/>
-            <a:endCxn id="9" idx="3"/>
+            <a:endCxn id="27" idx="2"/>
           </p:cNvCxnSpPr>
           <p:nvPr/>
         </p:nvCxnSpPr>
         <p:spPr>
-          <a:xfrm flipH="1">
-            <a:off x="3606154" y="3967125"/>
-            <a:ext cx="1144129" cy="0"/>
+          <a:xfrm flipV="1">
+            <a:off x="6458279" y="2522040"/>
+            <a:ext cx="0" cy="906960"/>
           </a:xfrm>
           <a:prstGeom prst="straightConnector1">
             <a:avLst/>
@@ -26480,56 +26870,7 @@
             <a:solidFill>
               <a:srgbClr val="01FF00"/>
             </a:solidFill>
-            <a:prstDash val="solid"/>
-            <a:round/>
-            <a:headEnd type="arrow" w="med" len="med"/>
-            <a:tailEnd type="arrow" w="med" len="med"/>
-          </a:ln>
-        </p:spPr>
-        <p:style>
-          <a:lnRef idx="0">
-            <a:scrgbClr r="0" g="0" b="0"/>
-          </a:lnRef>
-          <a:fillRef idx="0">
-            <a:scrgbClr r="0" g="0" b="0"/>
-          </a:fillRef>
-          <a:effectRef idx="0">
-            <a:scrgbClr r="0" g="0" b="0"/>
-          </a:effectRef>
-          <a:fontRef idx="minor">
-            <a:schemeClr val="tx1"/>
-          </a:fontRef>
-        </p:style>
-      </p:cxnSp>
-      <p:cxnSp>
-        <p:nvCxnSpPr>
-          <p:cNvPr id="10" name="Straight Arrow Connector 9">
-            <a:extLst>
-              <a:ext uri="{FF2B5EF4-FFF2-40B4-BE49-F238E27FC236}">
-                <a16:creationId xmlns:a16="http://schemas.microsoft.com/office/drawing/2014/main" id="{3374F70C-3DF7-36FA-D03C-A99E5AC9420D}"/>
-              </a:ext>
-            </a:extLst>
-          </p:cNvPr>
-          <p:cNvCxnSpPr>
-            <a:cxnSpLocks/>
-            <a:stCxn id="80" idx="2"/>
-            <a:endCxn id="11" idx="0"/>
-          </p:cNvCxnSpPr>
-          <p:nvPr/>
-        </p:nvCxnSpPr>
-        <p:spPr>
-          <a:xfrm>
-            <a:off x="5734598" y="2495868"/>
-            <a:ext cx="1" cy="933132"/>
-          </a:xfrm>
-          <a:prstGeom prst="straightConnector1">
-            <a:avLst/>
-          </a:prstGeom>
-          <a:ln w="53975" cap="flat" cmpd="sng" algn="ctr">
-            <a:solidFill>
-              <a:srgbClr val="00FF00"/>
-            </a:solidFill>
-            <a:prstDash val="solid"/>
+            <a:prstDash val="sysDash"/>
             <a:round/>
             <a:headEnd type="arrow" w="med" len="med"/>
             <a:tailEnd type="arrow" w="med" len="med"/>
@@ -26552,10 +26893,10 @@
       </p:cxnSp>
       <p:sp>
         <p:nvSpPr>
-          <p:cNvPr id="41" name="TextBox 40">
+          <p:cNvPr id="34" name="TextBox 33">
             <a:extLst>
               <a:ext uri="{FF2B5EF4-FFF2-40B4-BE49-F238E27FC236}">
-                <a16:creationId xmlns:a16="http://schemas.microsoft.com/office/drawing/2014/main" id="{645D09E2-0D09-3028-02E8-E53009B866E5}"/>
+                <a16:creationId xmlns:a16="http://schemas.microsoft.com/office/drawing/2014/main" id="{F105092F-B8E0-FCF9-CBAD-A9E4E6F97370}"/>
               </a:ext>
             </a:extLst>
           </p:cNvPr>
@@ -26564,7 +26905,7 @@
         </p:nvSpPr>
         <p:spPr>
           <a:xfrm>
-            <a:off x="6784646" y="3612858"/>
+            <a:off x="6242479" y="2779245"/>
             <a:ext cx="1012664" cy="369332"/>
           </a:xfrm>
           <a:prstGeom prst="rect">
@@ -26581,544 +26922,8 @@
             <a:pPr algn="ctr"/>
             <a:r>
               <a:rPr lang="en-US" b="1" dirty="0"/>
-              <a:t>UART</a:t>
+              <a:t>WI-FI</a:t>
             </a:r>
-            <a:endParaRPr lang="en-IL" b="1" dirty="0"/>
-          </a:p>
-        </p:txBody>
-      </p:sp>
-      <p:sp>
-        <p:nvSpPr>
-          <p:cNvPr id="42" name="TextBox 41">
-            <a:extLst>
-              <a:ext uri="{FF2B5EF4-FFF2-40B4-BE49-F238E27FC236}">
-                <a16:creationId xmlns:a16="http://schemas.microsoft.com/office/drawing/2014/main" id="{02AE3EBD-C801-FDB8-A3B8-74EE52F67283}"/>
-              </a:ext>
-            </a:extLst>
-          </p:cNvPr>
-          <p:cNvSpPr txBox="1"/>
-          <p:nvPr/>
-        </p:nvSpPr>
-        <p:spPr>
-          <a:xfrm>
-            <a:off x="5032601" y="4691821"/>
-            <a:ext cx="1012664" cy="369332"/>
-          </a:xfrm>
-          <a:prstGeom prst="rect">
-            <a:avLst/>
-          </a:prstGeom>
-          <a:noFill/>
-        </p:spPr>
-        <p:txBody>
-          <a:bodyPr wrap="square" rtlCol="0">
-            <a:spAutoFit/>
-          </a:bodyPr>
-          <a:lstStyle/>
-          <a:p>
-            <a:pPr algn="ctr"/>
-            <a:r>
-              <a:rPr lang="en-US" b="1" dirty="0"/>
-              <a:t>SPI</a:t>
-            </a:r>
-            <a:endParaRPr lang="en-IL" b="1" dirty="0"/>
-          </a:p>
-        </p:txBody>
-      </p:sp>
-      <p:sp>
-        <p:nvSpPr>
-          <p:cNvPr id="43" name="Rectangle 42">
-            <a:extLst>
-              <a:ext uri="{FF2B5EF4-FFF2-40B4-BE49-F238E27FC236}">
-                <a16:creationId xmlns:a16="http://schemas.microsoft.com/office/drawing/2014/main" id="{11E1BC56-890B-836D-11B7-690502AD3439}"/>
-              </a:ext>
-            </a:extLst>
-          </p:cNvPr>
-          <p:cNvSpPr/>
-          <p:nvPr/>
-        </p:nvSpPr>
-        <p:spPr>
-          <a:xfrm>
-            <a:off x="7863041" y="1814624"/>
-            <a:ext cx="1216059" cy="692416"/>
-          </a:xfrm>
-          <a:prstGeom prst="rect">
-            <a:avLst/>
-          </a:prstGeom>
-          <a:solidFill>
-            <a:srgbClr val="7B87B1"/>
-          </a:solidFill>
-          <a:ln>
-            <a:noFill/>
-          </a:ln>
-          <a:effectLst>
-            <a:outerShdw blurRad="44450" dist="27940" dir="5400000" algn="ctr">
-              <a:srgbClr val="000000">
-                <a:alpha val="32000"/>
-              </a:srgbClr>
-            </a:outerShdw>
-          </a:effectLst>
-          <a:scene3d>
-            <a:camera prst="orthographicFront">
-              <a:rot lat="0" lon="0" rev="0"/>
-            </a:camera>
-            <a:lightRig rig="balanced" dir="t">
-              <a:rot lat="0" lon="0" rev="8700000"/>
-            </a:lightRig>
-          </a:scene3d>
-          <a:sp3d>
-            <a:bevelT w="190500" h="38100"/>
-          </a:sp3d>
-        </p:spPr>
-        <p:style>
-          <a:lnRef idx="2">
-            <a:schemeClr val="accent1">
-              <a:shade val="15000"/>
-            </a:schemeClr>
-          </a:lnRef>
-          <a:fillRef idx="1">
-            <a:schemeClr val="accent1"/>
-          </a:fillRef>
-          <a:effectRef idx="0">
-            <a:schemeClr val="accent1"/>
-          </a:effectRef>
-          <a:fontRef idx="minor">
-            <a:schemeClr val="lt1"/>
-          </a:fontRef>
-        </p:style>
-        <p:txBody>
-          <a:bodyPr rtlCol="0" anchor="ctr"/>
-          <a:lstStyle/>
-          <a:p>
-            <a:pPr algn="ctr"/>
-            <a:r>
-              <a:rPr lang="en-US" b="1" dirty="0">
-                <a:solidFill>
-                  <a:sysClr val="windowText" lastClr="000000"/>
-                </a:solidFill>
-                <a:cs typeface="Arial" panose="020B0604020202020204" pitchFamily="34" charset="0"/>
-              </a:rPr>
-              <a:t>Switches</a:t>
-            </a:r>
-            <a:endParaRPr lang="en-IL" b="1" dirty="0">
-              <a:solidFill>
-                <a:sysClr val="windowText" lastClr="000000"/>
-              </a:solidFill>
-              <a:cs typeface="Arial" panose="020B0604020202020204" pitchFamily="34" charset="0"/>
-            </a:endParaRPr>
-          </a:p>
-        </p:txBody>
-      </p:sp>
-      <p:cxnSp>
-        <p:nvCxnSpPr>
-          <p:cNvPr id="46" name="Straight Arrow Connector 45">
-            <a:extLst>
-              <a:ext uri="{FF2B5EF4-FFF2-40B4-BE49-F238E27FC236}">
-                <a16:creationId xmlns:a16="http://schemas.microsoft.com/office/drawing/2014/main" id="{076BEDFE-C5BB-8E8F-C700-FD7A0ADD7F0C}"/>
-              </a:ext>
-            </a:extLst>
-          </p:cNvPr>
-          <p:cNvCxnSpPr>
-            <a:cxnSpLocks/>
-          </p:cNvCxnSpPr>
-          <p:nvPr/>
-        </p:nvCxnSpPr>
-        <p:spPr>
-          <a:xfrm flipV="1">
-            <a:off x="6709770" y="2516854"/>
-            <a:ext cx="1153272" cy="912146"/>
-          </a:xfrm>
-          <a:prstGeom prst="straightConnector1">
-            <a:avLst/>
-          </a:prstGeom>
-          <a:ln w="53975" cap="flat" cmpd="sng" algn="ctr">
-            <a:solidFill>
-              <a:srgbClr val="01FF00"/>
-            </a:solidFill>
-            <a:prstDash val="solid"/>
-            <a:round/>
-            <a:headEnd type="arrow" w="med" len="med"/>
-            <a:tailEnd type="arrow" w="med" len="med"/>
-          </a:ln>
-        </p:spPr>
-        <p:style>
-          <a:lnRef idx="0">
-            <a:scrgbClr r="0" g="0" b="0"/>
-          </a:lnRef>
-          <a:fillRef idx="0">
-            <a:scrgbClr r="0" g="0" b="0"/>
-          </a:fillRef>
-          <a:effectRef idx="0">
-            <a:scrgbClr r="0" g="0" b="0"/>
-          </a:effectRef>
-          <a:fontRef idx="minor">
-            <a:schemeClr val="tx1"/>
-          </a:fontRef>
-        </p:style>
-      </p:cxnSp>
-      <p:sp>
-        <p:nvSpPr>
-          <p:cNvPr id="49" name="TextBox 48">
-            <a:extLst>
-              <a:ext uri="{FF2B5EF4-FFF2-40B4-BE49-F238E27FC236}">
-                <a16:creationId xmlns:a16="http://schemas.microsoft.com/office/drawing/2014/main" id="{85FA055D-5FC6-0D46-E5D3-034DAA0A9FB9}"/>
-              </a:ext>
-            </a:extLst>
-          </p:cNvPr>
-          <p:cNvSpPr txBox="1"/>
-          <p:nvPr/>
-        </p:nvSpPr>
-        <p:spPr>
-          <a:xfrm rot="19210772">
-            <a:off x="6647799" y="2675377"/>
-            <a:ext cx="1012664" cy="369332"/>
-          </a:xfrm>
-          <a:prstGeom prst="rect">
-            <a:avLst/>
-          </a:prstGeom>
-          <a:noFill/>
-        </p:spPr>
-        <p:txBody>
-          <a:bodyPr wrap="square" rtlCol="0">
-            <a:spAutoFit/>
-          </a:bodyPr>
-          <a:lstStyle/>
-          <a:p>
-            <a:pPr algn="ctr"/>
-            <a:r>
-              <a:rPr lang="en-US" b="1" dirty="0"/>
-              <a:t>Analog</a:t>
-            </a:r>
-            <a:endParaRPr lang="en-IL" b="1" dirty="0"/>
-          </a:p>
-        </p:txBody>
-      </p:sp>
-      <p:sp>
-        <p:nvSpPr>
-          <p:cNvPr id="56" name="Rectangle 55">
-            <a:extLst>
-              <a:ext uri="{FF2B5EF4-FFF2-40B4-BE49-F238E27FC236}">
-                <a16:creationId xmlns:a16="http://schemas.microsoft.com/office/drawing/2014/main" id="{4CCFFBFC-8E6C-A3EC-19C0-507C8886CB69}"/>
-              </a:ext>
-            </a:extLst>
-          </p:cNvPr>
-          <p:cNvSpPr/>
-          <p:nvPr/>
-        </p:nvSpPr>
-        <p:spPr>
-          <a:xfrm>
-            <a:off x="2390097" y="1814624"/>
-            <a:ext cx="1216058" cy="702230"/>
-          </a:xfrm>
-          <a:prstGeom prst="rect">
-            <a:avLst/>
-          </a:prstGeom>
-          <a:solidFill>
-            <a:srgbClr val="EA42BE"/>
-          </a:solidFill>
-          <a:ln>
-            <a:noFill/>
-          </a:ln>
-          <a:effectLst>
-            <a:outerShdw blurRad="44450" dist="27940" dir="5400000" algn="ctr">
-              <a:srgbClr val="000000">
-                <a:alpha val="32000"/>
-              </a:srgbClr>
-            </a:outerShdw>
-          </a:effectLst>
-          <a:scene3d>
-            <a:camera prst="orthographicFront">
-              <a:rot lat="0" lon="0" rev="0"/>
-            </a:camera>
-            <a:lightRig rig="balanced" dir="t">
-              <a:rot lat="0" lon="0" rev="8700000"/>
-            </a:lightRig>
-          </a:scene3d>
-          <a:sp3d>
-            <a:bevelT w="190500" h="38100"/>
-          </a:sp3d>
-        </p:spPr>
-        <p:style>
-          <a:lnRef idx="2">
-            <a:schemeClr val="accent1">
-              <a:shade val="15000"/>
-            </a:schemeClr>
-          </a:lnRef>
-          <a:fillRef idx="1">
-            <a:schemeClr val="accent1"/>
-          </a:fillRef>
-          <a:effectRef idx="0">
-            <a:schemeClr val="accent1"/>
-          </a:effectRef>
-          <a:fontRef idx="minor">
-            <a:schemeClr val="lt1"/>
-          </a:fontRef>
-        </p:style>
-        <p:txBody>
-          <a:bodyPr rtlCol="0" anchor="ctr"/>
-          <a:lstStyle/>
-          <a:p>
-            <a:pPr algn="ctr"/>
-            <a:r>
-              <a:rPr lang="en-US" b="1" dirty="0">
-                <a:solidFill>
-                  <a:sysClr val="windowText" lastClr="000000"/>
-                </a:solidFill>
-                <a:cs typeface="Arial" panose="020B0604020202020204" pitchFamily="34" charset="0"/>
-              </a:rPr>
-              <a:t>Buzzer</a:t>
-            </a:r>
-            <a:endParaRPr lang="en-IL" b="1" dirty="0">
-              <a:solidFill>
-                <a:sysClr val="windowText" lastClr="000000"/>
-              </a:solidFill>
-              <a:cs typeface="Arial" panose="020B0604020202020204" pitchFamily="34" charset="0"/>
-            </a:endParaRPr>
-          </a:p>
-        </p:txBody>
-      </p:sp>
-      <p:cxnSp>
-        <p:nvCxnSpPr>
-          <p:cNvPr id="57" name="Straight Arrow Connector 56">
-            <a:extLst>
-              <a:ext uri="{FF2B5EF4-FFF2-40B4-BE49-F238E27FC236}">
-                <a16:creationId xmlns:a16="http://schemas.microsoft.com/office/drawing/2014/main" id="{3EEFAF54-4492-4FE5-CBE2-9640E26339D8}"/>
-              </a:ext>
-            </a:extLst>
-          </p:cNvPr>
-          <p:cNvCxnSpPr>
-            <a:cxnSpLocks/>
-          </p:cNvCxnSpPr>
-          <p:nvPr/>
-        </p:nvCxnSpPr>
-        <p:spPr>
-          <a:xfrm flipH="1" flipV="1">
-            <a:off x="3606154" y="2507040"/>
-            <a:ext cx="1144129" cy="911093"/>
-          </a:xfrm>
-          <a:prstGeom prst="straightConnector1">
-            <a:avLst/>
-          </a:prstGeom>
-          <a:ln w="57150" cap="flat" cmpd="sng" algn="ctr">
-            <a:solidFill>
-              <a:srgbClr val="01FF00"/>
-            </a:solidFill>
-            <a:prstDash val="solid"/>
-            <a:round/>
-            <a:headEnd type="arrow" w="med" len="med"/>
-            <a:tailEnd type="arrow" w="med" len="med"/>
-          </a:ln>
-        </p:spPr>
-        <p:style>
-          <a:lnRef idx="0">
-            <a:scrgbClr r="0" g="0" b="0"/>
-          </a:lnRef>
-          <a:fillRef idx="0">
-            <a:scrgbClr r="0" g="0" b="0"/>
-          </a:fillRef>
-          <a:effectRef idx="0">
-            <a:scrgbClr r="0" g="0" b="0"/>
-          </a:effectRef>
-          <a:fontRef idx="minor">
-            <a:schemeClr val="tx1"/>
-          </a:fontRef>
-        </p:style>
-      </p:cxnSp>
-      <p:sp>
-        <p:nvSpPr>
-          <p:cNvPr id="61" name="TextBox 60">
-            <a:extLst>
-              <a:ext uri="{FF2B5EF4-FFF2-40B4-BE49-F238E27FC236}">
-                <a16:creationId xmlns:a16="http://schemas.microsoft.com/office/drawing/2014/main" id="{A9267837-1437-F20C-37A1-F6B6B3020081}"/>
-              </a:ext>
-            </a:extLst>
-          </p:cNvPr>
-          <p:cNvSpPr txBox="1"/>
-          <p:nvPr/>
-        </p:nvSpPr>
-        <p:spPr>
-          <a:xfrm rot="2152957">
-            <a:off x="3797262" y="2654800"/>
-            <a:ext cx="1012664" cy="369332"/>
-          </a:xfrm>
-          <a:prstGeom prst="rect">
-            <a:avLst/>
-          </a:prstGeom>
-          <a:noFill/>
-        </p:spPr>
-        <p:txBody>
-          <a:bodyPr wrap="square" rtlCol="0">
-            <a:spAutoFit/>
-          </a:bodyPr>
-          <a:lstStyle/>
-          <a:p>
-            <a:pPr algn="ctr"/>
-            <a:r>
-              <a:rPr lang="en-US" b="1" dirty="0"/>
-              <a:t>Analog</a:t>
-            </a:r>
-            <a:endParaRPr lang="en-IL" b="1" dirty="0"/>
-          </a:p>
-        </p:txBody>
-      </p:sp>
-      <p:sp>
-        <p:nvSpPr>
-          <p:cNvPr id="62" name="Rectangle 61">
-            <a:extLst>
-              <a:ext uri="{FF2B5EF4-FFF2-40B4-BE49-F238E27FC236}">
-                <a16:creationId xmlns:a16="http://schemas.microsoft.com/office/drawing/2014/main" id="{A3FBBC97-43A6-B377-7CD8-4027D2B88EBB}"/>
-              </a:ext>
-            </a:extLst>
-          </p:cNvPr>
-          <p:cNvSpPr/>
-          <p:nvPr/>
-        </p:nvSpPr>
-        <p:spPr>
-          <a:xfrm>
-            <a:off x="7863042" y="5383734"/>
-            <a:ext cx="1216058" cy="702229"/>
-          </a:xfrm>
-          <a:prstGeom prst="rect">
-            <a:avLst/>
-          </a:prstGeom>
-          <a:solidFill>
-            <a:schemeClr val="bg1"/>
-          </a:solidFill>
-          <a:ln>
-            <a:noFill/>
-          </a:ln>
-          <a:effectLst>
-            <a:outerShdw blurRad="44450" dist="27940" dir="5400000" algn="ctr">
-              <a:srgbClr val="000000">
-                <a:alpha val="32000"/>
-              </a:srgbClr>
-            </a:outerShdw>
-          </a:effectLst>
-          <a:scene3d>
-            <a:camera prst="orthographicFront">
-              <a:rot lat="0" lon="0" rev="0"/>
-            </a:camera>
-            <a:lightRig rig="balanced" dir="t">
-              <a:rot lat="0" lon="0" rev="8700000"/>
-            </a:lightRig>
-          </a:scene3d>
-          <a:sp3d>
-            <a:bevelT w="190500" h="38100"/>
-          </a:sp3d>
-        </p:spPr>
-        <p:style>
-          <a:lnRef idx="2">
-            <a:schemeClr val="accent1">
-              <a:shade val="15000"/>
-            </a:schemeClr>
-          </a:lnRef>
-          <a:fillRef idx="1">
-            <a:schemeClr val="accent1"/>
-          </a:fillRef>
-          <a:effectRef idx="0">
-            <a:schemeClr val="accent1"/>
-          </a:effectRef>
-          <a:fontRef idx="minor">
-            <a:schemeClr val="lt1"/>
-          </a:fontRef>
-        </p:style>
-        <p:txBody>
-          <a:bodyPr rtlCol="0" anchor="ctr"/>
-          <a:lstStyle/>
-          <a:p>
-            <a:pPr algn="ctr"/>
-            <a:r>
-              <a:rPr lang="en-US" b="1" dirty="0">
-                <a:solidFill>
-                  <a:sysClr val="windowText" lastClr="000000"/>
-                </a:solidFill>
-                <a:cs typeface="Arial" panose="020B0604020202020204" pitchFamily="34" charset="0"/>
-              </a:rPr>
-              <a:t>LEDs</a:t>
-            </a:r>
-          </a:p>
-        </p:txBody>
-      </p:sp>
-      <p:cxnSp>
-        <p:nvCxnSpPr>
-          <p:cNvPr id="63" name="Straight Arrow Connector 62">
-            <a:extLst>
-              <a:ext uri="{FF2B5EF4-FFF2-40B4-BE49-F238E27FC236}">
-                <a16:creationId xmlns:a16="http://schemas.microsoft.com/office/drawing/2014/main" id="{68A8E745-77A0-4575-A627-D1612FA2248D}"/>
-              </a:ext>
-            </a:extLst>
-          </p:cNvPr>
-          <p:cNvCxnSpPr>
-            <a:cxnSpLocks/>
-          </p:cNvCxnSpPr>
-          <p:nvPr/>
-        </p:nvCxnSpPr>
-        <p:spPr>
-          <a:xfrm>
-            <a:off x="6689758" y="4503400"/>
-            <a:ext cx="1173284" cy="880334"/>
-          </a:xfrm>
-          <a:prstGeom prst="straightConnector1">
-            <a:avLst/>
-          </a:prstGeom>
-          <a:ln w="53975" cap="flat" cmpd="sng" algn="ctr">
-            <a:solidFill>
-              <a:srgbClr val="01FF00"/>
-            </a:solidFill>
-            <a:prstDash val="solid"/>
-            <a:round/>
-            <a:headEnd type="arrow" w="med" len="med"/>
-            <a:tailEnd type="arrow" w="med" len="med"/>
-          </a:ln>
-        </p:spPr>
-        <p:style>
-          <a:lnRef idx="0">
-            <a:scrgbClr r="0" g="0" b="0"/>
-          </a:lnRef>
-          <a:fillRef idx="0">
-            <a:scrgbClr r="0" g="0" b="0"/>
-          </a:fillRef>
-          <a:effectRef idx="0">
-            <a:scrgbClr r="0" g="0" b="0"/>
-          </a:effectRef>
-          <a:fontRef idx="minor">
-            <a:schemeClr val="tx1"/>
-          </a:fontRef>
-        </p:style>
-      </p:cxnSp>
-      <p:sp>
-        <p:nvSpPr>
-          <p:cNvPr id="64" name="TextBox 63">
-            <a:extLst>
-              <a:ext uri="{FF2B5EF4-FFF2-40B4-BE49-F238E27FC236}">
-                <a16:creationId xmlns:a16="http://schemas.microsoft.com/office/drawing/2014/main" id="{9420C1CC-E1AF-5E38-5DFC-DB4C999A7195}"/>
-              </a:ext>
-            </a:extLst>
-          </p:cNvPr>
-          <p:cNvSpPr txBox="1"/>
-          <p:nvPr/>
-        </p:nvSpPr>
-        <p:spPr>
-          <a:xfrm rot="2083483">
-            <a:off x="6914579" y="4613817"/>
-            <a:ext cx="1012664" cy="369332"/>
-          </a:xfrm>
-          <a:prstGeom prst="rect">
-            <a:avLst/>
-          </a:prstGeom>
-          <a:noFill/>
-        </p:spPr>
-        <p:txBody>
-          <a:bodyPr wrap="square" rtlCol="0">
-            <a:spAutoFit/>
-          </a:bodyPr>
-          <a:lstStyle/>
-          <a:p>
-            <a:pPr algn="ctr"/>
-            <a:r>
-              <a:rPr lang="en-US" b="1" dirty="0"/>
-              <a:t>Analog</a:t>
-            </a:r>
-            <a:endParaRPr lang="en-IL" b="1" dirty="0"/>
           </a:p>
         </p:txBody>
       </p:sp>
@@ -27563,7 +27368,7 @@
                             </p:stCondLst>
                             <p:childTnLst>
                               <p:par>
-                                <p:cTn id="39" presetID="10" presetClass="entr" presetSubtype="0" fill="hold" grpId="0" nodeType="clickEffect">
+                                <p:cTn id="39" presetID="53" presetClass="entr" presetSubtype="16" fill="hold" nodeType="clickEffect">
                                   <p:stCondLst>
                                     <p:cond delay="0"/>
                                   </p:stCondLst>
@@ -27571,59 +27376,6 @@
                                     <p:set>
                                       <p:cBhvr>
                                         <p:cTn id="40" dur="1" fill="hold">
-                                          <p:stCondLst>
-                                            <p:cond delay="0"/>
-                                          </p:stCondLst>
-                                        </p:cTn>
-                                        <p:tgtEl>
-                                          <p:spTgt spid="80"/>
-                                        </p:tgtEl>
-                                        <p:attrNameLst>
-                                          <p:attrName>style.visibility</p:attrName>
-                                        </p:attrNameLst>
-                                      </p:cBhvr>
-                                      <p:to>
-                                        <p:strVal val="visible"/>
-                                      </p:to>
-                                    </p:set>
-                                    <p:animEffect transition="in" filter="fade">
-                                      <p:cBhvr>
-                                        <p:cTn id="41" dur="500"/>
-                                        <p:tgtEl>
-                                          <p:spTgt spid="80"/>
-                                        </p:tgtEl>
-                                      </p:cBhvr>
-                                    </p:animEffect>
-                                  </p:childTnLst>
-                                </p:cTn>
-                              </p:par>
-                            </p:childTnLst>
-                          </p:cTn>
-                        </p:par>
-                      </p:childTnLst>
-                    </p:cTn>
-                  </p:par>
-                  <p:par>
-                    <p:cTn id="42" fill="hold">
-                      <p:stCondLst>
-                        <p:cond delay="indefinite"/>
-                      </p:stCondLst>
-                      <p:childTnLst>
-                        <p:par>
-                          <p:cTn id="43" fill="hold">
-                            <p:stCondLst>
-                              <p:cond delay="0"/>
-                            </p:stCondLst>
-                            <p:childTnLst>
-                              <p:par>
-                                <p:cTn id="44" presetID="53" presetClass="entr" presetSubtype="16" fill="hold" nodeType="clickEffect">
-                                  <p:stCondLst>
-                                    <p:cond delay="0"/>
-                                  </p:stCondLst>
-                                  <p:childTnLst>
-                                    <p:set>
-                                      <p:cBhvr>
-                                        <p:cTn id="45" dur="1" fill="hold">
                                           <p:stCondLst>
                                             <p:cond delay="0"/>
                                           </p:stCondLst>
@@ -27641,7 +27393,7 @@
                                     </p:set>
                                     <p:anim calcmode="lin" valueType="num">
                                       <p:cBhvr>
-                                        <p:cTn id="46" dur="500" fill="hold"/>
+                                        <p:cTn id="41" dur="500" fill="hold"/>
                                         <p:tgtEl>
                                           <p:spTgt spid="29"/>
                                         </p:tgtEl>
@@ -27664,7 +27416,7 @@
                                     </p:anim>
                                     <p:anim calcmode="lin" valueType="num">
                                       <p:cBhvr>
-                                        <p:cTn id="47" dur="500" fill="hold"/>
+                                        <p:cTn id="42" dur="500" fill="hold"/>
                                         <p:tgtEl>
                                           <p:spTgt spid="29"/>
                                         </p:tgtEl>
@@ -27687,9 +27439,62 @@
                                     </p:anim>
                                     <p:animEffect transition="in" filter="fade">
                                       <p:cBhvr>
+                                        <p:cTn id="43" dur="500"/>
+                                        <p:tgtEl>
+                                          <p:spTgt spid="29"/>
+                                        </p:tgtEl>
+                                      </p:cBhvr>
+                                    </p:animEffect>
+                                  </p:childTnLst>
+                                </p:cTn>
+                              </p:par>
+                            </p:childTnLst>
+                          </p:cTn>
+                        </p:par>
+                      </p:childTnLst>
+                    </p:cTn>
+                  </p:par>
+                  <p:par>
+                    <p:cTn id="44" fill="hold">
+                      <p:stCondLst>
+                        <p:cond delay="indefinite"/>
+                      </p:stCondLst>
+                      <p:childTnLst>
+                        <p:par>
+                          <p:cTn id="45" fill="hold">
+                            <p:stCondLst>
+                              <p:cond delay="0"/>
+                            </p:stCondLst>
+                            <p:childTnLst>
+                              <p:par>
+                                <p:cTn id="46" presetID="10" presetClass="entr" presetSubtype="0" fill="hold" grpId="0" nodeType="clickEffect">
+                                  <p:stCondLst>
+                                    <p:cond delay="0"/>
+                                  </p:stCondLst>
+                                  <p:childTnLst>
+                                    <p:set>
+                                      <p:cBhvr>
+                                        <p:cTn id="47" dur="1" fill="hold">
+                                          <p:stCondLst>
+                                            <p:cond delay="0"/>
+                                          </p:stCondLst>
+                                        </p:cTn>
+                                        <p:tgtEl>
+                                          <p:spTgt spid="17"/>
+                                        </p:tgtEl>
+                                        <p:attrNameLst>
+                                          <p:attrName>style.visibility</p:attrName>
+                                        </p:attrNameLst>
+                                      </p:cBhvr>
+                                      <p:to>
+                                        <p:strVal val="visible"/>
+                                      </p:to>
+                                    </p:set>
+                                    <p:animEffect transition="in" filter="fade">
+                                      <p:cBhvr>
                                         <p:cTn id="48" dur="500"/>
                                         <p:tgtEl>
-                                          <p:spTgt spid="29"/>
+                                          <p:spTgt spid="17"/>
                                         </p:tgtEl>
                                       </p:cBhvr>
                                     </p:animEffect>
@@ -27728,7 +27533,7 @@
                                           </p:stCondLst>
                                         </p:cTn>
                                         <p:tgtEl>
-                                          <p:spTgt spid="10"/>
+                                          <p:spTgt spid="22"/>
                                         </p:tgtEl>
                                         <p:attrNameLst>
                                           <p:attrName>style.visibility</p:attrName>
@@ -27742,7 +27547,7 @@
                                       <p:cBhvr>
                                         <p:cTn id="53" dur="500" fill="hold"/>
                                         <p:tgtEl>
-                                          <p:spTgt spid="10"/>
+                                          <p:spTgt spid="22"/>
                                         </p:tgtEl>
                                         <p:attrNameLst>
                                           <p:attrName>ppt_w</p:attrName>
@@ -27765,7 +27570,7 @@
                                       <p:cBhvr>
                                         <p:cTn id="54" dur="500" fill="hold"/>
                                         <p:tgtEl>
-                                          <p:spTgt spid="10"/>
+                                          <p:spTgt spid="22"/>
                                         </p:tgtEl>
                                         <p:attrNameLst>
                                           <p:attrName>ppt_h</p:attrName>
@@ -27788,7 +27593,7 @@
                                       <p:cBhvr>
                                         <p:cTn id="55" dur="500"/>
                                         <p:tgtEl>
-                                          <p:spTgt spid="10"/>
+                                          <p:spTgt spid="22"/>
                                         </p:tgtEl>
                                       </p:cBhvr>
                                     </p:animEffect>
@@ -27827,7 +27632,7 @@
                                           </p:stCondLst>
                                         </p:cTn>
                                         <p:tgtEl>
-                                          <p:spTgt spid="43"/>
+                                          <p:spTgt spid="27"/>
                                         </p:tgtEl>
                                         <p:attrNameLst>
                                           <p:attrName>style.visibility</p:attrName>
@@ -27841,7 +27646,7 @@
                                       <p:cBhvr>
                                         <p:cTn id="60" dur="500"/>
                                         <p:tgtEl>
-                                          <p:spTgt spid="43"/>
+                                          <p:spTgt spid="27"/>
                                         </p:tgtEl>
                                       </p:cBhvr>
                                     </p:animEffect>
@@ -27880,7 +27685,7 @@
                                           </p:stCondLst>
                                         </p:cTn>
                                         <p:tgtEl>
-                                          <p:spTgt spid="46"/>
+                                          <p:spTgt spid="28"/>
                                         </p:tgtEl>
                                         <p:attrNameLst>
                                           <p:attrName>style.visibility</p:attrName>
@@ -27894,7 +27699,7 @@
                                       <p:cBhvr>
                                         <p:cTn id="65" dur="500" fill="hold"/>
                                         <p:tgtEl>
-                                          <p:spTgt spid="46"/>
+                                          <p:spTgt spid="28"/>
                                         </p:tgtEl>
                                         <p:attrNameLst>
                                           <p:attrName>ppt_w</p:attrName>
@@ -27917,7 +27722,7 @@
                                       <p:cBhvr>
                                         <p:cTn id="66" dur="500" fill="hold"/>
                                         <p:tgtEl>
-                                          <p:spTgt spid="46"/>
+                                          <p:spTgt spid="28"/>
                                         </p:tgtEl>
                                         <p:attrNameLst>
                                           <p:attrName>ppt_h</p:attrName>
@@ -27940,311 +27745,7 @@
                                       <p:cBhvr>
                                         <p:cTn id="67" dur="500"/>
                                         <p:tgtEl>
-                                          <p:spTgt spid="46"/>
-                                        </p:tgtEl>
-                                      </p:cBhvr>
-                                    </p:animEffect>
-                                  </p:childTnLst>
-                                </p:cTn>
-                              </p:par>
-                            </p:childTnLst>
-                          </p:cTn>
-                        </p:par>
-                      </p:childTnLst>
-                    </p:cTn>
-                  </p:par>
-                  <p:par>
-                    <p:cTn id="68" fill="hold">
-                      <p:stCondLst>
-                        <p:cond delay="indefinite"/>
-                      </p:stCondLst>
-                      <p:childTnLst>
-                        <p:par>
-                          <p:cTn id="69" fill="hold">
-                            <p:stCondLst>
-                              <p:cond delay="0"/>
-                            </p:stCondLst>
-                            <p:childTnLst>
-                              <p:par>
-                                <p:cTn id="70" presetID="10" presetClass="entr" presetSubtype="0" fill="hold" grpId="0" nodeType="clickEffect">
-                                  <p:stCondLst>
-                                    <p:cond delay="0"/>
-                                  </p:stCondLst>
-                                  <p:childTnLst>
-                                    <p:set>
-                                      <p:cBhvr>
-                                        <p:cTn id="71" dur="1" fill="hold">
-                                          <p:stCondLst>
-                                            <p:cond delay="0"/>
-                                          </p:stCondLst>
-                                        </p:cTn>
-                                        <p:tgtEl>
-                                          <p:spTgt spid="56"/>
-                                        </p:tgtEl>
-                                        <p:attrNameLst>
-                                          <p:attrName>style.visibility</p:attrName>
-                                        </p:attrNameLst>
-                                      </p:cBhvr>
-                                      <p:to>
-                                        <p:strVal val="visible"/>
-                                      </p:to>
-                                    </p:set>
-                                    <p:animEffect transition="in" filter="fade">
-                                      <p:cBhvr>
-                                        <p:cTn id="72" dur="500"/>
-                                        <p:tgtEl>
-                                          <p:spTgt spid="56"/>
-                                        </p:tgtEl>
-                                      </p:cBhvr>
-                                    </p:animEffect>
-                                  </p:childTnLst>
-                                </p:cTn>
-                              </p:par>
-                            </p:childTnLst>
-                          </p:cTn>
-                        </p:par>
-                      </p:childTnLst>
-                    </p:cTn>
-                  </p:par>
-                  <p:par>
-                    <p:cTn id="73" fill="hold">
-                      <p:stCondLst>
-                        <p:cond delay="indefinite"/>
-                      </p:stCondLst>
-                      <p:childTnLst>
-                        <p:par>
-                          <p:cTn id="74" fill="hold">
-                            <p:stCondLst>
-                              <p:cond delay="0"/>
-                            </p:stCondLst>
-                            <p:childTnLst>
-                              <p:par>
-                                <p:cTn id="75" presetID="53" presetClass="entr" presetSubtype="16" fill="hold" nodeType="clickEffect">
-                                  <p:stCondLst>
-                                    <p:cond delay="0"/>
-                                  </p:stCondLst>
-                                  <p:childTnLst>
-                                    <p:set>
-                                      <p:cBhvr>
-                                        <p:cTn id="76" dur="1" fill="hold">
-                                          <p:stCondLst>
-                                            <p:cond delay="0"/>
-                                          </p:stCondLst>
-                                        </p:cTn>
-                                        <p:tgtEl>
-                                          <p:spTgt spid="57"/>
-                                        </p:tgtEl>
-                                        <p:attrNameLst>
-                                          <p:attrName>style.visibility</p:attrName>
-                                        </p:attrNameLst>
-                                      </p:cBhvr>
-                                      <p:to>
-                                        <p:strVal val="visible"/>
-                                      </p:to>
-                                    </p:set>
-                                    <p:anim calcmode="lin" valueType="num">
-                                      <p:cBhvr>
-                                        <p:cTn id="77" dur="500" fill="hold"/>
-                                        <p:tgtEl>
-                                          <p:spTgt spid="57"/>
-                                        </p:tgtEl>
-                                        <p:attrNameLst>
-                                          <p:attrName>ppt_w</p:attrName>
-                                        </p:attrNameLst>
-                                      </p:cBhvr>
-                                      <p:tavLst>
-                                        <p:tav tm="0">
-                                          <p:val>
-                                            <p:fltVal val="0"/>
-                                          </p:val>
-                                        </p:tav>
-                                        <p:tav tm="100000">
-                                          <p:val>
-                                            <p:strVal val="#ppt_w"/>
-                                          </p:val>
-                                        </p:tav>
-                                      </p:tavLst>
-                                    </p:anim>
-                                    <p:anim calcmode="lin" valueType="num">
-                                      <p:cBhvr>
-                                        <p:cTn id="78" dur="500" fill="hold"/>
-                                        <p:tgtEl>
-                                          <p:spTgt spid="57"/>
-                                        </p:tgtEl>
-                                        <p:attrNameLst>
-                                          <p:attrName>ppt_h</p:attrName>
-                                        </p:attrNameLst>
-                                      </p:cBhvr>
-                                      <p:tavLst>
-                                        <p:tav tm="0">
-                                          <p:val>
-                                            <p:fltVal val="0"/>
-                                          </p:val>
-                                        </p:tav>
-                                        <p:tav tm="100000">
-                                          <p:val>
-                                            <p:strVal val="#ppt_h"/>
-                                          </p:val>
-                                        </p:tav>
-                                      </p:tavLst>
-                                    </p:anim>
-                                    <p:animEffect transition="in" filter="fade">
-                                      <p:cBhvr>
-                                        <p:cTn id="79" dur="500"/>
-                                        <p:tgtEl>
-                                          <p:spTgt spid="57"/>
-                                        </p:tgtEl>
-                                      </p:cBhvr>
-                                    </p:animEffect>
-                                  </p:childTnLst>
-                                </p:cTn>
-                              </p:par>
-                            </p:childTnLst>
-                          </p:cTn>
-                        </p:par>
-                      </p:childTnLst>
-                    </p:cTn>
-                  </p:par>
-                  <p:par>
-                    <p:cTn id="80" fill="hold">
-                      <p:stCondLst>
-                        <p:cond delay="indefinite"/>
-                      </p:stCondLst>
-                      <p:childTnLst>
-                        <p:par>
-                          <p:cTn id="81" fill="hold">
-                            <p:stCondLst>
-                              <p:cond delay="0"/>
-                            </p:stCondLst>
-                            <p:childTnLst>
-                              <p:par>
-                                <p:cTn id="82" presetID="10" presetClass="entr" presetSubtype="0" fill="hold" grpId="0" nodeType="clickEffect">
-                                  <p:stCondLst>
-                                    <p:cond delay="0"/>
-                                  </p:stCondLst>
-                                  <p:childTnLst>
-                                    <p:set>
-                                      <p:cBhvr>
-                                        <p:cTn id="83" dur="1" fill="hold">
-                                          <p:stCondLst>
-                                            <p:cond delay="0"/>
-                                          </p:stCondLst>
-                                        </p:cTn>
-                                        <p:tgtEl>
-                                          <p:spTgt spid="62"/>
-                                        </p:tgtEl>
-                                        <p:attrNameLst>
-                                          <p:attrName>style.visibility</p:attrName>
-                                        </p:attrNameLst>
-                                      </p:cBhvr>
-                                      <p:to>
-                                        <p:strVal val="visible"/>
-                                      </p:to>
-                                    </p:set>
-                                    <p:animEffect transition="in" filter="fade">
-                                      <p:cBhvr>
-                                        <p:cTn id="84" dur="500"/>
-                                        <p:tgtEl>
-                                          <p:spTgt spid="62"/>
-                                        </p:tgtEl>
-                                      </p:cBhvr>
-                                    </p:animEffect>
-                                  </p:childTnLst>
-                                </p:cTn>
-                              </p:par>
-                            </p:childTnLst>
-                          </p:cTn>
-                        </p:par>
-                      </p:childTnLst>
-                    </p:cTn>
-                  </p:par>
-                  <p:par>
-                    <p:cTn id="85" fill="hold">
-                      <p:stCondLst>
-                        <p:cond delay="indefinite"/>
-                      </p:stCondLst>
-                      <p:childTnLst>
-                        <p:par>
-                          <p:cTn id="86" fill="hold">
-                            <p:stCondLst>
-                              <p:cond delay="0"/>
-                            </p:stCondLst>
-                            <p:childTnLst>
-                              <p:par>
-                                <p:cTn id="87" presetID="53" presetClass="entr" presetSubtype="16" fill="hold" nodeType="clickEffect">
-                                  <p:stCondLst>
-                                    <p:cond delay="0"/>
-                                  </p:stCondLst>
-                                  <p:childTnLst>
-                                    <p:set>
-                                      <p:cBhvr>
-                                        <p:cTn id="88" dur="1" fill="hold">
-                                          <p:stCondLst>
-                                            <p:cond delay="0"/>
-                                          </p:stCondLst>
-                                        </p:cTn>
-                                        <p:tgtEl>
-                                          <p:spTgt spid="63"/>
-                                        </p:tgtEl>
-                                        <p:attrNameLst>
-                                          <p:attrName>style.visibility</p:attrName>
-                                        </p:attrNameLst>
-                                      </p:cBhvr>
-                                      <p:to>
-                                        <p:strVal val="visible"/>
-                                      </p:to>
-                                    </p:set>
-                                    <p:anim calcmode="lin" valueType="num">
-                                      <p:cBhvr>
-                                        <p:cTn id="89" dur="500" fill="hold"/>
-                                        <p:tgtEl>
-                                          <p:spTgt spid="63"/>
-                                        </p:tgtEl>
-                                        <p:attrNameLst>
-                                          <p:attrName>ppt_w</p:attrName>
-                                        </p:attrNameLst>
-                                      </p:cBhvr>
-                                      <p:tavLst>
-                                        <p:tav tm="0">
-                                          <p:val>
-                                            <p:fltVal val="0"/>
-                                          </p:val>
-                                        </p:tav>
-                                        <p:tav tm="100000">
-                                          <p:val>
-                                            <p:strVal val="#ppt_w"/>
-                                          </p:val>
-                                        </p:tav>
-                                      </p:tavLst>
-                                    </p:anim>
-                                    <p:anim calcmode="lin" valueType="num">
-                                      <p:cBhvr>
-                                        <p:cTn id="90" dur="500" fill="hold"/>
-                                        <p:tgtEl>
-                                          <p:spTgt spid="63"/>
-                                        </p:tgtEl>
-                                        <p:attrNameLst>
-                                          <p:attrName>ppt_h</p:attrName>
-                                        </p:attrNameLst>
-                                      </p:cBhvr>
-                                      <p:tavLst>
-                                        <p:tav tm="0">
-                                          <p:val>
-                                            <p:fltVal val="0"/>
-                                          </p:val>
-                                        </p:tav>
-                                        <p:tav tm="100000">
-                                          <p:val>
-                                            <p:strVal val="#ppt_h"/>
-                                          </p:val>
-                                        </p:tav>
-                                      </p:tavLst>
-                                    </p:anim>
-                                    <p:animEffect transition="in" filter="fade">
-                                      <p:cBhvr>
-                                        <p:cTn id="91" dur="500"/>
-                                        <p:tgtEl>
-                                          <p:spTgt spid="63"/>
+                                          <p:spTgt spid="28"/>
                                         </p:tgtEl>
                                       </p:cBhvr>
                                     </p:animEffect>
@@ -28283,10 +27784,8 @@
       <p:bldP spid="11" grpId="0" animBg="1"/>
       <p:bldP spid="13" grpId="0" animBg="1"/>
       <p:bldP spid="85" grpId="0" animBg="1"/>
-      <p:bldP spid="80" grpId="0" animBg="1"/>
-      <p:bldP spid="43" grpId="0" animBg="1"/>
-      <p:bldP spid="56" grpId="0" animBg="1"/>
-      <p:bldP spid="62" grpId="0" animBg="1"/>
+      <p:bldP spid="17" grpId="0" animBg="1"/>
+      <p:bldP spid="27" grpId="0" animBg="1"/>
     </p:bldLst>
   </p:timing>
 </p:sld>

</xml_diff>

<commit_message>
mod of work, GANT and until now slides changed
</commit_message>
<xml_diff>
--- a/Presntations/Midterm presentation IOT Barcode checker 7681.pptx
+++ b/Presntations/Midterm presentation IOT Barcode checker 7681.pptx
@@ -838,7 +838,7 @@
           <a:noFill/>
           <a:extLst>
             <a:ext uri="{909E8E84-426E-40dd-AFC4-6F175D3DCCD1}">
-              <a14:hiddenFill xmlns="" xmlns:a14="http://schemas.microsoft.com/office/drawing/2010/main">
+              <a14:hiddenFill xmlns:a14="http://schemas.microsoft.com/office/drawing/2010/main" xmlns="">
                 <a:solidFill>
                   <a:srgbClr val="FFFFFF"/>
                 </a:solidFill>
@@ -898,7 +898,7 @@
             </a:ln>
             <a:extLst>
               <a:ext uri="{91240B29-F687-4f45-9708-019B960494DF}">
-                <a14:hiddenLine xmlns="" xmlns:a14="http://schemas.microsoft.com/office/drawing/2010/main" w="9525">
+                <a14:hiddenLine xmlns:a14="http://schemas.microsoft.com/office/drawing/2010/main" xmlns="" w="9525">
                   <a:solidFill>
                     <a:srgbClr val="000000"/>
                   </a:solidFill>
@@ -988,7 +988,7 @@
             </a:ln>
             <a:extLst>
               <a:ext uri="{91240B29-F687-4f45-9708-019B960494DF}">
-                <a14:hiddenLine xmlns="" xmlns:a14="http://schemas.microsoft.com/office/drawing/2010/main" w="9525">
+                <a14:hiddenLine xmlns:a14="http://schemas.microsoft.com/office/drawing/2010/main" xmlns="" w="9525">
                   <a:solidFill>
                     <a:srgbClr val="000000"/>
                   </a:solidFill>
@@ -1078,7 +1078,7 @@
             </a:ln>
             <a:extLst>
               <a:ext uri="{91240B29-F687-4f45-9708-019B960494DF}">
-                <a14:hiddenLine xmlns="" xmlns:a14="http://schemas.microsoft.com/office/drawing/2010/main" w="9525">
+                <a14:hiddenLine xmlns:a14="http://schemas.microsoft.com/office/drawing/2010/main" xmlns="" w="9525">
                   <a:solidFill>
                     <a:srgbClr val="000000"/>
                   </a:solidFill>
@@ -1112,7 +1112,7 @@
             </a:ln>
             <a:extLst>
               <a:ext uri="{91240B29-F687-4f45-9708-019B960494DF}">
-                <a14:hiddenLine xmlns="" xmlns:a14="http://schemas.microsoft.com/office/drawing/2010/main" w="9525">
+                <a14:hiddenLine xmlns:a14="http://schemas.microsoft.com/office/drawing/2010/main" xmlns="" w="9525">
                   <a:solidFill>
                     <a:srgbClr val="000000"/>
                   </a:solidFill>
@@ -1202,7 +1202,7 @@
             </a:ln>
             <a:extLst>
               <a:ext uri="{91240B29-F687-4f45-9708-019B960494DF}">
-                <a14:hiddenLine xmlns="" xmlns:a14="http://schemas.microsoft.com/office/drawing/2010/main" w="9525">
+                <a14:hiddenLine xmlns:a14="http://schemas.microsoft.com/office/drawing/2010/main" xmlns="" w="9525">
                   <a:solidFill>
                     <a:srgbClr val="000000"/>
                   </a:solidFill>
@@ -1264,7 +1264,7 @@
             </a:ln>
             <a:extLst>
               <a:ext uri="{91240B29-F687-4f45-9708-019B960494DF}">
-                <a14:hiddenLine xmlns="" xmlns:a14="http://schemas.microsoft.com/office/drawing/2010/main" w="9525">
+                <a14:hiddenLine xmlns:a14="http://schemas.microsoft.com/office/drawing/2010/main" xmlns="" w="9525">
                   <a:solidFill>
                     <a:srgbClr val="000000"/>
                   </a:solidFill>
@@ -1326,7 +1326,7 @@
             </a:ln>
             <a:extLst>
               <a:ext uri="{91240B29-F687-4f45-9708-019B960494DF}">
-                <a14:hiddenLine xmlns="" xmlns:a14="http://schemas.microsoft.com/office/drawing/2010/main" w="9525">
+                <a14:hiddenLine xmlns:a14="http://schemas.microsoft.com/office/drawing/2010/main" xmlns="" w="9525">
                   <a:solidFill>
                     <a:srgbClr val="000000"/>
                   </a:solidFill>
@@ -1416,7 +1416,7 @@
             </a:ln>
             <a:extLst>
               <a:ext uri="{91240B29-F687-4f45-9708-019B960494DF}">
-                <a14:hiddenLine xmlns="" xmlns:a14="http://schemas.microsoft.com/office/drawing/2010/main" w="9525">
+                <a14:hiddenLine xmlns:a14="http://schemas.microsoft.com/office/drawing/2010/main" xmlns="" w="9525">
                   <a:solidFill>
                     <a:srgbClr val="000000"/>
                   </a:solidFill>
@@ -1478,7 +1478,7 @@
             </a:ln>
             <a:extLst>
               <a:ext uri="{91240B29-F687-4f45-9708-019B960494DF}">
-                <a14:hiddenLine xmlns="" xmlns:a14="http://schemas.microsoft.com/office/drawing/2010/main" w="9525">
+                <a14:hiddenLine xmlns:a14="http://schemas.microsoft.com/office/drawing/2010/main" xmlns="" w="9525">
                   <a:solidFill>
                     <a:srgbClr val="000000"/>
                   </a:solidFill>
@@ -1540,7 +1540,7 @@
             </a:ln>
             <a:extLst>
               <a:ext uri="{91240B29-F687-4f45-9708-019B960494DF}">
-                <a14:hiddenLine xmlns="" xmlns:a14="http://schemas.microsoft.com/office/drawing/2010/main" w="9525">
+                <a14:hiddenLine xmlns:a14="http://schemas.microsoft.com/office/drawing/2010/main" xmlns="" w="9525">
                   <a:solidFill>
                     <a:srgbClr val="000000"/>
                   </a:solidFill>
@@ -1630,7 +1630,7 @@
             </a:ln>
             <a:extLst>
               <a:ext uri="{91240B29-F687-4f45-9708-019B960494DF}">
-                <a14:hiddenLine xmlns="" xmlns:a14="http://schemas.microsoft.com/office/drawing/2010/main" w="9525">
+                <a14:hiddenLine xmlns:a14="http://schemas.microsoft.com/office/drawing/2010/main" xmlns="" w="9525">
                   <a:solidFill>
                     <a:srgbClr val="000000"/>
                   </a:solidFill>
@@ -1720,7 +1720,7 @@
             </a:ln>
             <a:extLst>
               <a:ext uri="{91240B29-F687-4f45-9708-019B960494DF}">
-                <a14:hiddenLine xmlns="" xmlns:a14="http://schemas.microsoft.com/office/drawing/2010/main" w="9525">
+                <a14:hiddenLine xmlns:a14="http://schemas.microsoft.com/office/drawing/2010/main" xmlns="" w="9525">
                   <a:solidFill>
                     <a:srgbClr val="000000"/>
                   </a:solidFill>
@@ -1782,7 +1782,7 @@
             </a:ln>
             <a:extLst>
               <a:ext uri="{91240B29-F687-4f45-9708-019B960494DF}">
-                <a14:hiddenLine xmlns="" xmlns:a14="http://schemas.microsoft.com/office/drawing/2010/main" w="9525">
+                <a14:hiddenLine xmlns:a14="http://schemas.microsoft.com/office/drawing/2010/main" xmlns="" w="9525">
                   <a:solidFill>
                     <a:srgbClr val="000000"/>
                   </a:solidFill>
@@ -1892,7 +1892,7 @@
             </a:ln>
             <a:extLst>
               <a:ext uri="{91240B29-F687-4f45-9708-019B960494DF}">
-                <a14:hiddenLine xmlns="" xmlns:a14="http://schemas.microsoft.com/office/drawing/2010/main" w="9525">
+                <a14:hiddenLine xmlns:a14="http://schemas.microsoft.com/office/drawing/2010/main" xmlns="" w="9525">
                   <a:solidFill>
                     <a:srgbClr val="000000"/>
                   </a:solidFill>
@@ -1954,7 +1954,7 @@
             </a:ln>
             <a:extLst>
               <a:ext uri="{91240B29-F687-4f45-9708-019B960494DF}">
-                <a14:hiddenLine xmlns="" xmlns:a14="http://schemas.microsoft.com/office/drawing/2010/main" w="9525">
+                <a14:hiddenLine xmlns:a14="http://schemas.microsoft.com/office/drawing/2010/main" xmlns="" w="9525">
                   <a:solidFill>
                     <a:srgbClr val="000000"/>
                   </a:solidFill>
@@ -2044,7 +2044,7 @@
             </a:ln>
             <a:extLst>
               <a:ext uri="{91240B29-F687-4f45-9708-019B960494DF}">
-                <a14:hiddenLine xmlns="" xmlns:a14="http://schemas.microsoft.com/office/drawing/2010/main" w="9525">
+                <a14:hiddenLine xmlns:a14="http://schemas.microsoft.com/office/drawing/2010/main" xmlns="" w="9525">
                   <a:solidFill>
                     <a:srgbClr val="000000"/>
                   </a:solidFill>
@@ -2134,7 +2134,7 @@
             </a:ln>
             <a:extLst>
               <a:ext uri="{91240B29-F687-4f45-9708-019B960494DF}">
-                <a14:hiddenLine xmlns="" xmlns:a14="http://schemas.microsoft.com/office/drawing/2010/main" w="9525">
+                <a14:hiddenLine xmlns:a14="http://schemas.microsoft.com/office/drawing/2010/main" xmlns="" w="9525">
                   <a:solidFill>
                     <a:srgbClr val="000000"/>
                   </a:solidFill>
@@ -2196,7 +2196,7 @@
             </a:ln>
             <a:extLst>
               <a:ext uri="{91240B29-F687-4f45-9708-019B960494DF}">
-                <a14:hiddenLine xmlns="" xmlns:a14="http://schemas.microsoft.com/office/drawing/2010/main" w="9525">
+                <a14:hiddenLine xmlns:a14="http://schemas.microsoft.com/office/drawing/2010/main" xmlns="" w="9525">
                   <a:solidFill>
                     <a:srgbClr val="000000"/>
                   </a:solidFill>
@@ -2286,7 +2286,7 @@
             </a:ln>
             <a:extLst>
               <a:ext uri="{91240B29-F687-4f45-9708-019B960494DF}">
-                <a14:hiddenLine xmlns="" xmlns:a14="http://schemas.microsoft.com/office/drawing/2010/main" w="9525">
+                <a14:hiddenLine xmlns:a14="http://schemas.microsoft.com/office/drawing/2010/main" xmlns="" w="9525">
                   <a:solidFill>
                     <a:srgbClr val="000000"/>
                   </a:solidFill>
@@ -2376,7 +2376,7 @@
             </a:ln>
             <a:extLst>
               <a:ext uri="{91240B29-F687-4f45-9708-019B960494DF}">
-                <a14:hiddenLine xmlns="" xmlns:a14="http://schemas.microsoft.com/office/drawing/2010/main" w="9525">
+                <a14:hiddenLine xmlns:a14="http://schemas.microsoft.com/office/drawing/2010/main" xmlns="" w="9525">
                   <a:solidFill>
                     <a:srgbClr val="000000"/>
                   </a:solidFill>
@@ -2432,7 +2432,7 @@
             </a:ln>
             <a:extLst>
               <a:ext uri="{91240B29-F687-4f45-9708-019B960494DF}">
-                <a14:hiddenLine xmlns="" xmlns:a14="http://schemas.microsoft.com/office/drawing/2010/main" w="9525">
+                <a14:hiddenLine xmlns:a14="http://schemas.microsoft.com/office/drawing/2010/main" xmlns="" w="9525">
                   <a:solidFill>
                     <a:srgbClr val="000000"/>
                   </a:solidFill>
@@ -2522,7 +2522,7 @@
             </a:ln>
             <a:extLst>
               <a:ext uri="{91240B29-F687-4f45-9708-019B960494DF}">
-                <a14:hiddenLine xmlns="" xmlns:a14="http://schemas.microsoft.com/office/drawing/2010/main" w="9525">
+                <a14:hiddenLine xmlns:a14="http://schemas.microsoft.com/office/drawing/2010/main" xmlns="" w="9525">
                   <a:solidFill>
                     <a:srgbClr val="000000"/>
                   </a:solidFill>
@@ -2578,7 +2578,7 @@
             </a:ln>
             <a:extLst>
               <a:ext uri="{91240B29-F687-4f45-9708-019B960494DF}">
-                <a14:hiddenLine xmlns="" xmlns:a14="http://schemas.microsoft.com/office/drawing/2010/main" w="9525">
+                <a14:hiddenLine xmlns:a14="http://schemas.microsoft.com/office/drawing/2010/main" xmlns="" w="9525">
                   <a:solidFill>
                     <a:srgbClr val="000000"/>
                   </a:solidFill>
@@ -2668,7 +2668,7 @@
             </a:ln>
             <a:extLst>
               <a:ext uri="{91240B29-F687-4f45-9708-019B960494DF}">
-                <a14:hiddenLine xmlns="" xmlns:a14="http://schemas.microsoft.com/office/drawing/2010/main" w="9525">
+                <a14:hiddenLine xmlns:a14="http://schemas.microsoft.com/office/drawing/2010/main" xmlns="" w="9525">
                   <a:solidFill>
                     <a:srgbClr val="000000"/>
                   </a:solidFill>
@@ -2736,7 +2736,7 @@
             </a:ln>
             <a:extLst>
               <a:ext uri="{91240B29-F687-4f45-9708-019B960494DF}">
-                <a14:hiddenLine xmlns="" xmlns:a14="http://schemas.microsoft.com/office/drawing/2010/main" w="9525">
+                <a14:hiddenLine xmlns:a14="http://schemas.microsoft.com/office/drawing/2010/main" xmlns="" w="9525">
                   <a:solidFill>
                     <a:srgbClr val="000000"/>
                   </a:solidFill>
@@ -2826,7 +2826,7 @@
             </a:ln>
             <a:extLst>
               <a:ext uri="{91240B29-F687-4f45-9708-019B960494DF}">
-                <a14:hiddenLine xmlns="" xmlns:a14="http://schemas.microsoft.com/office/drawing/2010/main" w="9525">
+                <a14:hiddenLine xmlns:a14="http://schemas.microsoft.com/office/drawing/2010/main" xmlns="" w="9525">
                   <a:solidFill>
                     <a:srgbClr val="000000"/>
                   </a:solidFill>
@@ -2894,7 +2894,7 @@
             </a:ln>
             <a:extLst>
               <a:ext uri="{91240B29-F687-4f45-9708-019B960494DF}">
-                <a14:hiddenLine xmlns="" xmlns:a14="http://schemas.microsoft.com/office/drawing/2010/main" w="9525">
+                <a14:hiddenLine xmlns:a14="http://schemas.microsoft.com/office/drawing/2010/main" xmlns="" w="9525">
                   <a:solidFill>
                     <a:srgbClr val="000000"/>
                   </a:solidFill>
@@ -2984,7 +2984,7 @@
             </a:ln>
             <a:extLst>
               <a:ext uri="{91240B29-F687-4f45-9708-019B960494DF}">
-                <a14:hiddenLine xmlns="" xmlns:a14="http://schemas.microsoft.com/office/drawing/2010/main" w="9525">
+                <a14:hiddenLine xmlns:a14="http://schemas.microsoft.com/office/drawing/2010/main" xmlns="" w="9525">
                   <a:solidFill>
                     <a:srgbClr val="000000"/>
                   </a:solidFill>
@@ -3018,7 +3018,7 @@
             </a:ln>
             <a:extLst>
               <a:ext uri="{91240B29-F687-4f45-9708-019B960494DF}">
-                <a14:hiddenLine xmlns="" xmlns:a14="http://schemas.microsoft.com/office/drawing/2010/main" w="9525">
+                <a14:hiddenLine xmlns:a14="http://schemas.microsoft.com/office/drawing/2010/main" xmlns="" w="9525">
                   <a:solidFill>
                     <a:srgbClr val="000000"/>
                   </a:solidFill>
@@ -3108,7 +3108,7 @@
             </a:ln>
             <a:extLst>
               <a:ext uri="{91240B29-F687-4f45-9708-019B960494DF}">
-                <a14:hiddenLine xmlns="" xmlns:a14="http://schemas.microsoft.com/office/drawing/2010/main" w="9525">
+                <a14:hiddenLine xmlns:a14="http://schemas.microsoft.com/office/drawing/2010/main" xmlns="" w="9525">
                   <a:solidFill>
                     <a:srgbClr val="000000"/>
                   </a:solidFill>
@@ -3170,7 +3170,7 @@
             </a:ln>
             <a:extLst>
               <a:ext uri="{91240B29-F687-4f45-9708-019B960494DF}">
-                <a14:hiddenLine xmlns="" xmlns:a14="http://schemas.microsoft.com/office/drawing/2010/main" w="9525">
+                <a14:hiddenLine xmlns:a14="http://schemas.microsoft.com/office/drawing/2010/main" xmlns="" w="9525">
                   <a:solidFill>
                     <a:srgbClr val="000000"/>
                   </a:solidFill>
@@ -3232,7 +3232,7 @@
             </a:ln>
             <a:extLst>
               <a:ext uri="{91240B29-F687-4f45-9708-019B960494DF}">
-                <a14:hiddenLine xmlns="" xmlns:a14="http://schemas.microsoft.com/office/drawing/2010/main" w="9525">
+                <a14:hiddenLine xmlns:a14="http://schemas.microsoft.com/office/drawing/2010/main" xmlns="" w="9525">
                   <a:solidFill>
                     <a:srgbClr val="000000"/>
                   </a:solidFill>
@@ -3322,7 +3322,7 @@
             </a:ln>
             <a:extLst>
               <a:ext uri="{91240B29-F687-4f45-9708-019B960494DF}">
-                <a14:hiddenLine xmlns="" xmlns:a14="http://schemas.microsoft.com/office/drawing/2010/main" w="9525">
+                <a14:hiddenLine xmlns:a14="http://schemas.microsoft.com/office/drawing/2010/main" xmlns="" w="9525">
                   <a:solidFill>
                     <a:srgbClr val="000000"/>
                   </a:solidFill>
@@ -3390,7 +3390,7 @@
             </a:ln>
             <a:extLst>
               <a:ext uri="{91240B29-F687-4f45-9708-019B960494DF}">
-                <a14:hiddenLine xmlns="" xmlns:a14="http://schemas.microsoft.com/office/drawing/2010/main" w="9525">
+                <a14:hiddenLine xmlns:a14="http://schemas.microsoft.com/office/drawing/2010/main" xmlns="" w="9525">
                   <a:solidFill>
                     <a:srgbClr val="000000"/>
                   </a:solidFill>
@@ -3452,7 +3452,7 @@
             </a:ln>
             <a:extLst>
               <a:ext uri="{91240B29-F687-4f45-9708-019B960494DF}">
-                <a14:hiddenLine xmlns="" xmlns:a14="http://schemas.microsoft.com/office/drawing/2010/main" w="9525">
+                <a14:hiddenLine xmlns:a14="http://schemas.microsoft.com/office/drawing/2010/main" xmlns="" w="9525">
                   <a:solidFill>
                     <a:srgbClr val="000000"/>
                   </a:solidFill>
@@ -3542,7 +3542,7 @@
             </a:ln>
             <a:extLst>
               <a:ext uri="{91240B29-F687-4f45-9708-019B960494DF}">
-                <a14:hiddenLine xmlns="" xmlns:a14="http://schemas.microsoft.com/office/drawing/2010/main" w="9525">
+                <a14:hiddenLine xmlns:a14="http://schemas.microsoft.com/office/drawing/2010/main" xmlns="" w="9525">
                   <a:solidFill>
                     <a:srgbClr val="000000"/>
                   </a:solidFill>
@@ -3604,7 +3604,7 @@
             </a:ln>
             <a:extLst>
               <a:ext uri="{91240B29-F687-4f45-9708-019B960494DF}">
-                <a14:hiddenLine xmlns="" xmlns:a14="http://schemas.microsoft.com/office/drawing/2010/main" w="9525">
+                <a14:hiddenLine xmlns:a14="http://schemas.microsoft.com/office/drawing/2010/main" xmlns="" w="9525">
                   <a:solidFill>
                     <a:srgbClr val="000000"/>
                   </a:solidFill>
@@ -3694,7 +3694,7 @@
             </a:ln>
             <a:extLst>
               <a:ext uri="{91240B29-F687-4f45-9708-019B960494DF}">
-                <a14:hiddenLine xmlns="" xmlns:a14="http://schemas.microsoft.com/office/drawing/2010/main" w="9525">
+                <a14:hiddenLine xmlns:a14="http://schemas.microsoft.com/office/drawing/2010/main" xmlns="" w="9525">
                   <a:solidFill>
                     <a:srgbClr val="000000"/>
                   </a:solidFill>
@@ -3756,7 +3756,7 @@
             </a:ln>
             <a:extLst>
               <a:ext uri="{91240B29-F687-4f45-9708-019B960494DF}">
-                <a14:hiddenLine xmlns="" xmlns:a14="http://schemas.microsoft.com/office/drawing/2010/main" w="9525">
+                <a14:hiddenLine xmlns:a14="http://schemas.microsoft.com/office/drawing/2010/main" xmlns="" w="9525">
                   <a:solidFill>
                     <a:srgbClr val="000000"/>
                   </a:solidFill>
@@ -3846,7 +3846,7 @@
             </a:ln>
             <a:extLst>
               <a:ext uri="{91240B29-F687-4f45-9708-019B960494DF}">
-                <a14:hiddenLine xmlns="" xmlns:a14="http://schemas.microsoft.com/office/drawing/2010/main" w="9525">
+                <a14:hiddenLine xmlns:a14="http://schemas.microsoft.com/office/drawing/2010/main" xmlns="" w="9525">
                   <a:solidFill>
                     <a:srgbClr val="000000"/>
                   </a:solidFill>
@@ -3880,7 +3880,7 @@
             </a:ln>
             <a:extLst>
               <a:ext uri="{91240B29-F687-4f45-9708-019B960494DF}">
-                <a14:hiddenLine xmlns="" xmlns:a14="http://schemas.microsoft.com/office/drawing/2010/main" w="9525">
+                <a14:hiddenLine xmlns:a14="http://schemas.microsoft.com/office/drawing/2010/main" xmlns="" w="9525">
                   <a:solidFill>
                     <a:srgbClr val="000000"/>
                   </a:solidFill>
@@ -3945,7 +3945,7 @@
             </a:ln>
             <a:extLst>
               <a:ext uri="{91240B29-F687-4f45-9708-019B960494DF}">
-                <a14:hiddenLine xmlns="" xmlns:a14="http://schemas.microsoft.com/office/drawing/2010/main" w="9525">
+                <a14:hiddenLine xmlns:a14="http://schemas.microsoft.com/office/drawing/2010/main" xmlns="" w="9525">
                   <a:solidFill>
                     <a:srgbClr val="000000"/>
                   </a:solidFill>
@@ -4035,7 +4035,7 @@
             </a:ln>
             <a:extLst>
               <a:ext uri="{91240B29-F687-4f45-9708-019B960494DF}">
-                <a14:hiddenLine xmlns="" xmlns:a14="http://schemas.microsoft.com/office/drawing/2010/main" w="9525">
+                <a14:hiddenLine xmlns:a14="http://schemas.microsoft.com/office/drawing/2010/main" xmlns="" w="9525">
                   <a:solidFill>
                     <a:srgbClr val="000000"/>
                   </a:solidFill>
@@ -4097,7 +4097,7 @@
             </a:ln>
             <a:extLst>
               <a:ext uri="{91240B29-F687-4f45-9708-019B960494DF}">
-                <a14:hiddenLine xmlns="" xmlns:a14="http://schemas.microsoft.com/office/drawing/2010/main" w="9525">
+                <a14:hiddenLine xmlns:a14="http://schemas.microsoft.com/office/drawing/2010/main" xmlns="" w="9525">
                   <a:solidFill>
                     <a:srgbClr val="000000"/>
                   </a:solidFill>
@@ -4187,7 +4187,7 @@
             </a:ln>
             <a:extLst>
               <a:ext uri="{91240B29-F687-4f45-9708-019B960494DF}">
-                <a14:hiddenLine xmlns="" xmlns:a14="http://schemas.microsoft.com/office/drawing/2010/main" w="9525">
+                <a14:hiddenLine xmlns:a14="http://schemas.microsoft.com/office/drawing/2010/main" xmlns="" w="9525">
                   <a:solidFill>
                     <a:srgbClr val="000000"/>
                   </a:solidFill>
@@ -4277,7 +4277,7 @@
             </a:ln>
             <a:extLst>
               <a:ext uri="{91240B29-F687-4f45-9708-019B960494DF}">
-                <a14:hiddenLine xmlns="" xmlns:a14="http://schemas.microsoft.com/office/drawing/2010/main" w="9525">
+                <a14:hiddenLine xmlns:a14="http://schemas.microsoft.com/office/drawing/2010/main" xmlns="" w="9525">
                   <a:solidFill>
                     <a:srgbClr val="000000"/>
                   </a:solidFill>
@@ -4342,7 +4342,7 @@
             </a:ln>
             <a:extLst>
               <a:ext uri="{91240B29-F687-4f45-9708-019B960494DF}">
-                <a14:hiddenLine xmlns="" xmlns:a14="http://schemas.microsoft.com/office/drawing/2010/main" w="9525">
+                <a14:hiddenLine xmlns:a14="http://schemas.microsoft.com/office/drawing/2010/main" xmlns="" w="9525">
                   <a:solidFill>
                     <a:srgbClr val="000000"/>
                   </a:solidFill>
@@ -4404,7 +4404,7 @@
             </a:ln>
             <a:extLst>
               <a:ext uri="{91240B29-F687-4f45-9708-019B960494DF}">
-                <a14:hiddenLine xmlns="" xmlns:a14="http://schemas.microsoft.com/office/drawing/2010/main" w="9525">
+                <a14:hiddenLine xmlns:a14="http://schemas.microsoft.com/office/drawing/2010/main" xmlns="" w="9525">
                   <a:solidFill>
                     <a:srgbClr val="000000"/>
                   </a:solidFill>
@@ -4494,7 +4494,7 @@
             </a:ln>
             <a:extLst>
               <a:ext uri="{91240B29-F687-4f45-9708-019B960494DF}">
-                <a14:hiddenLine xmlns="" xmlns:a14="http://schemas.microsoft.com/office/drawing/2010/main" w="9525">
+                <a14:hiddenLine xmlns:a14="http://schemas.microsoft.com/office/drawing/2010/main" xmlns="" w="9525">
                   <a:solidFill>
                     <a:srgbClr val="000000"/>
                   </a:solidFill>
@@ -4584,7 +4584,7 @@
             </a:ln>
             <a:extLst>
               <a:ext uri="{91240B29-F687-4f45-9708-019B960494DF}">
-                <a14:hiddenLine xmlns="" xmlns:a14="http://schemas.microsoft.com/office/drawing/2010/main" w="9525">
+                <a14:hiddenLine xmlns:a14="http://schemas.microsoft.com/office/drawing/2010/main" xmlns="" w="9525">
                   <a:solidFill>
                     <a:srgbClr val="000000"/>
                   </a:solidFill>
@@ -4646,7 +4646,7 @@
             </a:ln>
             <a:extLst>
               <a:ext uri="{91240B29-F687-4f45-9708-019B960494DF}">
-                <a14:hiddenLine xmlns="" xmlns:a14="http://schemas.microsoft.com/office/drawing/2010/main" w="9525">
+                <a14:hiddenLine xmlns:a14="http://schemas.microsoft.com/office/drawing/2010/main" xmlns="" w="9525">
                   <a:solidFill>
                     <a:srgbClr val="000000"/>
                   </a:solidFill>
@@ -4766,7 +4766,7 @@
             </a:ln>
             <a:extLst>
               <a:ext uri="{91240B29-F687-4f45-9708-019B960494DF}">
-                <a14:hiddenLine xmlns="" xmlns:a14="http://schemas.microsoft.com/office/drawing/2010/main" w="9525">
+                <a14:hiddenLine xmlns:a14="http://schemas.microsoft.com/office/drawing/2010/main" xmlns="" w="9525">
                   <a:solidFill>
                     <a:srgbClr val="000000"/>
                   </a:solidFill>
@@ -4834,7 +4834,7 @@
             </a:ln>
             <a:extLst>
               <a:ext uri="{91240B29-F687-4f45-9708-019B960494DF}">
-                <a14:hiddenLine xmlns="" xmlns:a14="http://schemas.microsoft.com/office/drawing/2010/main" w="9525">
+                <a14:hiddenLine xmlns:a14="http://schemas.microsoft.com/office/drawing/2010/main" xmlns="" w="9525">
                   <a:solidFill>
                     <a:srgbClr val="000000"/>
                   </a:solidFill>
@@ -4924,7 +4924,7 @@
             </a:ln>
             <a:extLst>
               <a:ext uri="{91240B29-F687-4f45-9708-019B960494DF}">
-                <a14:hiddenLine xmlns="" xmlns:a14="http://schemas.microsoft.com/office/drawing/2010/main" w="9525">
+                <a14:hiddenLine xmlns:a14="http://schemas.microsoft.com/office/drawing/2010/main" xmlns="" w="9525">
                   <a:solidFill>
                     <a:srgbClr val="000000"/>
                   </a:solidFill>
@@ -9731,7 +9731,7 @@
           <a:noFill/>
           <a:extLst>
             <a:ext uri="{909E8E84-426E-40dd-AFC4-6F175D3DCCD1}">
-              <a14:hiddenFill xmlns="" xmlns:a14="http://schemas.microsoft.com/office/drawing/2010/main">
+              <a14:hiddenFill xmlns:a14="http://schemas.microsoft.com/office/drawing/2010/main" xmlns="">
                 <a:solidFill>
                   <a:srgbClr val="FFFFFF"/>
                 </a:solidFill>
@@ -9805,7 +9805,7 @@
               </a:ln>
               <a:extLst>
                 <a:ext uri="{91240B29-F687-4f45-9708-019B960494DF}">
-                  <a14:hiddenLine xmlns="" xmlns:a14="http://schemas.microsoft.com/office/drawing/2010/main" w="9525">
+                  <a14:hiddenLine xmlns:a14="http://schemas.microsoft.com/office/drawing/2010/main" xmlns="" w="9525">
                     <a:solidFill>
                       <a:srgbClr val="000000"/>
                     </a:solidFill>
@@ -9895,7 +9895,7 @@
               </a:ln>
               <a:extLst>
                 <a:ext uri="{91240B29-F687-4f45-9708-019B960494DF}">
-                  <a14:hiddenLine xmlns="" xmlns:a14="http://schemas.microsoft.com/office/drawing/2010/main" w="9525">
+                  <a14:hiddenLine xmlns:a14="http://schemas.microsoft.com/office/drawing/2010/main" xmlns="" w="9525">
                     <a:solidFill>
                       <a:srgbClr val="000000"/>
                     </a:solidFill>
@@ -9985,7 +9985,7 @@
               </a:ln>
               <a:extLst>
                 <a:ext uri="{91240B29-F687-4f45-9708-019B960494DF}">
-                  <a14:hiddenLine xmlns="" xmlns:a14="http://schemas.microsoft.com/office/drawing/2010/main" w="9525">
+                  <a14:hiddenLine xmlns:a14="http://schemas.microsoft.com/office/drawing/2010/main" xmlns="" w="9525">
                     <a:solidFill>
                       <a:srgbClr val="000000"/>
                     </a:solidFill>
@@ -10047,7 +10047,7 @@
               </a:ln>
               <a:extLst>
                 <a:ext uri="{91240B29-F687-4f45-9708-019B960494DF}">
-                  <a14:hiddenLine xmlns="" xmlns:a14="http://schemas.microsoft.com/office/drawing/2010/main" w="9525">
+                  <a14:hiddenLine xmlns:a14="http://schemas.microsoft.com/office/drawing/2010/main" xmlns="" w="9525">
                     <a:solidFill>
                       <a:srgbClr val="000000"/>
                     </a:solidFill>
@@ -10137,7 +10137,7 @@
               </a:ln>
               <a:extLst>
                 <a:ext uri="{91240B29-F687-4f45-9708-019B960494DF}">
-                  <a14:hiddenLine xmlns="" xmlns:a14="http://schemas.microsoft.com/office/drawing/2010/main" w="9525">
+                  <a14:hiddenLine xmlns:a14="http://schemas.microsoft.com/office/drawing/2010/main" xmlns="" w="9525">
                     <a:solidFill>
                       <a:srgbClr val="000000"/>
                     </a:solidFill>
@@ -10199,7 +10199,7 @@
               </a:ln>
               <a:extLst>
                 <a:ext uri="{91240B29-F687-4f45-9708-019B960494DF}">
-                  <a14:hiddenLine xmlns="" xmlns:a14="http://schemas.microsoft.com/office/drawing/2010/main" w="9525">
+                  <a14:hiddenLine xmlns:a14="http://schemas.microsoft.com/office/drawing/2010/main" xmlns="" w="9525">
                     <a:solidFill>
                       <a:srgbClr val="000000"/>
                     </a:solidFill>
@@ -10261,7 +10261,7 @@
               </a:ln>
               <a:extLst>
                 <a:ext uri="{91240B29-F687-4f45-9708-019B960494DF}">
-                  <a14:hiddenLine xmlns="" xmlns:a14="http://schemas.microsoft.com/office/drawing/2010/main" w="9525">
+                  <a14:hiddenLine xmlns:a14="http://schemas.microsoft.com/office/drawing/2010/main" xmlns="" w="9525">
                     <a:solidFill>
                       <a:srgbClr val="000000"/>
                     </a:solidFill>
@@ -10351,7 +10351,7 @@
               </a:ln>
               <a:extLst>
                 <a:ext uri="{91240B29-F687-4f45-9708-019B960494DF}">
-                  <a14:hiddenLine xmlns="" xmlns:a14="http://schemas.microsoft.com/office/drawing/2010/main" w="9525">
+                  <a14:hiddenLine xmlns:a14="http://schemas.microsoft.com/office/drawing/2010/main" xmlns="" w="9525">
                     <a:solidFill>
                       <a:srgbClr val="000000"/>
                     </a:solidFill>
@@ -10441,7 +10441,7 @@
               </a:ln>
               <a:extLst>
                 <a:ext uri="{91240B29-F687-4f45-9708-019B960494DF}">
-                  <a14:hiddenLine xmlns="" xmlns:a14="http://schemas.microsoft.com/office/drawing/2010/main" w="9525">
+                  <a14:hiddenLine xmlns:a14="http://schemas.microsoft.com/office/drawing/2010/main" xmlns="" w="9525">
                     <a:solidFill>
                       <a:srgbClr val="000000"/>
                     </a:solidFill>
@@ -10503,7 +10503,7 @@
               </a:ln>
               <a:extLst>
                 <a:ext uri="{91240B29-F687-4f45-9708-019B960494DF}">
-                  <a14:hiddenLine xmlns="" xmlns:a14="http://schemas.microsoft.com/office/drawing/2010/main" w="9525">
+                  <a14:hiddenLine xmlns:a14="http://schemas.microsoft.com/office/drawing/2010/main" xmlns="" w="9525">
                     <a:solidFill>
                       <a:srgbClr val="000000"/>
                     </a:solidFill>
@@ -10613,7 +10613,7 @@
               </a:ln>
               <a:extLst>
                 <a:ext uri="{91240B29-F687-4f45-9708-019B960494DF}">
-                  <a14:hiddenLine xmlns="" xmlns:a14="http://schemas.microsoft.com/office/drawing/2010/main" w="9525">
+                  <a14:hiddenLine xmlns:a14="http://schemas.microsoft.com/office/drawing/2010/main" xmlns="" w="9525">
                     <a:solidFill>
                       <a:srgbClr val="000000"/>
                     </a:solidFill>
@@ -10697,7 +10697,7 @@
               </a:ln>
               <a:extLst>
                 <a:ext uri="{91240B29-F687-4f45-9708-019B960494DF}">
-                  <a14:hiddenLine xmlns="" xmlns:a14="http://schemas.microsoft.com/office/drawing/2010/main" w="9525">
+                  <a14:hiddenLine xmlns:a14="http://schemas.microsoft.com/office/drawing/2010/main" xmlns="" w="9525">
                     <a:solidFill>
                       <a:srgbClr val="000000"/>
                     </a:solidFill>
@@ -10759,7 +10759,7 @@
               </a:ln>
               <a:extLst>
                 <a:ext uri="{91240B29-F687-4f45-9708-019B960494DF}">
-                  <a14:hiddenLine xmlns="" xmlns:a14="http://schemas.microsoft.com/office/drawing/2010/main" w="9525">
+                  <a14:hiddenLine xmlns:a14="http://schemas.microsoft.com/office/drawing/2010/main" xmlns="" w="9525">
                     <a:solidFill>
                       <a:srgbClr val="000000"/>
                     </a:solidFill>
@@ -10821,7 +10821,7 @@
               </a:ln>
               <a:extLst>
                 <a:ext uri="{91240B29-F687-4f45-9708-019B960494DF}">
-                  <a14:hiddenLine xmlns="" xmlns:a14="http://schemas.microsoft.com/office/drawing/2010/main" w="9525">
+                  <a14:hiddenLine xmlns:a14="http://schemas.microsoft.com/office/drawing/2010/main" xmlns="" w="9525">
                     <a:solidFill>
                       <a:srgbClr val="000000"/>
                     </a:solidFill>
@@ -10911,7 +10911,7 @@
               </a:ln>
               <a:extLst>
                 <a:ext uri="{91240B29-F687-4f45-9708-019B960494DF}">
-                  <a14:hiddenLine xmlns="" xmlns:a14="http://schemas.microsoft.com/office/drawing/2010/main" w="9525">
+                  <a14:hiddenLine xmlns:a14="http://schemas.microsoft.com/office/drawing/2010/main" xmlns="" w="9525">
                     <a:solidFill>
                       <a:srgbClr val="000000"/>
                     </a:solidFill>
@@ -10945,7 +10945,7 @@
               </a:ln>
               <a:extLst>
                 <a:ext uri="{91240B29-F687-4f45-9708-019B960494DF}">
-                  <a14:hiddenLine xmlns="" xmlns:a14="http://schemas.microsoft.com/office/drawing/2010/main" w="9525">
+                  <a14:hiddenLine xmlns:a14="http://schemas.microsoft.com/office/drawing/2010/main" xmlns="" w="9525">
                     <a:solidFill>
                       <a:srgbClr val="000000"/>
                     </a:solidFill>
@@ -11010,7 +11010,7 @@
               </a:ln>
               <a:extLst>
                 <a:ext uri="{91240B29-F687-4f45-9708-019B960494DF}">
-                  <a14:hiddenLine xmlns="" xmlns:a14="http://schemas.microsoft.com/office/drawing/2010/main" w="9525">
+                  <a14:hiddenLine xmlns:a14="http://schemas.microsoft.com/office/drawing/2010/main" xmlns="" w="9525">
                     <a:solidFill>
                       <a:srgbClr val="000000"/>
                     </a:solidFill>
@@ -11100,7 +11100,7 @@
               </a:ln>
               <a:extLst>
                 <a:ext uri="{91240B29-F687-4f45-9708-019B960494DF}">
-                  <a14:hiddenLine xmlns="" xmlns:a14="http://schemas.microsoft.com/office/drawing/2010/main" w="9525">
+                  <a14:hiddenLine xmlns:a14="http://schemas.microsoft.com/office/drawing/2010/main" xmlns="" w="9525">
                     <a:solidFill>
                       <a:srgbClr val="000000"/>
                     </a:solidFill>
@@ -11162,7 +11162,7 @@
               </a:ln>
               <a:extLst>
                 <a:ext uri="{91240B29-F687-4f45-9708-019B960494DF}">
-                  <a14:hiddenLine xmlns="" xmlns:a14="http://schemas.microsoft.com/office/drawing/2010/main" w="9525">
+                  <a14:hiddenLine xmlns:a14="http://schemas.microsoft.com/office/drawing/2010/main" xmlns="" w="9525">
                     <a:solidFill>
                       <a:srgbClr val="000000"/>
                     </a:solidFill>
@@ -11252,7 +11252,7 @@
               </a:ln>
               <a:extLst>
                 <a:ext uri="{91240B29-F687-4f45-9708-019B960494DF}">
-                  <a14:hiddenLine xmlns="" xmlns:a14="http://schemas.microsoft.com/office/drawing/2010/main" w="9525">
+                  <a14:hiddenLine xmlns:a14="http://schemas.microsoft.com/office/drawing/2010/main" xmlns="" w="9525">
                     <a:solidFill>
                       <a:srgbClr val="000000"/>
                     </a:solidFill>
@@ -11317,7 +11317,7 @@
               </a:ln>
               <a:extLst>
                 <a:ext uri="{91240B29-F687-4f45-9708-019B960494DF}">
-                  <a14:hiddenLine xmlns="" xmlns:a14="http://schemas.microsoft.com/office/drawing/2010/main" w="9525">
+                  <a14:hiddenLine xmlns:a14="http://schemas.microsoft.com/office/drawing/2010/main" xmlns="" w="9525">
                     <a:solidFill>
                       <a:srgbClr val="000000"/>
                     </a:solidFill>
@@ -11379,7 +11379,7 @@
               </a:ln>
               <a:extLst>
                 <a:ext uri="{91240B29-F687-4f45-9708-019B960494DF}">
-                  <a14:hiddenLine xmlns="" xmlns:a14="http://schemas.microsoft.com/office/drawing/2010/main" w="9525">
+                  <a14:hiddenLine xmlns:a14="http://schemas.microsoft.com/office/drawing/2010/main" xmlns="" w="9525">
                     <a:solidFill>
                       <a:srgbClr val="000000"/>
                     </a:solidFill>
@@ -11469,7 +11469,7 @@
               </a:ln>
               <a:extLst>
                 <a:ext uri="{91240B29-F687-4f45-9708-019B960494DF}">
-                  <a14:hiddenLine xmlns="" xmlns:a14="http://schemas.microsoft.com/office/drawing/2010/main" w="9525">
+                  <a14:hiddenLine xmlns:a14="http://schemas.microsoft.com/office/drawing/2010/main" xmlns="" w="9525">
                     <a:solidFill>
                       <a:srgbClr val="000000"/>
                     </a:solidFill>
@@ -11559,7 +11559,7 @@
               </a:ln>
               <a:extLst>
                 <a:ext uri="{91240B29-F687-4f45-9708-019B960494DF}">
-                  <a14:hiddenLine xmlns="" xmlns:a14="http://schemas.microsoft.com/office/drawing/2010/main" w="9525">
+                  <a14:hiddenLine xmlns:a14="http://schemas.microsoft.com/office/drawing/2010/main" xmlns="" w="9525">
                     <a:solidFill>
                       <a:srgbClr val="000000"/>
                     </a:solidFill>
@@ -11624,7 +11624,7 @@
               </a:ln>
               <a:extLst>
                 <a:ext uri="{91240B29-F687-4f45-9708-019B960494DF}">
-                  <a14:hiddenLine xmlns="" xmlns:a14="http://schemas.microsoft.com/office/drawing/2010/main" w="9525">
+                  <a14:hiddenLine xmlns:a14="http://schemas.microsoft.com/office/drawing/2010/main" xmlns="" w="9525">
                     <a:solidFill>
                       <a:srgbClr val="000000"/>
                     </a:solidFill>
@@ -11744,7 +11744,7 @@
               </a:ln>
               <a:extLst>
                 <a:ext uri="{91240B29-F687-4f45-9708-019B960494DF}">
-                  <a14:hiddenLine xmlns="" xmlns:a14="http://schemas.microsoft.com/office/drawing/2010/main" w="9525">
+                  <a14:hiddenLine xmlns:a14="http://schemas.microsoft.com/office/drawing/2010/main" xmlns="" w="9525">
                     <a:solidFill>
                       <a:srgbClr val="000000"/>
                     </a:solidFill>
@@ -11842,7 +11842,7 @@
               </a:ln>
               <a:extLst>
                 <a:ext uri="{91240B29-F687-4f45-9708-019B960494DF}">
-                  <a14:hiddenLine xmlns="" xmlns:a14="http://schemas.microsoft.com/office/drawing/2010/main" w="9525">
+                  <a14:hiddenLine xmlns:a14="http://schemas.microsoft.com/office/drawing/2010/main" xmlns="" w="9525">
                     <a:solidFill>
                       <a:srgbClr val="000000"/>
                     </a:solidFill>
@@ -11957,7 +11957,7 @@
               </a:ln>
               <a:extLst>
                 <a:ext uri="{91240B29-F687-4f45-9708-019B960494DF}">
-                  <a14:hiddenLine xmlns="" xmlns:a14="http://schemas.microsoft.com/office/drawing/2010/main" w="9525">
+                  <a14:hiddenLine xmlns:a14="http://schemas.microsoft.com/office/drawing/2010/main" xmlns="" w="9525">
                     <a:solidFill>
                       <a:srgbClr val="000000"/>
                     </a:solidFill>
@@ -12047,7 +12047,7 @@
               </a:ln>
               <a:extLst>
                 <a:ext uri="{91240B29-F687-4f45-9708-019B960494DF}">
-                  <a14:hiddenLine xmlns="" xmlns:a14="http://schemas.microsoft.com/office/drawing/2010/main" w="9525">
+                  <a14:hiddenLine xmlns:a14="http://schemas.microsoft.com/office/drawing/2010/main" xmlns="" w="9525">
                     <a:solidFill>
                       <a:srgbClr val="000000"/>
                     </a:solidFill>
@@ -12112,7 +12112,7 @@
               </a:ln>
               <a:extLst>
                 <a:ext uri="{91240B29-F687-4f45-9708-019B960494DF}">
-                  <a14:hiddenLine xmlns="" xmlns:a14="http://schemas.microsoft.com/office/drawing/2010/main" w="9525">
+                  <a14:hiddenLine xmlns:a14="http://schemas.microsoft.com/office/drawing/2010/main" xmlns="" w="9525">
                     <a:solidFill>
                       <a:srgbClr val="000000"/>
                     </a:solidFill>
@@ -12202,7 +12202,7 @@
               </a:ln>
               <a:extLst>
                 <a:ext uri="{91240B29-F687-4f45-9708-019B960494DF}">
-                  <a14:hiddenLine xmlns="" xmlns:a14="http://schemas.microsoft.com/office/drawing/2010/main" w="9525">
+                  <a14:hiddenLine xmlns:a14="http://schemas.microsoft.com/office/drawing/2010/main" xmlns="" w="9525">
                     <a:solidFill>
                       <a:srgbClr val="000000"/>
                     </a:solidFill>
@@ -12270,7 +12270,7 @@
               </a:ln>
               <a:extLst>
                 <a:ext uri="{91240B29-F687-4f45-9708-019B960494DF}">
-                  <a14:hiddenLine xmlns="" xmlns:a14="http://schemas.microsoft.com/office/drawing/2010/main" w="9525">
+                  <a14:hiddenLine xmlns:a14="http://schemas.microsoft.com/office/drawing/2010/main" xmlns="" w="9525">
                     <a:solidFill>
                       <a:srgbClr val="000000"/>
                     </a:solidFill>
@@ -12360,7 +12360,7 @@
               </a:ln>
               <a:extLst>
                 <a:ext uri="{91240B29-F687-4f45-9708-019B960494DF}">
-                  <a14:hiddenLine xmlns="" xmlns:a14="http://schemas.microsoft.com/office/drawing/2010/main" w="9525">
+                  <a14:hiddenLine xmlns:a14="http://schemas.microsoft.com/office/drawing/2010/main" xmlns="" w="9525">
                     <a:solidFill>
                       <a:srgbClr val="000000"/>
                     </a:solidFill>
@@ -12428,7 +12428,7 @@
               </a:ln>
               <a:extLst>
                 <a:ext uri="{91240B29-F687-4f45-9708-019B960494DF}">
-                  <a14:hiddenLine xmlns="" xmlns:a14="http://schemas.microsoft.com/office/drawing/2010/main" w="9525">
+                  <a14:hiddenLine xmlns:a14="http://schemas.microsoft.com/office/drawing/2010/main" xmlns="" w="9525">
                     <a:solidFill>
                       <a:srgbClr val="000000"/>
                     </a:solidFill>
@@ -12518,7 +12518,7 @@
               </a:ln>
               <a:extLst>
                 <a:ext uri="{91240B29-F687-4f45-9708-019B960494DF}">
-                  <a14:hiddenLine xmlns="" xmlns:a14="http://schemas.microsoft.com/office/drawing/2010/main" w="9525">
+                  <a14:hiddenLine xmlns:a14="http://schemas.microsoft.com/office/drawing/2010/main" xmlns="" w="9525">
                     <a:solidFill>
                       <a:srgbClr val="000000"/>
                     </a:solidFill>
@@ -12552,7 +12552,7 @@
               </a:ln>
               <a:extLst>
                 <a:ext uri="{91240B29-F687-4f45-9708-019B960494DF}">
-                  <a14:hiddenLine xmlns="" xmlns:a14="http://schemas.microsoft.com/office/drawing/2010/main" w="9525">
+                  <a14:hiddenLine xmlns:a14="http://schemas.microsoft.com/office/drawing/2010/main" xmlns="" w="9525">
                     <a:solidFill>
                       <a:srgbClr val="000000"/>
                     </a:solidFill>
@@ -14183,7 +14183,7 @@
           <a:p>
             <a:r>
               <a:rPr lang="en-US" dirty="0"/>
-              <a:t>Layout.</a:t>
+              <a:t>PCB design – in production process.</a:t>
             </a:r>
           </a:p>
         </p:txBody>
@@ -14480,7 +14480,12 @@
             <p:ph type="title"/>
           </p:nvPr>
         </p:nvSpPr>
-        <p:spPr/>
+        <p:spPr>
+          <a:xfrm>
+            <a:off x="1030692" y="72843"/>
+            <a:ext cx="9905998" cy="1478570"/>
+          </a:xfrm>
+        </p:spPr>
         <p:txBody>
           <a:bodyPr/>
           <a:lstStyle/>
@@ -14512,8 +14517,8 @@
         </p:nvSpPr>
         <p:spPr>
           <a:xfrm>
-            <a:off x="742247" y="2779379"/>
-            <a:ext cx="1799357" cy="471412"/>
+            <a:off x="850392" y="2219545"/>
+            <a:ext cx="1683783" cy="471412"/>
           </a:xfrm>
           <a:prstGeom prst="rect">
             <a:avLst/>
@@ -14596,7 +14601,7 @@
         </p:nvSpPr>
         <p:spPr>
           <a:xfrm>
-            <a:off x="2026188" y="3872979"/>
+            <a:off x="2018759" y="3313145"/>
             <a:ext cx="2741755" cy="471412"/>
           </a:xfrm>
           <a:prstGeom prst="rect">
@@ -14678,7 +14683,7 @@
         </p:nvSpPr>
         <p:spPr>
           <a:xfrm>
-            <a:off x="2026188" y="3304459"/>
+            <a:off x="2018759" y="2744625"/>
             <a:ext cx="2741755" cy="471412"/>
           </a:xfrm>
           <a:prstGeom prst="rect">
@@ -14762,8 +14767,8 @@
         </p:nvSpPr>
         <p:spPr>
           <a:xfrm>
-            <a:off x="6559871" y="2779379"/>
-            <a:ext cx="1281300" cy="471412"/>
+            <a:off x="6567300" y="3922775"/>
+            <a:ext cx="1281300" cy="421615"/>
           </a:xfrm>
           <a:prstGeom prst="rect">
             <a:avLst/>
@@ -14844,7 +14849,7 @@
         </p:nvSpPr>
         <p:spPr>
           <a:xfrm>
-            <a:off x="-1156063" y="1506632"/>
+            <a:off x="-1008857" y="852417"/>
             <a:ext cx="13985095" cy="1752116"/>
           </a:xfrm>
           <a:prstGeom prst="mathMinus">
@@ -14909,7 +14914,7 @@
         </p:nvCxnSpPr>
         <p:spPr>
           <a:xfrm>
-            <a:off x="742248" y="2652378"/>
+            <a:off x="881766" y="2074347"/>
             <a:ext cx="309312" cy="0"/>
           </a:xfrm>
           <a:prstGeom prst="straightConnector1">
@@ -14954,7 +14959,7 @@
         </p:nvSpPr>
         <p:spPr>
           <a:xfrm>
-            <a:off x="1021080" y="2510033"/>
+            <a:off x="1088779" y="1935848"/>
             <a:ext cx="603504" cy="276999"/>
           </a:xfrm>
           <a:prstGeom prst="rect">
@@ -14999,8 +15004,8 @@
         </p:nvSpPr>
         <p:spPr>
           <a:xfrm>
-            <a:off x="9129904" y="4746821"/>
-            <a:ext cx="1799357" cy="888114"/>
+            <a:off x="9137333" y="5840421"/>
+            <a:ext cx="2018347" cy="471412"/>
           </a:xfrm>
           <a:prstGeom prst="rect">
             <a:avLst/>
@@ -15081,8 +15086,8 @@
         </p:nvSpPr>
         <p:spPr>
           <a:xfrm>
-            <a:off x="4767943" y="2787031"/>
-            <a:ext cx="1799357" cy="3937799"/>
+            <a:off x="4767943" y="2074347"/>
+            <a:ext cx="1799357" cy="4363029"/>
           </a:xfrm>
           <a:prstGeom prst="rect">
             <a:avLst/>
@@ -15165,7 +15170,7 @@
         </p:nvSpPr>
         <p:spPr>
           <a:xfrm>
-            <a:off x="6567300" y="3457085"/>
+            <a:off x="6574729" y="4550685"/>
             <a:ext cx="1281302" cy="669581"/>
           </a:xfrm>
           <a:prstGeom prst="rect">
@@ -15247,7 +15252,7 @@
         </p:nvSpPr>
         <p:spPr>
           <a:xfrm>
-            <a:off x="7848602" y="4224223"/>
+            <a:off x="7856031" y="5317823"/>
             <a:ext cx="1281302" cy="471412"/>
           </a:xfrm>
           <a:prstGeom prst="rect">
@@ -17598,7 +17603,7 @@
         </p:nvSpPr>
         <p:spPr>
           <a:xfrm>
-            <a:off x="690916" y="2576608"/>
+            <a:off x="535468" y="2059694"/>
             <a:ext cx="2076077" cy="1504169"/>
           </a:xfrm>
           <a:prstGeom prst="rect">
@@ -17672,7 +17677,7 @@
         </p:nvSpPr>
         <p:spPr>
           <a:xfrm>
-            <a:off x="3461824" y="2576609"/>
+            <a:off x="3306376" y="2059695"/>
             <a:ext cx="2076077" cy="1504169"/>
           </a:xfrm>
           <a:prstGeom prst="rect">
@@ -17746,7 +17751,7 @@
         </p:nvSpPr>
         <p:spPr>
           <a:xfrm>
-            <a:off x="6232732" y="2630070"/>
+            <a:off x="6077284" y="2113156"/>
             <a:ext cx="2076077" cy="1410479"/>
           </a:xfrm>
           <a:prstGeom prst="rect">
@@ -17820,8 +17825,8 @@
         </p:nvSpPr>
         <p:spPr>
           <a:xfrm>
-            <a:off x="9003640" y="2057399"/>
-            <a:ext cx="2988424" cy="2558143"/>
+            <a:off x="8857336" y="1636775"/>
+            <a:ext cx="2988424" cy="2350009"/>
           </a:xfrm>
           <a:prstGeom prst="rect">
             <a:avLst/>
@@ -17900,7 +17905,7 @@
         </p:nvCxnSpPr>
         <p:spPr>
           <a:xfrm>
-            <a:off x="5537901" y="3328694"/>
+            <a:off x="5382453" y="2811780"/>
             <a:ext cx="694831" cy="6616"/>
           </a:xfrm>
           <a:prstGeom prst="straightConnector1">
@@ -17948,9 +17953,9 @@
           <p:nvPr/>
         </p:nvCxnSpPr>
         <p:spPr>
-          <a:xfrm>
-            <a:off x="8308809" y="3335310"/>
-            <a:ext cx="694831" cy="1161"/>
+          <a:xfrm flipV="1">
+            <a:off x="8153361" y="2811780"/>
+            <a:ext cx="703975" cy="6616"/>
           </a:xfrm>
           <a:prstGeom prst="straightConnector1">
             <a:avLst/>
@@ -17998,7 +18003,7 @@
         </p:nvCxnSpPr>
         <p:spPr>
           <a:xfrm>
-            <a:off x="2766993" y="3328693"/>
+            <a:off x="2611545" y="2811779"/>
             <a:ext cx="694831" cy="1"/>
           </a:xfrm>
           <a:prstGeom prst="straightConnector1">
@@ -18102,12 +18107,12 @@
         </p:nvCxnSpPr>
         <p:spPr>
           <a:xfrm rot="16200000" flipH="1" flipV="1">
-            <a:off x="5853799" y="-2067446"/>
-            <a:ext cx="519209" cy="8768897"/>
+            <a:off x="5751068" y="-2540787"/>
+            <a:ext cx="422919" cy="8778041"/>
           </a:xfrm>
           <a:prstGeom prst="bentConnector3">
             <a:avLst>
-              <a:gd name="adj1" fmla="val -44029"/>
+              <a:gd name="adj1" fmla="val -54053"/>
             </a:avLst>
           </a:prstGeom>
           <a:ln w="50800" cap="flat" cmpd="sng" algn="ctr">
@@ -18152,8 +18157,8 @@
         </p:nvCxnSpPr>
         <p:spPr>
           <a:xfrm>
-            <a:off x="4499863" y="1839686"/>
-            <a:ext cx="0" cy="736923"/>
+            <a:off x="4344415" y="1389888"/>
+            <a:ext cx="0" cy="669807"/>
           </a:xfrm>
           <a:prstGeom prst="straightConnector1">
             <a:avLst/>
@@ -18201,7 +18206,7 @@
         </p:nvSpPr>
         <p:spPr>
           <a:xfrm>
-            <a:off x="395637" y="4281394"/>
+            <a:off x="297786" y="4120444"/>
             <a:ext cx="11596427" cy="2812780"/>
           </a:xfrm>
         </p:spPr>
@@ -18213,13 +18218,19 @@
           <a:p>
             <a:r>
               <a:rPr lang="en-US" dirty="0"/>
-              <a:t>After each comparison, we will log both the Golden and target barcodes, along with the results and the date of scanning. This will create a comprehensive record that allows us to trace any potential errors efficiently.</a:t>
+              <a:t>After each comparison, we will log both the Golden and target barcodes, along with the results, time and date of scanning.</a:t>
             </a:r>
           </a:p>
           <a:p>
             <a:r>
               <a:rPr lang="en-US" dirty="0"/>
               <a:t>When the device’s memory is full, the user can decide if he wants to override some results  or delete all and start a new log.</a:t>
+            </a:r>
+          </a:p>
+          <a:p>
+            <a:r>
+              <a:rPr lang="en-US" dirty="0"/>
+              <a:t>The log record can be accessed via WI-FI.</a:t>
             </a:r>
             <a:endParaRPr lang="en-IL" dirty="0"/>
           </a:p>
@@ -18272,7 +18283,7 @@
         <p:spPr>
           <a:xfrm flipH="1">
             <a:off x="7535342" y="4596510"/>
-            <a:ext cx="1938378" cy="12246"/>
+            <a:ext cx="1958508" cy="12246"/>
           </a:xfrm>
           <a:prstGeom prst="straightConnector1">
             <a:avLst/>
@@ -18876,8 +18887,8 @@
         </p:nvCxnSpPr>
         <p:spPr>
           <a:xfrm>
-            <a:off x="7567412" y="4873204"/>
-            <a:ext cx="1926438" cy="5605"/>
+            <a:off x="7535342" y="4878809"/>
+            <a:ext cx="1958508" cy="0"/>
           </a:xfrm>
           <a:prstGeom prst="straightConnector1">
             <a:avLst/>
@@ -19426,7 +19437,7 @@
         </p:nvSpPr>
         <p:spPr>
           <a:xfrm>
-            <a:off x="10400356" y="3415978"/>
+            <a:off x="10492374" y="3461856"/>
             <a:ext cx="1216058" cy="798922"/>
           </a:xfrm>
           <a:prstGeom prst="rect">
@@ -20033,9 +20044,9 @@
           <p:nvPr/>
         </p:nvCxnSpPr>
         <p:spPr>
-          <a:xfrm flipV="1">
-            <a:off x="7567412" y="4052395"/>
-            <a:ext cx="2832944" cy="1889"/>
+          <a:xfrm>
+            <a:off x="7567412" y="4054284"/>
+            <a:ext cx="2924962" cy="0"/>
           </a:xfrm>
           <a:prstGeom prst="straightConnector1">
             <a:avLst/>

</xml_diff>